<commit_message>
Interkation und HMI zur Aufgabenvorstellung hinzugefügt
</commit_message>
<xml_diff>
--- a/Dokumente/Präsentationen/2019-01-07_DA_Feldkemper_Aufgabenvorstellung.pptx
+++ b/Dokumente/Präsentationen/2019-01-07_DA_Feldkemper_Aufgabenvorstellung.pptx
@@ -12,8 +12,8 @@
   </p:handoutMasterIdLst>
   <p:sldIdLst>
     <p:sldId id="319" r:id="rId2"/>
-    <p:sldId id="320" r:id="rId3"/>
-    <p:sldId id="321" r:id="rId4"/>
+    <p:sldId id="327" r:id="rId3"/>
+    <p:sldId id="320" r:id="rId4"/>
     <p:sldId id="326" r:id="rId5"/>
     <p:sldId id="322" r:id="rId6"/>
     <p:sldId id="323" r:id="rId7"/>
@@ -25,14 +25,14 @@
   <p:notesSz cx="6858000" cy="9144000"/>
   <p:embeddedFontLst>
     <p:embeddedFont>
-      <p:font typeface="Calibri" panose="020F0502020204030204" pitchFamily="34" charset="0"/>
+      <p:font typeface="Open Sans" panose="020B0604020202020204" charset="0"/>
       <p:regular r:id="rId13"/>
       <p:bold r:id="rId14"/>
       <p:italic r:id="rId15"/>
       <p:boldItalic r:id="rId16"/>
     </p:embeddedFont>
     <p:embeddedFont>
-      <p:font typeface="Open Sans" panose="020B0604020202020204" charset="0"/>
+      <p:font typeface="Calibri" panose="020F0502020204030204" pitchFamily="34" charset="0"/>
       <p:regular r:id="rId17"/>
       <p:bold r:id="rId18"/>
       <p:italic r:id="rId19"/>
@@ -140,8 +140,8 @@
         <p14:section name="Standardabschnitt" id="{2939B5E8-EF71-43FF-B7B6-C3DB42F2B419}">
           <p14:sldIdLst>
             <p14:sldId id="319"/>
+            <p14:sldId id="327"/>
             <p14:sldId id="320"/>
-            <p14:sldId id="321"/>
             <p14:sldId id="326"/>
             <p14:sldId id="322"/>
             <p14:sldId id="323"/>
@@ -253,7 +253,7 @@
           <a:p>
             <a:fld id="{C6AC6211-610F-44E5-BF19-D3CDF6EDD281}" type="datetimeFigureOut">
               <a:rPr lang="de-DE" smtClean="0"/>
-              <a:t>11.12.2018</a:t>
+              <a:t>12.12.2018</a:t>
             </a:fld>
             <a:endParaRPr lang="de-DE"/>
           </a:p>
@@ -419,7 +419,7 @@
           <a:p>
             <a:fld id="{347435D3-23A6-45D3-8DFA-7317DC1E7A64}" type="datetimeFigureOut">
               <a:rPr lang="de-DE" smtClean="0"/>
-              <a:t>11.12.2018</a:t>
+              <a:t>12.12.2018</a:t>
             </a:fld>
             <a:endParaRPr lang="de-DE"/>
           </a:p>
@@ -752,7 +752,7 @@
           <a:p>
             <a:fld id="{2969AC09-DF60-43F4-96BF-67D4D9A74094}" type="slidenum">
               <a:rPr lang="de-DE" smtClean="0"/>
-              <a:t>2</a:t>
+              <a:t>3</a:t>
             </a:fld>
             <a:endParaRPr lang="de-DE"/>
           </a:p>
@@ -762,6 +762,258 @@
     <p:extLst>
       <p:ext uri="{BB962C8B-B14F-4D97-AF65-F5344CB8AC3E}">
         <p14:creationId xmlns:p14="http://schemas.microsoft.com/office/powerpoint/2010/main" val="6661220"/>
+      </p:ext>
+    </p:extLst>
+  </p:cSld>
+  <p:clrMapOvr>
+    <a:masterClrMapping/>
+  </p:clrMapOvr>
+</p:notes>
+</file>
+
+<file path=ppt/notesSlides/notesSlide2.xml><?xml version="1.0" encoding="utf-8"?>
+<p:notes xmlns:a="http://schemas.openxmlformats.org/drawingml/2006/main" xmlns:r="http://schemas.openxmlformats.org/officeDocument/2006/relationships" xmlns:p="http://schemas.openxmlformats.org/presentationml/2006/main">
+  <p:cSld>
+    <p:spTree>
+      <p:nvGrpSpPr>
+        <p:cNvPr id="1" name=""/>
+        <p:cNvGrpSpPr/>
+        <p:nvPr/>
+      </p:nvGrpSpPr>
+      <p:grpSpPr>
+        <a:xfrm>
+          <a:off x="0" y="0"/>
+          <a:ext cx="0" cy="0"/>
+          <a:chOff x="0" y="0"/>
+          <a:chExt cx="0" cy="0"/>
+        </a:xfrm>
+      </p:grpSpPr>
+      <p:sp>
+        <p:nvSpPr>
+          <p:cNvPr id="2" name="Folienbildplatzhalter 1"/>
+          <p:cNvSpPr>
+            <a:spLocks noGrp="1" noRot="1" noChangeAspect="1"/>
+          </p:cNvSpPr>
+          <p:nvPr>
+            <p:ph type="sldImg"/>
+          </p:nvPr>
+        </p:nvSpPr>
+        <p:spPr/>
+      </p:sp>
+      <p:sp>
+        <p:nvSpPr>
+          <p:cNvPr id="3" name="Notizenplatzhalter 2"/>
+          <p:cNvSpPr>
+            <a:spLocks noGrp="1"/>
+          </p:cNvSpPr>
+          <p:nvPr>
+            <p:ph type="body" idx="1"/>
+          </p:nvPr>
+        </p:nvSpPr>
+        <p:spPr/>
+        <p:txBody>
+          <a:bodyPr/>
+          <a:lstStyle/>
+          <a:p>
+            <a:endParaRPr lang="de-DE" dirty="0"/>
+          </a:p>
+        </p:txBody>
+      </p:sp>
+      <p:sp>
+        <p:nvSpPr>
+          <p:cNvPr id="4" name="Foliennummernplatzhalter 3"/>
+          <p:cNvSpPr>
+            <a:spLocks noGrp="1"/>
+          </p:cNvSpPr>
+          <p:nvPr>
+            <p:ph type="sldNum" sz="quarter" idx="10"/>
+          </p:nvPr>
+        </p:nvSpPr>
+        <p:spPr/>
+        <p:txBody>
+          <a:bodyPr/>
+          <a:lstStyle/>
+          <a:p>
+            <a:fld id="{2969AC09-DF60-43F4-96BF-67D4D9A74094}" type="slidenum">
+              <a:rPr lang="de-DE" smtClean="0"/>
+              <a:t>5</a:t>
+            </a:fld>
+            <a:endParaRPr lang="de-DE"/>
+          </a:p>
+        </p:txBody>
+      </p:sp>
+    </p:spTree>
+    <p:extLst>
+      <p:ext uri="{BB962C8B-B14F-4D97-AF65-F5344CB8AC3E}">
+        <p14:creationId xmlns:p14="http://schemas.microsoft.com/office/powerpoint/2010/main" val="230282903"/>
+      </p:ext>
+    </p:extLst>
+  </p:cSld>
+  <p:clrMapOvr>
+    <a:masterClrMapping/>
+  </p:clrMapOvr>
+</p:notes>
+</file>
+
+<file path=ppt/notesSlides/notesSlide3.xml><?xml version="1.0" encoding="utf-8"?>
+<p:notes xmlns:a="http://schemas.openxmlformats.org/drawingml/2006/main" xmlns:r="http://schemas.openxmlformats.org/officeDocument/2006/relationships" xmlns:p="http://schemas.openxmlformats.org/presentationml/2006/main">
+  <p:cSld>
+    <p:spTree>
+      <p:nvGrpSpPr>
+        <p:cNvPr id="1" name=""/>
+        <p:cNvGrpSpPr/>
+        <p:nvPr/>
+      </p:nvGrpSpPr>
+      <p:grpSpPr>
+        <a:xfrm>
+          <a:off x="0" y="0"/>
+          <a:ext cx="0" cy="0"/>
+          <a:chOff x="0" y="0"/>
+          <a:chExt cx="0" cy="0"/>
+        </a:xfrm>
+      </p:grpSpPr>
+      <p:sp>
+        <p:nvSpPr>
+          <p:cNvPr id="2" name="Folienbildplatzhalter 1"/>
+          <p:cNvSpPr>
+            <a:spLocks noGrp="1" noRot="1" noChangeAspect="1"/>
+          </p:cNvSpPr>
+          <p:nvPr>
+            <p:ph type="sldImg"/>
+          </p:nvPr>
+        </p:nvSpPr>
+        <p:spPr/>
+      </p:sp>
+      <p:sp>
+        <p:nvSpPr>
+          <p:cNvPr id="3" name="Notizenplatzhalter 2"/>
+          <p:cNvSpPr>
+            <a:spLocks noGrp="1"/>
+          </p:cNvSpPr>
+          <p:nvPr>
+            <p:ph type="body" idx="1"/>
+          </p:nvPr>
+        </p:nvSpPr>
+        <p:spPr/>
+        <p:txBody>
+          <a:bodyPr/>
+          <a:lstStyle/>
+          <a:p>
+            <a:endParaRPr lang="de-DE" dirty="0"/>
+          </a:p>
+        </p:txBody>
+      </p:sp>
+      <p:sp>
+        <p:nvSpPr>
+          <p:cNvPr id="4" name="Foliennummernplatzhalter 3"/>
+          <p:cNvSpPr>
+            <a:spLocks noGrp="1"/>
+          </p:cNvSpPr>
+          <p:nvPr>
+            <p:ph type="sldNum" sz="quarter" idx="10"/>
+          </p:nvPr>
+        </p:nvSpPr>
+        <p:spPr/>
+        <p:txBody>
+          <a:bodyPr/>
+          <a:lstStyle/>
+          <a:p>
+            <a:fld id="{2969AC09-DF60-43F4-96BF-67D4D9A74094}" type="slidenum">
+              <a:rPr lang="de-DE" smtClean="0"/>
+              <a:t>6</a:t>
+            </a:fld>
+            <a:endParaRPr lang="de-DE"/>
+          </a:p>
+        </p:txBody>
+      </p:sp>
+    </p:spTree>
+    <p:extLst>
+      <p:ext uri="{BB962C8B-B14F-4D97-AF65-F5344CB8AC3E}">
+        <p14:creationId xmlns:p14="http://schemas.microsoft.com/office/powerpoint/2010/main" val="1787122005"/>
+      </p:ext>
+    </p:extLst>
+  </p:cSld>
+  <p:clrMapOvr>
+    <a:masterClrMapping/>
+  </p:clrMapOvr>
+</p:notes>
+</file>
+
+<file path=ppt/notesSlides/notesSlide4.xml><?xml version="1.0" encoding="utf-8"?>
+<p:notes xmlns:a="http://schemas.openxmlformats.org/drawingml/2006/main" xmlns:r="http://schemas.openxmlformats.org/officeDocument/2006/relationships" xmlns:p="http://schemas.openxmlformats.org/presentationml/2006/main">
+  <p:cSld>
+    <p:spTree>
+      <p:nvGrpSpPr>
+        <p:cNvPr id="1" name=""/>
+        <p:cNvGrpSpPr/>
+        <p:nvPr/>
+      </p:nvGrpSpPr>
+      <p:grpSpPr>
+        <a:xfrm>
+          <a:off x="0" y="0"/>
+          <a:ext cx="0" cy="0"/>
+          <a:chOff x="0" y="0"/>
+          <a:chExt cx="0" cy="0"/>
+        </a:xfrm>
+      </p:grpSpPr>
+      <p:sp>
+        <p:nvSpPr>
+          <p:cNvPr id="2" name="Folienbildplatzhalter 1"/>
+          <p:cNvSpPr>
+            <a:spLocks noGrp="1" noRot="1" noChangeAspect="1"/>
+          </p:cNvSpPr>
+          <p:nvPr>
+            <p:ph type="sldImg"/>
+          </p:nvPr>
+        </p:nvSpPr>
+        <p:spPr/>
+      </p:sp>
+      <p:sp>
+        <p:nvSpPr>
+          <p:cNvPr id="3" name="Notizenplatzhalter 2"/>
+          <p:cNvSpPr>
+            <a:spLocks noGrp="1"/>
+          </p:cNvSpPr>
+          <p:nvPr>
+            <p:ph type="body" idx="1"/>
+          </p:nvPr>
+        </p:nvSpPr>
+        <p:spPr/>
+        <p:txBody>
+          <a:bodyPr/>
+          <a:lstStyle/>
+          <a:p>
+            <a:endParaRPr lang="de-DE" dirty="0"/>
+          </a:p>
+        </p:txBody>
+      </p:sp>
+      <p:sp>
+        <p:nvSpPr>
+          <p:cNvPr id="4" name="Foliennummernplatzhalter 3"/>
+          <p:cNvSpPr>
+            <a:spLocks noGrp="1"/>
+          </p:cNvSpPr>
+          <p:nvPr>
+            <p:ph type="sldNum" sz="quarter" idx="10"/>
+          </p:nvPr>
+        </p:nvSpPr>
+        <p:spPr/>
+        <p:txBody>
+          <a:bodyPr/>
+          <a:lstStyle/>
+          <a:p>
+            <a:fld id="{2969AC09-DF60-43F4-96BF-67D4D9A74094}" type="slidenum">
+              <a:rPr lang="de-DE" smtClean="0"/>
+              <a:t>7</a:t>
+            </a:fld>
+            <a:endParaRPr lang="de-DE"/>
+          </a:p>
+        </p:txBody>
+      </p:sp>
+    </p:spTree>
+    <p:extLst>
+      <p:ext uri="{BB962C8B-B14F-4D97-AF65-F5344CB8AC3E}">
+        <p14:creationId xmlns:p14="http://schemas.microsoft.com/office/powerpoint/2010/main" val="796060570"/>
       </p:ext>
     </p:extLst>
   </p:cSld>
@@ -793,7 +1045,7 @@
           <p:cNvPr id="15" name="Rechteck 14">
             <a:extLst>
               <a:ext uri="{FF2B5EF4-FFF2-40B4-BE49-F238E27FC236}">
-                <a16:creationId xmlns="" xmlns:a16="http://schemas.microsoft.com/office/drawing/2014/main" id="{F770C3AA-244C-A141-BC22-D074823F4293}"/>
+                <a16:creationId xmlns:a16="http://schemas.microsoft.com/office/drawing/2014/main" xmlns="" id="{F770C3AA-244C-A141-BC22-D074823F4293}"/>
               </a:ext>
             </a:extLst>
           </p:cNvPr>
@@ -1033,7 +1285,7 @@
           <p:cNvPr id="5" name="Grafik 4">
             <a:extLst>
               <a:ext uri="{FF2B5EF4-FFF2-40B4-BE49-F238E27FC236}">
-                <a16:creationId xmlns="" xmlns:a16="http://schemas.microsoft.com/office/drawing/2014/main" id="{C0F785FA-BB6E-6347-A8C6-9846216D4CBB}"/>
+                <a16:creationId xmlns:a16="http://schemas.microsoft.com/office/drawing/2014/main" xmlns="" id="{C0F785FA-BB6E-6347-A8C6-9846216D4CBB}"/>
               </a:ext>
             </a:extLst>
           </p:cNvPr>
@@ -1222,7 +1474,7 @@
           <p:cNvPr id="12" name="Grafik 11" hidden="1">
             <a:extLst>
               <a:ext uri="{FF2B5EF4-FFF2-40B4-BE49-F238E27FC236}">
-                <a16:creationId xmlns="" xmlns:a16="http://schemas.microsoft.com/office/drawing/2014/main" id="{CFC0D4A5-64CF-6D49-98B1-9FF6119E60EC}"/>
+                <a16:creationId xmlns:a16="http://schemas.microsoft.com/office/drawing/2014/main" xmlns="" id="{CFC0D4A5-64CF-6D49-98B1-9FF6119E60EC}"/>
               </a:ext>
             </a:extLst>
           </p:cNvPr>
@@ -1252,7 +1504,7 @@
           <p:cNvPr id="17" name="Grafik 16">
             <a:extLst>
               <a:ext uri="{FF2B5EF4-FFF2-40B4-BE49-F238E27FC236}">
-                <a16:creationId xmlns="" xmlns:a16="http://schemas.microsoft.com/office/drawing/2014/main" id="{22ECE872-F4EF-2A49-BA96-6065BC99D769}"/>
+                <a16:creationId xmlns:a16="http://schemas.microsoft.com/office/drawing/2014/main" xmlns="" id="{22ECE872-F4EF-2A49-BA96-6065BC99D769}"/>
               </a:ext>
             </a:extLst>
           </p:cNvPr>
@@ -1522,7 +1774,7 @@
           <p:cNvPr id="24" name="Bildplatzhalter 23">
             <a:extLst>
               <a:ext uri="{FF2B5EF4-FFF2-40B4-BE49-F238E27FC236}">
-                <a16:creationId xmlns="" xmlns:a16="http://schemas.microsoft.com/office/drawing/2014/main" id="{24A56C48-CA8D-D349-89CC-35C3A65DC4D5}"/>
+                <a16:creationId xmlns:a16="http://schemas.microsoft.com/office/drawing/2014/main" xmlns="" id="{24A56C48-CA8D-D349-89CC-35C3A65DC4D5}"/>
               </a:ext>
             </a:extLst>
           </p:cNvPr>
@@ -1836,7 +2088,7 @@
           <p:cNvPr id="6" name="Textplatzhalter 5">
             <a:extLst>
               <a:ext uri="{FF2B5EF4-FFF2-40B4-BE49-F238E27FC236}">
-                <a16:creationId xmlns="" xmlns:a16="http://schemas.microsoft.com/office/drawing/2014/main" id="{2E77FCEF-52F5-324B-A583-005ABCE0E622}"/>
+                <a16:creationId xmlns:a16="http://schemas.microsoft.com/office/drawing/2014/main" xmlns="" id="{2E77FCEF-52F5-324B-A583-005ABCE0E622}"/>
               </a:ext>
             </a:extLst>
           </p:cNvPr>
@@ -1874,7 +2126,7 @@
           <p:cNvPr id="13" name="Grafik 12">
             <a:extLst>
               <a:ext uri="{FF2B5EF4-FFF2-40B4-BE49-F238E27FC236}">
-                <a16:creationId xmlns="" xmlns:a16="http://schemas.microsoft.com/office/drawing/2014/main" id="{F84F96E3-FAED-E24A-9E01-BBA4824F0E34}"/>
+                <a16:creationId xmlns:a16="http://schemas.microsoft.com/office/drawing/2014/main" xmlns="" id="{F84F96E3-FAED-E24A-9E01-BBA4824F0E34}"/>
               </a:ext>
             </a:extLst>
           </p:cNvPr>
@@ -2045,7 +2297,7 @@
           <p:cNvPr id="6" name="Rechteck 5">
             <a:extLst>
               <a:ext uri="{FF2B5EF4-FFF2-40B4-BE49-F238E27FC236}">
-                <a16:creationId xmlns="" xmlns:a16="http://schemas.microsoft.com/office/drawing/2014/main" id="{2447D286-D9F9-E84F-9173-2C8D2D2068E1}"/>
+                <a16:creationId xmlns:a16="http://schemas.microsoft.com/office/drawing/2014/main" xmlns="" id="{2447D286-D9F9-E84F-9173-2C8D2D2068E1}"/>
               </a:ext>
             </a:extLst>
           </p:cNvPr>
@@ -2112,7 +2364,7 @@
           <p:cNvPr id="10" name="Grafik 9">
             <a:extLst>
               <a:ext uri="{FF2B5EF4-FFF2-40B4-BE49-F238E27FC236}">
-                <a16:creationId xmlns="" xmlns:a16="http://schemas.microsoft.com/office/drawing/2014/main" id="{E4DBCC79-CA26-C240-B119-9127A62CDBA8}"/>
+                <a16:creationId xmlns:a16="http://schemas.microsoft.com/office/drawing/2014/main" xmlns="" id="{E4DBCC79-CA26-C240-B119-9127A62CDBA8}"/>
               </a:ext>
             </a:extLst>
           </p:cNvPr>
@@ -2214,7 +2466,7 @@
           <p:cNvPr id="5" name="Rechteck 4">
             <a:extLst>
               <a:ext uri="{FF2B5EF4-FFF2-40B4-BE49-F238E27FC236}">
-                <a16:creationId xmlns="" xmlns:a16="http://schemas.microsoft.com/office/drawing/2014/main" id="{FD770378-5F2D-DE46-8D66-09007E946AD3}"/>
+                <a16:creationId xmlns:a16="http://schemas.microsoft.com/office/drawing/2014/main" xmlns="" id="{FD770378-5F2D-DE46-8D66-09007E946AD3}"/>
               </a:ext>
             </a:extLst>
           </p:cNvPr>
@@ -2278,7 +2530,7 @@
           <p:cNvPr id="4" name="Grafik 3">
             <a:extLst>
               <a:ext uri="{FF2B5EF4-FFF2-40B4-BE49-F238E27FC236}">
-                <a16:creationId xmlns="" xmlns:a16="http://schemas.microsoft.com/office/drawing/2014/main" id="{4FE30B28-5777-FC40-9C3F-81738D289A6A}"/>
+                <a16:creationId xmlns:a16="http://schemas.microsoft.com/office/drawing/2014/main" xmlns="" id="{4FE30B28-5777-FC40-9C3F-81738D289A6A}"/>
               </a:ext>
             </a:extLst>
           </p:cNvPr>
@@ -3428,7 +3680,7 @@
           <p:cNvPr id="13" name="Grafik 12">
             <a:extLst>
               <a:ext uri="{FF2B5EF4-FFF2-40B4-BE49-F238E27FC236}">
-                <a16:creationId xmlns="" xmlns:a16="http://schemas.microsoft.com/office/drawing/2014/main" id="{2DC3CACD-C7C8-274E-BCD4-043370996A48}"/>
+                <a16:creationId xmlns:a16="http://schemas.microsoft.com/office/drawing/2014/main" xmlns="" id="{2DC3CACD-C7C8-274E-BCD4-043370996A48}"/>
               </a:ext>
             </a:extLst>
           </p:cNvPr>
@@ -3967,11 +4219,7 @@
           <a:p>
             <a:r>
               <a:rPr lang="de-DE" dirty="0" smtClean="0"/>
-              <a:t>Betreuer: 	Sebastian </a:t>
-            </a:r>
-            <a:r>
-              <a:rPr lang="de-DE" dirty="0" smtClean="0"/>
-              <a:t>Heinze</a:t>
+              <a:t>Betreuer: 	Sebastian Heinze</a:t>
             </a:r>
           </a:p>
           <a:p>
@@ -4072,6 +4320,94 @@
       </p:grpSpPr>
       <p:sp>
         <p:nvSpPr>
+          <p:cNvPr id="2" name="Titel 1"/>
+          <p:cNvSpPr>
+            <a:spLocks noGrp="1"/>
+          </p:cNvSpPr>
+          <p:nvPr>
+            <p:ph type="title"/>
+          </p:nvPr>
+        </p:nvSpPr>
+        <p:spPr/>
+        <p:txBody>
+          <a:bodyPr/>
+          <a:lstStyle/>
+          <a:p>
+            <a:r>
+              <a:rPr lang="de-DE" dirty="0"/>
+              <a:t>Motivation, Problemstellung</a:t>
+            </a:r>
+          </a:p>
+        </p:txBody>
+      </p:sp>
+      <p:sp>
+        <p:nvSpPr>
+          <p:cNvPr id="3" name="Inhaltsplatzhalter 2"/>
+          <p:cNvSpPr>
+            <a:spLocks noGrp="1"/>
+          </p:cNvSpPr>
+          <p:nvPr>
+            <p:ph sz="quarter" idx="10"/>
+          </p:nvPr>
+        </p:nvSpPr>
+        <p:spPr/>
+        <p:txBody>
+          <a:bodyPr/>
+          <a:lstStyle/>
+          <a:p>
+            <a:pPr lvl="1"/>
+            <a:r>
+              <a:rPr lang="de-DE" dirty="0" err="1" smtClean="0"/>
+              <a:t>Ironies</a:t>
+            </a:r>
+            <a:r>
+              <a:rPr lang="de-DE" dirty="0" smtClean="0"/>
+              <a:t> </a:t>
+            </a:r>
+            <a:r>
+              <a:rPr lang="de-DE" dirty="0" err="1" smtClean="0"/>
+              <a:t>of</a:t>
+            </a:r>
+            <a:r>
+              <a:rPr lang="de-DE" dirty="0" smtClean="0"/>
+              <a:t> Automation</a:t>
+            </a:r>
+            <a:endParaRPr lang="de-DE" dirty="0"/>
+          </a:p>
+        </p:txBody>
+      </p:sp>
+    </p:spTree>
+    <p:extLst>
+      <p:ext uri="{BB962C8B-B14F-4D97-AF65-F5344CB8AC3E}">
+        <p14:creationId xmlns:p14="http://schemas.microsoft.com/office/powerpoint/2010/main" val="2665129629"/>
+      </p:ext>
+    </p:extLst>
+  </p:cSld>
+  <p:clrMapOvr>
+    <a:masterClrMapping/>
+  </p:clrMapOvr>
+</p:sld>
+</file>
+
+<file path=ppt/slides/slide3.xml><?xml version="1.0" encoding="utf-8"?>
+<p:sld xmlns:a="http://schemas.openxmlformats.org/drawingml/2006/main" xmlns:r="http://schemas.openxmlformats.org/officeDocument/2006/relationships" xmlns:p="http://schemas.openxmlformats.org/presentationml/2006/main">
+  <p:cSld>
+    <p:spTree>
+      <p:nvGrpSpPr>
+        <p:cNvPr id="1" name=""/>
+        <p:cNvGrpSpPr/>
+        <p:nvPr/>
+      </p:nvGrpSpPr>
+      <p:grpSpPr>
+        <a:xfrm>
+          <a:off x="0" y="0"/>
+          <a:ext cx="0" cy="0"/>
+          <a:chOff x="0" y="0"/>
+          <a:chExt cx="0" cy="0"/>
+        </a:xfrm>
+      </p:grpSpPr>
+      <p:sp>
+        <p:nvSpPr>
           <p:cNvPr id="7" name="Titel 6"/>
           <p:cNvSpPr>
             <a:spLocks noGrp="1"/>
@@ -4384,7 +4720,7 @@
         </p:blipFill>
         <p:spPr>
           <a:xfrm>
-            <a:off x="3477704" y="4103687"/>
+            <a:off x="3062945" y="4073568"/>
             <a:ext cx="914400" cy="914400"/>
           </a:xfrm>
           <a:prstGeom prst="rect">
@@ -5228,96 +5564,43 @@
           </a:p>
         </p:txBody>
       </p:sp>
+      <p:pic>
+        <p:nvPicPr>
+          <p:cNvPr id="37" name="Inhaltsplatzhalter 8"/>
+          <p:cNvPicPr>
+            <a:picLocks noChangeAspect="1"/>
+          </p:cNvPicPr>
+          <p:nvPr/>
+        </p:nvPicPr>
+        <p:blipFill>
+          <a:blip r:embed="rId13">
+            <a:extLst>
+              <a:ext uri="{28A0092B-C50C-407E-A947-70E740481C1C}">
+                <a14:useLocalDpi xmlns:a14="http://schemas.microsoft.com/office/drawing/2010/main" val="0"/>
+              </a:ext>
+            </a:extLst>
+          </a:blip>
+          <a:stretch>
+            <a:fillRect/>
+          </a:stretch>
+        </p:blipFill>
+        <p:spPr>
+          <a:xfrm>
+            <a:off x="4014607" y="4069652"/>
+            <a:ext cx="914400" cy="914400"/>
+          </a:xfrm>
+          <a:prstGeom prst="rect">
+            <a:avLst/>
+          </a:prstGeom>
+          <a:ln>
+            <a:noFill/>
+          </a:ln>
+        </p:spPr>
+      </p:pic>
     </p:spTree>
     <p:extLst>
       <p:ext uri="{BB962C8B-B14F-4D97-AF65-F5344CB8AC3E}">
         <p14:creationId xmlns:p14="http://schemas.microsoft.com/office/powerpoint/2010/main" val="3877688486"/>
-      </p:ext>
-    </p:extLst>
-  </p:cSld>
-  <p:clrMapOvr>
-    <a:masterClrMapping/>
-  </p:clrMapOvr>
-  <p:timing>
-    <p:tnLst>
-      <p:par>
-        <p:cTn id="1" dur="indefinite" restart="never" nodeType="tmRoot"/>
-      </p:par>
-    </p:tnLst>
-  </p:timing>
-</p:sld>
-</file>
-
-<file path=ppt/slides/slide3.xml><?xml version="1.0" encoding="utf-8"?>
-<p:sld xmlns:a="http://schemas.openxmlformats.org/drawingml/2006/main" xmlns:r="http://schemas.openxmlformats.org/officeDocument/2006/relationships" xmlns:p="http://schemas.openxmlformats.org/presentationml/2006/main">
-  <p:cSld>
-    <p:spTree>
-      <p:nvGrpSpPr>
-        <p:cNvPr id="1" name=""/>
-        <p:cNvGrpSpPr/>
-        <p:nvPr/>
-      </p:nvGrpSpPr>
-      <p:grpSpPr>
-        <a:xfrm>
-          <a:off x="0" y="0"/>
-          <a:ext cx="0" cy="0"/>
-          <a:chOff x="0" y="0"/>
-          <a:chExt cx="0" cy="0"/>
-        </a:xfrm>
-      </p:grpSpPr>
-      <p:sp>
-        <p:nvSpPr>
-          <p:cNvPr id="2" name="Titel 1"/>
-          <p:cNvSpPr>
-            <a:spLocks noGrp="1"/>
-          </p:cNvSpPr>
-          <p:nvPr>
-            <p:ph type="title"/>
-          </p:nvPr>
-        </p:nvSpPr>
-        <p:spPr/>
-        <p:txBody>
-          <a:bodyPr/>
-          <a:lstStyle/>
-          <a:p>
-            <a:r>
-              <a:rPr lang="de-DE" dirty="0" smtClean="0"/>
-              <a:t>Motivation, Problemstellung</a:t>
-            </a:r>
-            <a:endParaRPr lang="de-DE" dirty="0"/>
-          </a:p>
-        </p:txBody>
-      </p:sp>
-      <p:sp>
-        <p:nvSpPr>
-          <p:cNvPr id="3" name="Inhaltsplatzhalter 2"/>
-          <p:cNvSpPr>
-            <a:spLocks noGrp="1"/>
-          </p:cNvSpPr>
-          <p:nvPr>
-            <p:ph sz="quarter" idx="10"/>
-          </p:nvPr>
-        </p:nvSpPr>
-        <p:spPr/>
-        <p:txBody>
-          <a:bodyPr/>
-          <a:lstStyle/>
-          <a:p>
-            <a:pPr marL="71989" lvl="1" indent="0">
-              <a:buNone/>
-            </a:pPr>
-            <a:endParaRPr lang="de-DE" dirty="0"/>
-          </a:p>
-          <a:p>
-            <a:pPr lvl="4"/>
-            <a:endParaRPr lang="de-DE" dirty="0" smtClean="0"/>
-          </a:p>
-        </p:txBody>
-      </p:sp>
-    </p:spTree>
-    <p:extLst>
-      <p:ext uri="{BB962C8B-B14F-4D97-AF65-F5344CB8AC3E}">
-        <p14:creationId xmlns:p14="http://schemas.microsoft.com/office/powerpoint/2010/main" val="2644973490"/>
       </p:ext>
     </p:extLst>
   </p:cSld>
@@ -6292,8 +6575,8 @@
           </p:nvSpPr>
           <p:spPr>
             <a:xfrm>
-              <a:off x="1006825" y="3928682"/>
-              <a:ext cx="1264969" cy="457200"/>
+              <a:off x="1006826" y="3928682"/>
+              <a:ext cx="1093740" cy="457200"/>
             </a:xfrm>
             <a:prstGeom prst="rect">
               <a:avLst/>
@@ -6446,7 +6729,7 @@
           <p:spPr>
             <a:xfrm>
               <a:off x="1006825" y="3928682"/>
-              <a:ext cx="1264969" cy="457200"/>
+              <a:ext cx="1093741" cy="457200"/>
             </a:xfrm>
             <a:prstGeom prst="rect">
               <a:avLst/>
@@ -6795,7 +7078,7 @@
           </p:nvPr>
         </p:nvPicPr>
         <p:blipFill>
-          <a:blip r:embed="rId2">
+          <a:blip r:embed="rId3">
             <a:extLst>
               <a:ext uri="{28A0092B-C50C-407E-A947-70E740481C1C}">
                 <a14:useLocalDpi xmlns:a14="http://schemas.microsoft.com/office/drawing/2010/main" val="0"/>
@@ -6873,63 +7156,6 @@
           </a:p>
         </p:txBody>
       </p:sp>
-      <p:sp>
-        <p:nvSpPr>
-          <p:cNvPr id="3" name="Inhaltsplatzhalter 2"/>
-          <p:cNvSpPr>
-            <a:spLocks noGrp="1"/>
-          </p:cNvSpPr>
-          <p:nvPr>
-            <p:ph sz="quarter" idx="10"/>
-          </p:nvPr>
-        </p:nvSpPr>
-        <p:spPr/>
-        <p:txBody>
-          <a:bodyPr/>
-          <a:lstStyle/>
-          <a:p>
-            <a:pPr lvl="1"/>
-            <a:r>
-              <a:rPr lang="de-DE" dirty="0" smtClean="0"/>
-              <a:t>Sprache (Siri, Alexa)</a:t>
-            </a:r>
-          </a:p>
-          <a:p>
-            <a:pPr lvl="1"/>
-            <a:r>
-              <a:rPr lang="de-DE" dirty="0" smtClean="0"/>
-              <a:t>Text (</a:t>
-            </a:r>
-            <a:r>
-              <a:rPr lang="de-DE" dirty="0" err="1" smtClean="0"/>
-              <a:t>Chatbot</a:t>
-            </a:r>
-            <a:r>
-              <a:rPr lang="de-DE" dirty="0" smtClean="0"/>
-              <a:t>)</a:t>
-            </a:r>
-          </a:p>
-          <a:p>
-            <a:pPr lvl="1"/>
-            <a:r>
-              <a:rPr lang="de-DE" dirty="0" smtClean="0"/>
-              <a:t>Gesten (</a:t>
-            </a:r>
-            <a:r>
-              <a:rPr lang="de-DE" dirty="0" err="1" smtClean="0"/>
-              <a:t>Kinekt</a:t>
-            </a:r>
-            <a:r>
-              <a:rPr lang="de-DE" dirty="0" smtClean="0"/>
-              <a:t>)</a:t>
-            </a:r>
-          </a:p>
-          <a:p>
-            <a:pPr lvl="1"/>
-            <a:endParaRPr lang="de-DE" dirty="0"/>
-          </a:p>
-        </p:txBody>
-      </p:sp>
       <p:pic>
         <p:nvPicPr>
           <p:cNvPr id="4" name="Grafik 3"/>
@@ -6939,7 +7165,7 @@
           <p:nvPr/>
         </p:nvPicPr>
         <p:blipFill>
-          <a:blip r:embed="rId2">
+          <a:blip r:embed="rId3">
             <a:extLst>
               <a:ext uri="{28A0092B-C50C-407E-A947-70E740481C1C}">
                 <a14:useLocalDpi xmlns:a14="http://schemas.microsoft.com/office/drawing/2010/main" val="0"/>
@@ -6958,6 +7184,545 @@
           <a:prstGeom prst="rect">
             <a:avLst/>
           </a:prstGeom>
+        </p:spPr>
+      </p:pic>
+      <p:sp>
+        <p:nvSpPr>
+          <p:cNvPr id="11" name="Rechteck 10"/>
+          <p:cNvSpPr/>
+          <p:nvPr/>
+        </p:nvSpPr>
+        <p:spPr>
+          <a:xfrm>
+            <a:off x="859410" y="2137476"/>
+            <a:ext cx="1998000" cy="3732972"/>
+          </a:xfrm>
+          <a:prstGeom prst="rect">
+            <a:avLst/>
+          </a:prstGeom>
+          <a:solidFill>
+            <a:schemeClr val="bg1"/>
+          </a:solidFill>
+        </p:spPr>
+        <p:style>
+          <a:lnRef idx="2">
+            <a:schemeClr val="accent1">
+              <a:shade val="50000"/>
+            </a:schemeClr>
+          </a:lnRef>
+          <a:fillRef idx="1">
+            <a:schemeClr val="accent1"/>
+          </a:fillRef>
+          <a:effectRef idx="0">
+            <a:schemeClr val="accent1"/>
+          </a:effectRef>
+          <a:fontRef idx="minor">
+            <a:schemeClr val="lt1"/>
+          </a:fontRef>
+        </p:style>
+        <p:txBody>
+          <a:bodyPr tIns="72000" rtlCol="0" anchor="t"/>
+          <a:lstStyle/>
+          <a:p>
+            <a:r>
+              <a:rPr lang="de-DE" b="1" dirty="0" smtClean="0">
+                <a:solidFill>
+                  <a:schemeClr val="tx1"/>
+                </a:solidFill>
+              </a:rPr>
+              <a:t>Zeigegeräte</a:t>
+            </a:r>
+          </a:p>
+          <a:p>
+            <a:endParaRPr lang="de-DE" b="1" dirty="0">
+              <a:solidFill>
+                <a:schemeClr val="tx1"/>
+              </a:solidFill>
+            </a:endParaRPr>
+          </a:p>
+          <a:p>
+            <a:pPr marL="285750" indent="-285750">
+              <a:buFont typeface="Arial" panose="020B0604020202020204" pitchFamily="34" charset="0"/>
+              <a:buChar char="•"/>
+            </a:pPr>
+            <a:r>
+              <a:rPr lang="de-DE" dirty="0" smtClean="0">
+                <a:solidFill>
+                  <a:schemeClr val="tx1"/>
+                </a:solidFill>
+              </a:rPr>
+              <a:t>Maus</a:t>
+            </a:r>
+          </a:p>
+          <a:p>
+            <a:pPr marL="285750" indent="-285750">
+              <a:buFont typeface="Arial" panose="020B0604020202020204" pitchFamily="34" charset="0"/>
+              <a:buChar char="•"/>
+            </a:pPr>
+            <a:r>
+              <a:rPr lang="de-DE" dirty="0" smtClean="0">
+                <a:solidFill>
+                  <a:schemeClr val="tx1"/>
+                </a:solidFill>
+              </a:rPr>
+              <a:t>Trackball</a:t>
+            </a:r>
+          </a:p>
+          <a:p>
+            <a:pPr marL="285750" indent="-285750">
+              <a:buFont typeface="Arial" panose="020B0604020202020204" pitchFamily="34" charset="0"/>
+              <a:buChar char="•"/>
+            </a:pPr>
+            <a:r>
+              <a:rPr lang="de-DE" dirty="0" smtClean="0">
+                <a:solidFill>
+                  <a:schemeClr val="tx1"/>
+                </a:solidFill>
+              </a:rPr>
+              <a:t>Joystick</a:t>
+            </a:r>
+            <a:endParaRPr lang="de-DE" dirty="0">
+              <a:solidFill>
+                <a:schemeClr val="tx1"/>
+              </a:solidFill>
+            </a:endParaRPr>
+          </a:p>
+        </p:txBody>
+      </p:sp>
+      <p:sp>
+        <p:nvSpPr>
+          <p:cNvPr id="12" name="Rechteck 11"/>
+          <p:cNvSpPr/>
+          <p:nvPr/>
+        </p:nvSpPr>
+        <p:spPr>
+          <a:xfrm>
+            <a:off x="5165311" y="2133060"/>
+            <a:ext cx="1999488" cy="3737387"/>
+          </a:xfrm>
+          <a:prstGeom prst="rect">
+            <a:avLst/>
+          </a:prstGeom>
+          <a:solidFill>
+            <a:schemeClr val="bg1"/>
+          </a:solidFill>
+        </p:spPr>
+        <p:style>
+          <a:lnRef idx="2">
+            <a:schemeClr val="accent1">
+              <a:shade val="50000"/>
+            </a:schemeClr>
+          </a:lnRef>
+          <a:fillRef idx="1">
+            <a:schemeClr val="accent1"/>
+          </a:fillRef>
+          <a:effectRef idx="0">
+            <a:schemeClr val="accent1"/>
+          </a:effectRef>
+          <a:fontRef idx="minor">
+            <a:schemeClr val="lt1"/>
+          </a:fontRef>
+        </p:style>
+        <p:txBody>
+          <a:bodyPr rtlCol="0" anchor="t"/>
+          <a:lstStyle/>
+          <a:p>
+            <a:r>
+              <a:rPr lang="de-DE" b="1" dirty="0" smtClean="0">
+                <a:solidFill>
+                  <a:schemeClr val="tx1"/>
+                </a:solidFill>
+              </a:rPr>
+              <a:t>Touch</a:t>
+            </a:r>
+          </a:p>
+          <a:p>
+            <a:endParaRPr lang="de-DE" b="1" dirty="0">
+              <a:solidFill>
+                <a:schemeClr val="tx1"/>
+              </a:solidFill>
+            </a:endParaRPr>
+          </a:p>
+          <a:p>
+            <a:pPr marL="285750" indent="-285750">
+              <a:buFont typeface="Arial" panose="020B0604020202020204" pitchFamily="34" charset="0"/>
+              <a:buChar char="•"/>
+            </a:pPr>
+            <a:r>
+              <a:rPr lang="de-DE" dirty="0" smtClean="0">
+                <a:solidFill>
+                  <a:schemeClr val="tx1"/>
+                </a:solidFill>
+              </a:rPr>
+              <a:t>Berühren des Bildschirms</a:t>
+            </a:r>
+            <a:endParaRPr lang="de-DE" dirty="0">
+              <a:solidFill>
+                <a:schemeClr val="tx1"/>
+              </a:solidFill>
+            </a:endParaRPr>
+          </a:p>
+        </p:txBody>
+      </p:sp>
+      <p:sp>
+        <p:nvSpPr>
+          <p:cNvPr id="13" name="Rechteck 12"/>
+          <p:cNvSpPr/>
+          <p:nvPr/>
+        </p:nvSpPr>
+        <p:spPr>
+          <a:xfrm>
+            <a:off x="3011616" y="2137476"/>
+            <a:ext cx="1999488" cy="3732972"/>
+          </a:xfrm>
+          <a:prstGeom prst="rect">
+            <a:avLst/>
+          </a:prstGeom>
+          <a:solidFill>
+            <a:schemeClr val="bg1"/>
+          </a:solidFill>
+        </p:spPr>
+        <p:style>
+          <a:lnRef idx="2">
+            <a:schemeClr val="accent1">
+              <a:shade val="50000"/>
+            </a:schemeClr>
+          </a:lnRef>
+          <a:fillRef idx="1">
+            <a:schemeClr val="accent1"/>
+          </a:fillRef>
+          <a:effectRef idx="0">
+            <a:schemeClr val="accent1"/>
+          </a:effectRef>
+          <a:fontRef idx="minor">
+            <a:schemeClr val="lt1"/>
+          </a:fontRef>
+        </p:style>
+        <p:txBody>
+          <a:bodyPr rtlCol="0" anchor="t"/>
+          <a:lstStyle/>
+          <a:p>
+            <a:r>
+              <a:rPr lang="de-DE" b="1" dirty="0" smtClean="0">
+                <a:solidFill>
+                  <a:schemeClr val="tx1"/>
+                </a:solidFill>
+              </a:rPr>
+              <a:t>Text</a:t>
+            </a:r>
+          </a:p>
+          <a:p>
+            <a:endParaRPr lang="de-DE" b="1" dirty="0">
+              <a:solidFill>
+                <a:schemeClr val="tx1"/>
+              </a:solidFill>
+            </a:endParaRPr>
+          </a:p>
+          <a:p>
+            <a:pPr marL="285750" indent="-285750">
+              <a:buFont typeface="Arial" panose="020B0604020202020204" pitchFamily="34" charset="0"/>
+              <a:buChar char="•"/>
+            </a:pPr>
+            <a:r>
+              <a:rPr lang="de-DE" dirty="0" smtClean="0">
+                <a:solidFill>
+                  <a:schemeClr val="tx1"/>
+                </a:solidFill>
+              </a:rPr>
+              <a:t>Kommandos</a:t>
+            </a:r>
+          </a:p>
+          <a:p>
+            <a:pPr marL="285750" indent="-285750">
+              <a:buFont typeface="Arial" panose="020B0604020202020204" pitchFamily="34" charset="0"/>
+              <a:buChar char="•"/>
+            </a:pPr>
+            <a:r>
+              <a:rPr lang="de-DE" dirty="0" smtClean="0">
+                <a:solidFill>
+                  <a:schemeClr val="tx1"/>
+                </a:solidFill>
+              </a:rPr>
+              <a:t>Fließtext</a:t>
+            </a:r>
+            <a:endParaRPr lang="de-DE" dirty="0">
+              <a:solidFill>
+                <a:schemeClr val="tx1"/>
+              </a:solidFill>
+            </a:endParaRPr>
+          </a:p>
+        </p:txBody>
+      </p:sp>
+      <p:sp>
+        <p:nvSpPr>
+          <p:cNvPr id="14" name="Rechteck 13"/>
+          <p:cNvSpPr/>
+          <p:nvPr/>
+        </p:nvSpPr>
+        <p:spPr>
+          <a:xfrm>
+            <a:off x="7319006" y="2137476"/>
+            <a:ext cx="1999488" cy="3732972"/>
+          </a:xfrm>
+          <a:prstGeom prst="rect">
+            <a:avLst/>
+          </a:prstGeom>
+          <a:solidFill>
+            <a:schemeClr val="bg1"/>
+          </a:solidFill>
+        </p:spPr>
+        <p:style>
+          <a:lnRef idx="2">
+            <a:schemeClr val="accent1">
+              <a:shade val="50000"/>
+            </a:schemeClr>
+          </a:lnRef>
+          <a:fillRef idx="1">
+            <a:schemeClr val="accent1"/>
+          </a:fillRef>
+          <a:effectRef idx="0">
+            <a:schemeClr val="accent1"/>
+          </a:effectRef>
+          <a:fontRef idx="minor">
+            <a:schemeClr val="lt1"/>
+          </a:fontRef>
+        </p:style>
+        <p:txBody>
+          <a:bodyPr rtlCol="0" anchor="t"/>
+          <a:lstStyle/>
+          <a:p>
+            <a:r>
+              <a:rPr lang="de-DE" b="1" dirty="0" smtClean="0">
+                <a:solidFill>
+                  <a:schemeClr val="tx1"/>
+                </a:solidFill>
+              </a:rPr>
+              <a:t>Sprache</a:t>
+            </a:r>
+            <a:endParaRPr lang="de-DE" b="1" dirty="0">
+              <a:solidFill>
+                <a:schemeClr val="tx1"/>
+              </a:solidFill>
+            </a:endParaRPr>
+          </a:p>
+        </p:txBody>
+      </p:sp>
+      <p:sp>
+        <p:nvSpPr>
+          <p:cNvPr id="15" name="Rechteck 14"/>
+          <p:cNvSpPr/>
+          <p:nvPr/>
+        </p:nvSpPr>
+        <p:spPr>
+          <a:xfrm>
+            <a:off x="9472701" y="2137476"/>
+            <a:ext cx="1999488" cy="3732972"/>
+          </a:xfrm>
+          <a:prstGeom prst="rect">
+            <a:avLst/>
+          </a:prstGeom>
+          <a:solidFill>
+            <a:schemeClr val="bg1"/>
+          </a:solidFill>
+        </p:spPr>
+        <p:style>
+          <a:lnRef idx="2">
+            <a:schemeClr val="accent1">
+              <a:shade val="50000"/>
+            </a:schemeClr>
+          </a:lnRef>
+          <a:fillRef idx="1">
+            <a:schemeClr val="accent1"/>
+          </a:fillRef>
+          <a:effectRef idx="0">
+            <a:schemeClr val="accent1"/>
+          </a:effectRef>
+          <a:fontRef idx="minor">
+            <a:schemeClr val="lt1"/>
+          </a:fontRef>
+        </p:style>
+        <p:txBody>
+          <a:bodyPr rtlCol="0" anchor="t"/>
+          <a:lstStyle/>
+          <a:p>
+            <a:r>
+              <a:rPr lang="de-DE" b="1" dirty="0" smtClean="0">
+                <a:solidFill>
+                  <a:schemeClr val="tx1"/>
+                </a:solidFill>
+              </a:rPr>
+              <a:t>Gestik</a:t>
+            </a:r>
+            <a:endParaRPr lang="de-DE" b="1" dirty="0">
+              <a:solidFill>
+                <a:schemeClr val="tx1"/>
+              </a:solidFill>
+            </a:endParaRPr>
+          </a:p>
+        </p:txBody>
+      </p:sp>
+      <p:pic>
+        <p:nvPicPr>
+          <p:cNvPr id="9" name="Inhaltsplatzhalter 8"/>
+          <p:cNvPicPr>
+            <a:picLocks noGrp="1" noChangeAspect="1"/>
+          </p:cNvPicPr>
+          <p:nvPr>
+            <p:ph sz="quarter" idx="10"/>
+          </p:nvPr>
+        </p:nvPicPr>
+        <p:blipFill>
+          <a:blip r:embed="rId4">
+            <a:extLst>
+              <a:ext uri="{28A0092B-C50C-407E-A947-70E740481C1C}">
+                <a14:useLocalDpi xmlns:a14="http://schemas.microsoft.com/office/drawing/2010/main" val="0"/>
+              </a:ext>
+            </a:extLst>
+          </a:blip>
+          <a:stretch>
+            <a:fillRect/>
+          </a:stretch>
+        </p:blipFill>
+        <p:spPr>
+          <a:xfrm>
+            <a:off x="1400465" y="1218661"/>
+            <a:ext cx="914400" cy="914400"/>
+          </a:xfrm>
+          <a:solidFill>
+            <a:schemeClr val="bg1"/>
+          </a:solidFill>
+        </p:spPr>
+      </p:pic>
+      <p:pic>
+        <p:nvPicPr>
+          <p:cNvPr id="5" name="Grafik 4"/>
+          <p:cNvPicPr>
+            <a:picLocks noChangeAspect="1"/>
+          </p:cNvPicPr>
+          <p:nvPr/>
+        </p:nvPicPr>
+        <p:blipFill>
+          <a:blip r:embed="rId5">
+            <a:extLst>
+              <a:ext uri="{28A0092B-C50C-407E-A947-70E740481C1C}">
+                <a14:useLocalDpi xmlns:a14="http://schemas.microsoft.com/office/drawing/2010/main" val="0"/>
+              </a:ext>
+            </a:extLst>
+          </a:blip>
+          <a:stretch>
+            <a:fillRect/>
+          </a:stretch>
+        </p:blipFill>
+        <p:spPr>
+          <a:xfrm>
+            <a:off x="7861550" y="1223076"/>
+            <a:ext cx="914400" cy="914400"/>
+          </a:xfrm>
+          <a:prstGeom prst="rect">
+            <a:avLst/>
+          </a:prstGeom>
+          <a:solidFill>
+            <a:schemeClr val="bg1"/>
+          </a:solidFill>
+        </p:spPr>
+      </p:pic>
+      <p:pic>
+        <p:nvPicPr>
+          <p:cNvPr id="6" name="Grafik 5"/>
+          <p:cNvPicPr>
+            <a:picLocks noChangeAspect="1"/>
+          </p:cNvPicPr>
+          <p:nvPr/>
+        </p:nvPicPr>
+        <p:blipFill>
+          <a:blip r:embed="rId6">
+            <a:extLst>
+              <a:ext uri="{28A0092B-C50C-407E-A947-70E740481C1C}">
+                <a14:useLocalDpi xmlns:a14="http://schemas.microsoft.com/office/drawing/2010/main" val="0"/>
+              </a:ext>
+            </a:extLst>
+          </a:blip>
+          <a:stretch>
+            <a:fillRect/>
+          </a:stretch>
+        </p:blipFill>
+        <p:spPr>
+          <a:xfrm>
+            <a:off x="3554160" y="1223076"/>
+            <a:ext cx="914400" cy="914400"/>
+          </a:xfrm>
+          <a:prstGeom prst="rect">
+            <a:avLst/>
+          </a:prstGeom>
+          <a:solidFill>
+            <a:schemeClr val="bg1"/>
+          </a:solidFill>
+        </p:spPr>
+      </p:pic>
+      <p:pic>
+        <p:nvPicPr>
+          <p:cNvPr id="7" name="Grafik 6"/>
+          <p:cNvPicPr>
+            <a:picLocks noChangeAspect="1"/>
+          </p:cNvPicPr>
+          <p:nvPr/>
+        </p:nvPicPr>
+        <p:blipFill>
+          <a:blip r:embed="rId3">
+            <a:extLst>
+              <a:ext uri="{28A0092B-C50C-407E-A947-70E740481C1C}">
+                <a14:useLocalDpi xmlns:a14="http://schemas.microsoft.com/office/drawing/2010/main" val="0"/>
+              </a:ext>
+            </a:extLst>
+          </a:blip>
+          <a:stretch>
+            <a:fillRect/>
+          </a:stretch>
+        </p:blipFill>
+        <p:spPr>
+          <a:xfrm>
+            <a:off x="5707855" y="1142762"/>
+            <a:ext cx="914400" cy="914400"/>
+          </a:xfrm>
+          <a:prstGeom prst="rect">
+            <a:avLst/>
+          </a:prstGeom>
+          <a:solidFill>
+            <a:schemeClr val="bg1"/>
+          </a:solidFill>
+        </p:spPr>
+      </p:pic>
+      <p:pic>
+        <p:nvPicPr>
+          <p:cNvPr id="10" name="Grafik 9"/>
+          <p:cNvPicPr>
+            <a:picLocks noChangeAspect="1"/>
+          </p:cNvPicPr>
+          <p:nvPr/>
+        </p:nvPicPr>
+        <p:blipFill>
+          <a:blip r:embed="rId7">
+            <a:extLst>
+              <a:ext uri="{28A0092B-C50C-407E-A947-70E740481C1C}">
+                <a14:useLocalDpi xmlns:a14="http://schemas.microsoft.com/office/drawing/2010/main" val="0"/>
+              </a:ext>
+            </a:extLst>
+          </a:blip>
+          <a:stretch>
+            <a:fillRect/>
+          </a:stretch>
+        </p:blipFill>
+        <p:spPr>
+          <a:xfrm>
+            <a:off x="10015245" y="1218661"/>
+            <a:ext cx="914400" cy="914400"/>
+          </a:xfrm>
+          <a:prstGeom prst="rect">
+            <a:avLst/>
+          </a:prstGeom>
+          <a:solidFill>
+            <a:schemeClr val="bg1"/>
+          </a:solidFill>
         </p:spPr>
       </p:pic>
     </p:spTree>
@@ -7014,50 +7779,8 @@
           <a:p>
             <a:r>
               <a:rPr lang="de-DE" dirty="0" smtClean="0"/>
-              <a:t>Human </a:t>
+              <a:t>Informationen können dem Nutzer auf unterschiedliche Art bereitgestellt werden</a:t>
             </a:r>
-            <a:r>
-              <a:rPr lang="de-DE" dirty="0" err="1" smtClean="0"/>
-              <a:t>Machine</a:t>
-            </a:r>
-            <a:r>
-              <a:rPr lang="de-DE" dirty="0" smtClean="0"/>
-              <a:t> Interface</a:t>
-            </a:r>
-            <a:endParaRPr lang="de-DE" dirty="0"/>
-          </a:p>
-        </p:txBody>
-      </p:sp>
-      <p:sp>
-        <p:nvSpPr>
-          <p:cNvPr id="3" name="Inhaltsplatzhalter 2"/>
-          <p:cNvSpPr>
-            <a:spLocks noGrp="1"/>
-          </p:cNvSpPr>
-          <p:nvPr>
-            <p:ph sz="quarter" idx="10"/>
-          </p:nvPr>
-        </p:nvSpPr>
-        <p:spPr/>
-        <p:txBody>
-          <a:bodyPr/>
-          <a:lstStyle/>
-          <a:p>
-            <a:pPr lvl="1"/>
-            <a:r>
-              <a:rPr lang="de-DE" dirty="0" smtClean="0"/>
-              <a:t>AR-Brillen</a:t>
-            </a:r>
-          </a:p>
-          <a:p>
-            <a:pPr lvl="1"/>
-            <a:r>
-              <a:rPr lang="de-DE" dirty="0" smtClean="0"/>
-              <a:t>Tablets (Handhelds)</a:t>
-            </a:r>
-          </a:p>
-          <a:p>
-            <a:pPr lvl="1"/>
             <a:endParaRPr lang="de-DE" dirty="0"/>
           </a:p>
         </p:txBody>
@@ -7071,7 +7794,7 @@
           <p:nvPr/>
         </p:nvPicPr>
         <p:blipFill>
-          <a:blip r:embed="rId2">
+          <a:blip r:embed="rId3">
             <a:extLst>
               <a:ext uri="{28A0092B-C50C-407E-A947-70E740481C1C}">
                 <a14:useLocalDpi xmlns:a14="http://schemas.microsoft.com/office/drawing/2010/main" val="0"/>
@@ -7092,6 +7815,1058 @@
           </a:prstGeom>
         </p:spPr>
       </p:pic>
+      <p:pic>
+        <p:nvPicPr>
+          <p:cNvPr id="5" name="Grafik 4"/>
+          <p:cNvPicPr>
+            <a:picLocks noChangeAspect="1"/>
+          </p:cNvPicPr>
+          <p:nvPr/>
+        </p:nvPicPr>
+        <p:blipFill>
+          <a:blip r:embed="rId4">
+            <a:extLst>
+              <a:ext uri="{28A0092B-C50C-407E-A947-70E740481C1C}">
+                <a14:useLocalDpi xmlns:a14="http://schemas.microsoft.com/office/drawing/2010/main" val="0"/>
+              </a:ext>
+            </a:extLst>
+          </a:blip>
+          <a:stretch>
+            <a:fillRect/>
+          </a:stretch>
+        </p:blipFill>
+        <p:spPr>
+          <a:xfrm>
+            <a:off x="874712" y="1499917"/>
+            <a:ext cx="810070" cy="810070"/>
+          </a:xfrm>
+          <a:prstGeom prst="rect">
+            <a:avLst/>
+          </a:prstGeom>
+        </p:spPr>
+      </p:pic>
+      <p:pic>
+        <p:nvPicPr>
+          <p:cNvPr id="6" name="Grafik 5"/>
+          <p:cNvPicPr>
+            <a:picLocks noChangeAspect="1"/>
+          </p:cNvPicPr>
+          <p:nvPr/>
+        </p:nvPicPr>
+        <p:blipFill>
+          <a:blip r:embed="rId3">
+            <a:extLst>
+              <a:ext uri="{28A0092B-C50C-407E-A947-70E740481C1C}">
+                <a14:useLocalDpi xmlns:a14="http://schemas.microsoft.com/office/drawing/2010/main" val="0"/>
+              </a:ext>
+            </a:extLst>
+          </a:blip>
+          <a:stretch>
+            <a:fillRect/>
+          </a:stretch>
+        </p:blipFill>
+        <p:spPr>
+          <a:xfrm>
+            <a:off x="874712" y="3023965"/>
+            <a:ext cx="810070" cy="810070"/>
+          </a:xfrm>
+          <a:prstGeom prst="rect">
+            <a:avLst/>
+          </a:prstGeom>
+        </p:spPr>
+      </p:pic>
+      <p:pic>
+        <p:nvPicPr>
+          <p:cNvPr id="7" name="Grafik 6"/>
+          <p:cNvPicPr>
+            <a:picLocks noChangeAspect="1"/>
+          </p:cNvPicPr>
+          <p:nvPr/>
+        </p:nvPicPr>
+        <p:blipFill>
+          <a:blip r:embed="rId5">
+            <a:extLst>
+              <a:ext uri="{28A0092B-C50C-407E-A947-70E740481C1C}">
+                <a14:useLocalDpi xmlns:a14="http://schemas.microsoft.com/office/drawing/2010/main" val="0"/>
+              </a:ext>
+            </a:extLst>
+          </a:blip>
+          <a:stretch>
+            <a:fillRect/>
+          </a:stretch>
+        </p:blipFill>
+        <p:spPr>
+          <a:xfrm>
+            <a:off x="6410292" y="1499917"/>
+            <a:ext cx="810070" cy="810070"/>
+          </a:xfrm>
+          <a:prstGeom prst="rect">
+            <a:avLst/>
+          </a:prstGeom>
+        </p:spPr>
+      </p:pic>
+      <p:pic>
+        <p:nvPicPr>
+          <p:cNvPr id="8" name="Grafik 7"/>
+          <p:cNvPicPr>
+            <a:picLocks noChangeAspect="1"/>
+          </p:cNvPicPr>
+          <p:nvPr/>
+        </p:nvPicPr>
+        <p:blipFill>
+          <a:blip r:embed="rId6">
+            <a:extLst>
+              <a:ext uri="{28A0092B-C50C-407E-A947-70E740481C1C}">
+                <a14:useLocalDpi xmlns:a14="http://schemas.microsoft.com/office/drawing/2010/main" val="0"/>
+              </a:ext>
+            </a:extLst>
+          </a:blip>
+          <a:stretch>
+            <a:fillRect/>
+          </a:stretch>
+        </p:blipFill>
+        <p:spPr>
+          <a:xfrm>
+            <a:off x="6410292" y="2976340"/>
+            <a:ext cx="810070" cy="810070"/>
+          </a:xfrm>
+          <a:prstGeom prst="rect">
+            <a:avLst/>
+          </a:prstGeom>
+        </p:spPr>
+      </p:pic>
+      <p:pic>
+        <p:nvPicPr>
+          <p:cNvPr id="9" name="Grafik 8"/>
+          <p:cNvPicPr>
+            <a:picLocks noChangeAspect="1"/>
+          </p:cNvPicPr>
+          <p:nvPr/>
+        </p:nvPicPr>
+        <p:blipFill>
+          <a:blip r:embed="rId7">
+            <a:extLst>
+              <a:ext uri="{28A0092B-C50C-407E-A947-70E740481C1C}">
+                <a14:useLocalDpi xmlns:a14="http://schemas.microsoft.com/office/drawing/2010/main" val="0"/>
+              </a:ext>
+            </a:extLst>
+          </a:blip>
+          <a:stretch>
+            <a:fillRect/>
+          </a:stretch>
+        </p:blipFill>
+        <p:spPr>
+          <a:xfrm>
+            <a:off x="6410291" y="4451920"/>
+            <a:ext cx="810071" cy="810071"/>
+          </a:xfrm>
+          <a:prstGeom prst="rect">
+            <a:avLst/>
+          </a:prstGeom>
+        </p:spPr>
+      </p:pic>
+      <p:pic>
+        <p:nvPicPr>
+          <p:cNvPr id="10" name="Grafik 9"/>
+          <p:cNvPicPr>
+            <a:picLocks noChangeAspect="1"/>
+          </p:cNvPicPr>
+          <p:nvPr/>
+        </p:nvPicPr>
+        <p:blipFill>
+          <a:blip r:embed="rId8">
+            <a:extLst>
+              <a:ext uri="{28A0092B-C50C-407E-A947-70E740481C1C}">
+                <a14:useLocalDpi xmlns:a14="http://schemas.microsoft.com/office/drawing/2010/main" val="0"/>
+              </a:ext>
+            </a:extLst>
+          </a:blip>
+          <a:stretch>
+            <a:fillRect/>
+          </a:stretch>
+        </p:blipFill>
+        <p:spPr>
+          <a:xfrm>
+            <a:off x="874712" y="4451921"/>
+            <a:ext cx="810070" cy="810070"/>
+          </a:xfrm>
+          <a:prstGeom prst="rect">
+            <a:avLst/>
+          </a:prstGeom>
+          <a:solidFill>
+            <a:schemeClr val="bg1"/>
+          </a:solidFill>
+        </p:spPr>
+      </p:pic>
+      <p:grpSp>
+        <p:nvGrpSpPr>
+          <p:cNvPr id="19" name="Gruppieren 18"/>
+          <p:cNvGrpSpPr/>
+          <p:nvPr/>
+        </p:nvGrpSpPr>
+        <p:grpSpPr>
+          <a:xfrm>
+            <a:off x="1780032" y="1388605"/>
+            <a:ext cx="3730752" cy="1229417"/>
+            <a:chOff x="1780032" y="1330903"/>
+            <a:chExt cx="3730752" cy="1229417"/>
+          </a:xfrm>
+        </p:grpSpPr>
+        <p:sp>
+          <p:nvSpPr>
+            <p:cNvPr id="11" name="Rechteck 10"/>
+            <p:cNvSpPr/>
+            <p:nvPr/>
+          </p:nvSpPr>
+          <p:spPr>
+            <a:xfrm>
+              <a:off x="1780032" y="1499917"/>
+              <a:ext cx="3730752" cy="1060403"/>
+            </a:xfrm>
+            <a:prstGeom prst="rect">
+              <a:avLst/>
+            </a:prstGeom>
+            <a:solidFill>
+              <a:schemeClr val="bg1"/>
+            </a:solidFill>
+          </p:spPr>
+          <p:style>
+            <a:lnRef idx="2">
+              <a:schemeClr val="accent1">
+                <a:shade val="50000"/>
+              </a:schemeClr>
+            </a:lnRef>
+            <a:fillRef idx="1">
+              <a:schemeClr val="accent1"/>
+            </a:fillRef>
+            <a:effectRef idx="0">
+              <a:schemeClr val="accent1"/>
+            </a:effectRef>
+            <a:fontRef idx="minor">
+              <a:schemeClr val="lt1"/>
+            </a:fontRef>
+          </p:style>
+          <p:txBody>
+            <a:bodyPr tIns="180000" rtlCol="0" anchor="t"/>
+            <a:lstStyle/>
+            <a:p>
+              <a:pPr marL="285750" indent="-285750">
+                <a:buFont typeface="Arial" panose="020B0604020202020204" pitchFamily="34" charset="0"/>
+                <a:buChar char="•"/>
+              </a:pPr>
+              <a:r>
+                <a:rPr lang="de-DE" dirty="0" smtClean="0">
+                  <a:solidFill>
+                    <a:schemeClr val="tx1"/>
+                  </a:solidFill>
+                </a:rPr>
+                <a:t>Wenige, wichtige Informationen</a:t>
+              </a:r>
+            </a:p>
+            <a:p>
+              <a:pPr marL="285750" indent="-285750">
+                <a:buFont typeface="Arial" panose="020B0604020202020204" pitchFamily="34" charset="0"/>
+                <a:buChar char="•"/>
+              </a:pPr>
+              <a:r>
+                <a:rPr lang="de-DE" dirty="0" err="1" smtClean="0">
+                  <a:solidFill>
+                    <a:schemeClr val="tx1"/>
+                  </a:solidFill>
+                </a:rPr>
+                <a:t>Handsfree</a:t>
+              </a:r>
+              <a:endParaRPr lang="de-DE" dirty="0" smtClean="0">
+                <a:solidFill>
+                  <a:schemeClr val="tx1"/>
+                </a:solidFill>
+              </a:endParaRPr>
+            </a:p>
+            <a:p>
+              <a:pPr marL="285750" indent="-285750">
+                <a:buFont typeface="Arial" panose="020B0604020202020204" pitchFamily="34" charset="0"/>
+                <a:buChar char="•"/>
+              </a:pPr>
+              <a:r>
+                <a:rPr lang="de-DE" dirty="0" smtClean="0">
+                  <a:solidFill>
+                    <a:schemeClr val="tx1"/>
+                  </a:solidFill>
+                </a:rPr>
+                <a:t>Informationen über Nutzer</a:t>
+              </a:r>
+              <a:endParaRPr lang="de-DE" dirty="0">
+                <a:solidFill>
+                  <a:schemeClr val="tx1"/>
+                </a:solidFill>
+              </a:endParaRPr>
+            </a:p>
+          </p:txBody>
+        </p:sp>
+        <p:sp>
+          <p:nvSpPr>
+            <p:cNvPr id="18" name="Rechteck 17"/>
+            <p:cNvSpPr/>
+            <p:nvPr/>
+          </p:nvSpPr>
+          <p:spPr>
+            <a:xfrm>
+              <a:off x="1977040" y="1330903"/>
+              <a:ext cx="1516570" cy="338027"/>
+            </a:xfrm>
+            <a:prstGeom prst="rect">
+              <a:avLst/>
+            </a:prstGeom>
+            <a:solidFill>
+              <a:schemeClr val="bg1"/>
+            </a:solidFill>
+            <a:ln>
+              <a:noFill/>
+            </a:ln>
+          </p:spPr>
+          <p:style>
+            <a:lnRef idx="2">
+              <a:schemeClr val="accent1">
+                <a:shade val="50000"/>
+              </a:schemeClr>
+            </a:lnRef>
+            <a:fillRef idx="1">
+              <a:schemeClr val="accent1"/>
+            </a:fillRef>
+            <a:effectRef idx="0">
+              <a:schemeClr val="accent1"/>
+            </a:effectRef>
+            <a:fontRef idx="minor">
+              <a:schemeClr val="lt1"/>
+            </a:fontRef>
+          </p:style>
+          <p:txBody>
+            <a:bodyPr rtlCol="0" anchor="ctr"/>
+            <a:lstStyle/>
+            <a:p>
+              <a:r>
+                <a:rPr lang="de-DE" b="1" dirty="0" err="1" smtClean="0">
+                  <a:solidFill>
+                    <a:schemeClr val="tx1"/>
+                  </a:solidFill>
+                </a:rPr>
+                <a:t>Smartwatch</a:t>
+              </a:r>
+              <a:endParaRPr lang="de-DE" b="1" dirty="0">
+                <a:solidFill>
+                  <a:schemeClr val="tx1"/>
+                </a:solidFill>
+              </a:endParaRPr>
+            </a:p>
+          </p:txBody>
+        </p:sp>
+      </p:grpSp>
+      <p:grpSp>
+        <p:nvGrpSpPr>
+          <p:cNvPr id="20" name="Gruppieren 19"/>
+          <p:cNvGrpSpPr/>
+          <p:nvPr/>
+        </p:nvGrpSpPr>
+        <p:grpSpPr>
+          <a:xfrm>
+            <a:off x="1780634" y="2854951"/>
+            <a:ext cx="3730752" cy="1229417"/>
+            <a:chOff x="1780032" y="1330903"/>
+            <a:chExt cx="3730752" cy="1229417"/>
+          </a:xfrm>
+        </p:grpSpPr>
+        <p:sp>
+          <p:nvSpPr>
+            <p:cNvPr id="21" name="Rechteck 20"/>
+            <p:cNvSpPr/>
+            <p:nvPr/>
+          </p:nvSpPr>
+          <p:spPr>
+            <a:xfrm>
+              <a:off x="1780032" y="1499917"/>
+              <a:ext cx="3730752" cy="1060403"/>
+            </a:xfrm>
+            <a:prstGeom prst="rect">
+              <a:avLst/>
+            </a:prstGeom>
+            <a:solidFill>
+              <a:schemeClr val="bg1"/>
+            </a:solidFill>
+          </p:spPr>
+          <p:style>
+            <a:lnRef idx="2">
+              <a:schemeClr val="accent1">
+                <a:shade val="50000"/>
+              </a:schemeClr>
+            </a:lnRef>
+            <a:fillRef idx="1">
+              <a:schemeClr val="accent1"/>
+            </a:fillRef>
+            <a:effectRef idx="0">
+              <a:schemeClr val="accent1"/>
+            </a:effectRef>
+            <a:fontRef idx="minor">
+              <a:schemeClr val="lt1"/>
+            </a:fontRef>
+          </p:style>
+          <p:txBody>
+            <a:bodyPr tIns="180000" rtlCol="0" anchor="t"/>
+            <a:lstStyle/>
+            <a:p>
+              <a:pPr marL="285750" indent="-285750">
+                <a:buFont typeface="Arial" panose="020B0604020202020204" pitchFamily="34" charset="0"/>
+                <a:buChar char="•"/>
+              </a:pPr>
+              <a:r>
+                <a:rPr lang="de-DE" dirty="0" smtClean="0">
+                  <a:solidFill>
+                    <a:schemeClr val="tx1"/>
+                  </a:solidFill>
+                </a:rPr>
+                <a:t>Einfach zu Handhaben</a:t>
+              </a:r>
+            </a:p>
+            <a:p>
+              <a:pPr marL="285750" indent="-285750">
+                <a:buFont typeface="Arial" panose="020B0604020202020204" pitchFamily="34" charset="0"/>
+                <a:buChar char="•"/>
+              </a:pPr>
+              <a:r>
+                <a:rPr lang="de-DE" dirty="0" smtClean="0">
+                  <a:solidFill>
+                    <a:schemeClr val="tx1"/>
+                  </a:solidFill>
+                </a:rPr>
+                <a:t>Nur eine Hand frei</a:t>
+              </a:r>
+              <a:endParaRPr lang="de-DE" dirty="0">
+                <a:solidFill>
+                  <a:schemeClr val="tx1"/>
+                </a:solidFill>
+              </a:endParaRPr>
+            </a:p>
+          </p:txBody>
+        </p:sp>
+        <p:sp>
+          <p:nvSpPr>
+            <p:cNvPr id="22" name="Rechteck 21"/>
+            <p:cNvSpPr/>
+            <p:nvPr/>
+          </p:nvSpPr>
+          <p:spPr>
+            <a:xfrm>
+              <a:off x="1977040" y="1330903"/>
+              <a:ext cx="887478" cy="338027"/>
+            </a:xfrm>
+            <a:prstGeom prst="rect">
+              <a:avLst/>
+            </a:prstGeom>
+            <a:solidFill>
+              <a:schemeClr val="bg1"/>
+            </a:solidFill>
+            <a:ln>
+              <a:noFill/>
+            </a:ln>
+          </p:spPr>
+          <p:style>
+            <a:lnRef idx="2">
+              <a:schemeClr val="accent1">
+                <a:shade val="50000"/>
+              </a:schemeClr>
+            </a:lnRef>
+            <a:fillRef idx="1">
+              <a:schemeClr val="accent1"/>
+            </a:fillRef>
+            <a:effectRef idx="0">
+              <a:schemeClr val="accent1"/>
+            </a:effectRef>
+            <a:fontRef idx="minor">
+              <a:schemeClr val="lt1"/>
+            </a:fontRef>
+          </p:style>
+          <p:txBody>
+            <a:bodyPr rtlCol="0" anchor="ctr"/>
+            <a:lstStyle/>
+            <a:p>
+              <a:r>
+                <a:rPr lang="de-DE" b="1" dirty="0" smtClean="0">
+                  <a:solidFill>
+                    <a:schemeClr val="tx1"/>
+                  </a:solidFill>
+                </a:rPr>
+                <a:t>Tablet</a:t>
+              </a:r>
+              <a:endParaRPr lang="de-DE" b="1" dirty="0">
+                <a:solidFill>
+                  <a:schemeClr val="tx1"/>
+                </a:solidFill>
+              </a:endParaRPr>
+            </a:p>
+          </p:txBody>
+        </p:sp>
+      </p:grpSp>
+      <p:grpSp>
+        <p:nvGrpSpPr>
+          <p:cNvPr id="23" name="Gruppieren 22"/>
+          <p:cNvGrpSpPr/>
+          <p:nvPr/>
+        </p:nvGrpSpPr>
+        <p:grpSpPr>
+          <a:xfrm>
+            <a:off x="7319612" y="1388605"/>
+            <a:ext cx="3730752" cy="1229417"/>
+            <a:chOff x="1780032" y="1330903"/>
+            <a:chExt cx="3730752" cy="1229417"/>
+          </a:xfrm>
+        </p:grpSpPr>
+        <p:sp>
+          <p:nvSpPr>
+            <p:cNvPr id="24" name="Rechteck 23"/>
+            <p:cNvSpPr/>
+            <p:nvPr/>
+          </p:nvSpPr>
+          <p:spPr>
+            <a:xfrm>
+              <a:off x="1780032" y="1499917"/>
+              <a:ext cx="3730752" cy="1060403"/>
+            </a:xfrm>
+            <a:prstGeom prst="rect">
+              <a:avLst/>
+            </a:prstGeom>
+            <a:solidFill>
+              <a:schemeClr val="bg1"/>
+            </a:solidFill>
+          </p:spPr>
+          <p:style>
+            <a:lnRef idx="2">
+              <a:schemeClr val="accent1">
+                <a:shade val="50000"/>
+              </a:schemeClr>
+            </a:lnRef>
+            <a:fillRef idx="1">
+              <a:schemeClr val="accent1"/>
+            </a:fillRef>
+            <a:effectRef idx="0">
+              <a:schemeClr val="accent1"/>
+            </a:effectRef>
+            <a:fontRef idx="minor">
+              <a:schemeClr val="lt1"/>
+            </a:fontRef>
+          </p:style>
+          <p:txBody>
+            <a:bodyPr tIns="180000" rtlCol="0" anchor="t"/>
+            <a:lstStyle/>
+            <a:p>
+              <a:pPr marL="285750" indent="-285750">
+                <a:buFont typeface="Arial" panose="020B0604020202020204" pitchFamily="34" charset="0"/>
+                <a:buChar char="•"/>
+              </a:pPr>
+              <a:r>
+                <a:rPr lang="de-DE" dirty="0" smtClean="0">
+                  <a:solidFill>
+                    <a:schemeClr val="tx1"/>
+                  </a:solidFill>
+                </a:rPr>
+                <a:t>Bereitstellung von Informationen</a:t>
+              </a:r>
+            </a:p>
+            <a:p>
+              <a:pPr marL="285750" indent="-285750">
+                <a:buFont typeface="Arial" panose="020B0604020202020204" pitchFamily="34" charset="0"/>
+                <a:buChar char="•"/>
+              </a:pPr>
+              <a:r>
+                <a:rPr lang="de-DE" dirty="0" err="1" smtClean="0">
+                  <a:solidFill>
+                    <a:schemeClr val="tx1"/>
+                  </a:solidFill>
+                </a:rPr>
+                <a:t>Handsfree</a:t>
+              </a:r>
+              <a:endParaRPr lang="de-DE" dirty="0">
+                <a:solidFill>
+                  <a:schemeClr val="tx1"/>
+                </a:solidFill>
+              </a:endParaRPr>
+            </a:p>
+          </p:txBody>
+        </p:sp>
+        <p:sp>
+          <p:nvSpPr>
+            <p:cNvPr id="25" name="Rechteck 24"/>
+            <p:cNvSpPr/>
+            <p:nvPr/>
+          </p:nvSpPr>
+          <p:spPr>
+            <a:xfrm>
+              <a:off x="1977040" y="1330903"/>
+              <a:ext cx="1090932" cy="338027"/>
+            </a:xfrm>
+            <a:prstGeom prst="rect">
+              <a:avLst/>
+            </a:prstGeom>
+            <a:solidFill>
+              <a:schemeClr val="bg1"/>
+            </a:solidFill>
+            <a:ln>
+              <a:noFill/>
+            </a:ln>
+          </p:spPr>
+          <p:style>
+            <a:lnRef idx="2">
+              <a:schemeClr val="accent1">
+                <a:shade val="50000"/>
+              </a:schemeClr>
+            </a:lnRef>
+            <a:fillRef idx="1">
+              <a:schemeClr val="accent1"/>
+            </a:fillRef>
+            <a:effectRef idx="0">
+              <a:schemeClr val="accent1"/>
+            </a:effectRef>
+            <a:fontRef idx="minor">
+              <a:schemeClr val="lt1"/>
+            </a:fontRef>
+          </p:style>
+          <p:txBody>
+            <a:bodyPr rtlCol="0" anchor="ctr"/>
+            <a:lstStyle/>
+            <a:p>
+              <a:r>
+                <a:rPr lang="de-DE" b="1" dirty="0" smtClean="0">
+                  <a:solidFill>
+                    <a:schemeClr val="tx1"/>
+                  </a:solidFill>
+                </a:rPr>
+                <a:t>Headset</a:t>
+              </a:r>
+              <a:endParaRPr lang="de-DE" b="1" dirty="0">
+                <a:solidFill>
+                  <a:schemeClr val="tx1"/>
+                </a:solidFill>
+              </a:endParaRPr>
+            </a:p>
+          </p:txBody>
+        </p:sp>
+      </p:grpSp>
+      <p:grpSp>
+        <p:nvGrpSpPr>
+          <p:cNvPr id="26" name="Gruppieren 25"/>
+          <p:cNvGrpSpPr/>
+          <p:nvPr/>
+        </p:nvGrpSpPr>
+        <p:grpSpPr>
+          <a:xfrm>
+            <a:off x="7319612" y="2854951"/>
+            <a:ext cx="3730752" cy="1229417"/>
+            <a:chOff x="1780032" y="1330903"/>
+            <a:chExt cx="3730752" cy="1229417"/>
+          </a:xfrm>
+        </p:grpSpPr>
+        <p:sp>
+          <p:nvSpPr>
+            <p:cNvPr id="27" name="Rechteck 26"/>
+            <p:cNvSpPr/>
+            <p:nvPr/>
+          </p:nvSpPr>
+          <p:spPr>
+            <a:xfrm>
+              <a:off x="1780032" y="1499917"/>
+              <a:ext cx="3730752" cy="1060403"/>
+            </a:xfrm>
+            <a:prstGeom prst="rect">
+              <a:avLst/>
+            </a:prstGeom>
+            <a:solidFill>
+              <a:schemeClr val="bg1"/>
+            </a:solidFill>
+          </p:spPr>
+          <p:style>
+            <a:lnRef idx="2">
+              <a:schemeClr val="accent1">
+                <a:shade val="50000"/>
+              </a:schemeClr>
+            </a:lnRef>
+            <a:fillRef idx="1">
+              <a:schemeClr val="accent1"/>
+            </a:fillRef>
+            <a:effectRef idx="0">
+              <a:schemeClr val="accent1"/>
+            </a:effectRef>
+            <a:fontRef idx="minor">
+              <a:schemeClr val="lt1"/>
+            </a:fontRef>
+          </p:style>
+          <p:txBody>
+            <a:bodyPr tIns="180000" rtlCol="0" anchor="t"/>
+            <a:lstStyle/>
+            <a:p>
+              <a:pPr marL="285750" indent="-285750">
+                <a:buFont typeface="Arial" panose="020B0604020202020204" pitchFamily="34" charset="0"/>
+                <a:buChar char="•"/>
+              </a:pPr>
+              <a:r>
+                <a:rPr lang="de-DE" dirty="0" smtClean="0">
+                  <a:solidFill>
+                    <a:schemeClr val="tx1"/>
+                  </a:solidFill>
+                </a:rPr>
+                <a:t>Einblenden von Informationen in das Sichtfeld</a:t>
+              </a:r>
+              <a:endParaRPr lang="de-DE" dirty="0">
+                <a:solidFill>
+                  <a:schemeClr val="tx1"/>
+                </a:solidFill>
+              </a:endParaRPr>
+            </a:p>
+          </p:txBody>
+        </p:sp>
+        <p:sp>
+          <p:nvSpPr>
+            <p:cNvPr id="28" name="Rechteck 27"/>
+            <p:cNvSpPr/>
+            <p:nvPr/>
+          </p:nvSpPr>
+          <p:spPr>
+            <a:xfrm>
+              <a:off x="1977040" y="1330903"/>
+              <a:ext cx="1090932" cy="338027"/>
+            </a:xfrm>
+            <a:prstGeom prst="rect">
+              <a:avLst/>
+            </a:prstGeom>
+            <a:solidFill>
+              <a:schemeClr val="bg1"/>
+            </a:solidFill>
+            <a:ln>
+              <a:noFill/>
+            </a:ln>
+          </p:spPr>
+          <p:style>
+            <a:lnRef idx="2">
+              <a:schemeClr val="accent1">
+                <a:shade val="50000"/>
+              </a:schemeClr>
+            </a:lnRef>
+            <a:fillRef idx="1">
+              <a:schemeClr val="accent1"/>
+            </a:fillRef>
+            <a:effectRef idx="0">
+              <a:schemeClr val="accent1"/>
+            </a:effectRef>
+            <a:fontRef idx="minor">
+              <a:schemeClr val="lt1"/>
+            </a:fontRef>
+          </p:style>
+          <p:txBody>
+            <a:bodyPr rtlCol="0" anchor="ctr"/>
+            <a:lstStyle/>
+            <a:p>
+              <a:r>
+                <a:rPr lang="de-DE" b="1" dirty="0" smtClean="0">
+                  <a:solidFill>
+                    <a:schemeClr val="tx1"/>
+                  </a:solidFill>
+                </a:rPr>
+                <a:t>AR-Brille</a:t>
+              </a:r>
+              <a:endParaRPr lang="de-DE" b="1" dirty="0">
+                <a:solidFill>
+                  <a:schemeClr val="tx1"/>
+                </a:solidFill>
+              </a:endParaRPr>
+            </a:p>
+          </p:txBody>
+        </p:sp>
+      </p:grpSp>
+      <p:grpSp>
+        <p:nvGrpSpPr>
+          <p:cNvPr id="29" name="Gruppieren 28"/>
+          <p:cNvGrpSpPr/>
+          <p:nvPr/>
+        </p:nvGrpSpPr>
+        <p:grpSpPr>
+          <a:xfrm>
+            <a:off x="7319612" y="4282907"/>
+            <a:ext cx="3730752" cy="1229417"/>
+            <a:chOff x="1780032" y="1330903"/>
+            <a:chExt cx="3730752" cy="1229417"/>
+          </a:xfrm>
+        </p:grpSpPr>
+        <p:sp>
+          <p:nvSpPr>
+            <p:cNvPr id="30" name="Rechteck 29"/>
+            <p:cNvSpPr/>
+            <p:nvPr/>
+          </p:nvSpPr>
+          <p:spPr>
+            <a:xfrm>
+              <a:off x="1780032" y="1499917"/>
+              <a:ext cx="3730752" cy="1060403"/>
+            </a:xfrm>
+            <a:prstGeom prst="rect">
+              <a:avLst/>
+            </a:prstGeom>
+            <a:solidFill>
+              <a:schemeClr val="bg1"/>
+            </a:solidFill>
+          </p:spPr>
+          <p:style>
+            <a:lnRef idx="2">
+              <a:schemeClr val="accent1">
+                <a:shade val="50000"/>
+              </a:schemeClr>
+            </a:lnRef>
+            <a:fillRef idx="1">
+              <a:schemeClr val="accent1"/>
+            </a:fillRef>
+            <a:effectRef idx="0">
+              <a:schemeClr val="accent1"/>
+            </a:effectRef>
+            <a:fontRef idx="minor">
+              <a:schemeClr val="lt1"/>
+            </a:fontRef>
+          </p:style>
+          <p:txBody>
+            <a:bodyPr tIns="180000" rtlCol="0" anchor="t"/>
+            <a:lstStyle/>
+            <a:p>
+              <a:pPr marL="285750" indent="-285750">
+                <a:buFont typeface="Arial" panose="020B0604020202020204" pitchFamily="34" charset="0"/>
+                <a:buChar char="•"/>
+              </a:pPr>
+              <a:r>
+                <a:rPr lang="de-DE" dirty="0" smtClean="0">
+                  <a:solidFill>
+                    <a:schemeClr val="tx1"/>
+                  </a:solidFill>
+                </a:rPr>
+                <a:t>Beleuchtung des wichtigen Objekts</a:t>
+              </a:r>
+            </a:p>
+            <a:p>
+              <a:pPr marL="285750" indent="-285750">
+                <a:buFont typeface="Arial" panose="020B0604020202020204" pitchFamily="34" charset="0"/>
+                <a:buChar char="•"/>
+              </a:pPr>
+              <a:r>
+                <a:rPr lang="de-DE" dirty="0" smtClean="0">
+                  <a:solidFill>
+                    <a:schemeClr val="tx1"/>
+                  </a:solidFill>
+                </a:rPr>
+                <a:t>Fest verbaut</a:t>
+              </a:r>
+              <a:endParaRPr lang="de-DE" dirty="0">
+                <a:solidFill>
+                  <a:schemeClr val="tx1"/>
+                </a:solidFill>
+              </a:endParaRPr>
+            </a:p>
+          </p:txBody>
+        </p:sp>
+        <p:sp>
+          <p:nvSpPr>
+            <p:cNvPr id="31" name="Rechteck 30"/>
+            <p:cNvSpPr/>
+            <p:nvPr/>
+          </p:nvSpPr>
+          <p:spPr>
+            <a:xfrm>
+              <a:off x="1977040" y="1330903"/>
+              <a:ext cx="1249428" cy="338027"/>
+            </a:xfrm>
+            <a:prstGeom prst="rect">
+              <a:avLst/>
+            </a:prstGeom>
+            <a:solidFill>
+              <a:schemeClr val="bg1"/>
+            </a:solidFill>
+            <a:ln>
+              <a:noFill/>
+            </a:ln>
+          </p:spPr>
+          <p:style>
+            <a:lnRef idx="2">
+              <a:schemeClr val="accent1">
+                <a:shade val="50000"/>
+              </a:schemeClr>
+            </a:lnRef>
+            <a:fillRef idx="1">
+              <a:schemeClr val="accent1"/>
+            </a:fillRef>
+            <a:effectRef idx="0">
+              <a:schemeClr val="accent1"/>
+            </a:effectRef>
+            <a:fontRef idx="minor">
+              <a:schemeClr val="lt1"/>
+            </a:fontRef>
+          </p:style>
+          <p:txBody>
+            <a:bodyPr rtlCol="0" anchor="ctr"/>
+            <a:lstStyle/>
+            <a:p>
+              <a:r>
+                <a:rPr lang="de-DE" b="1" dirty="0" smtClean="0">
+                  <a:solidFill>
+                    <a:schemeClr val="tx1"/>
+                  </a:solidFill>
+                </a:rPr>
+                <a:t>Projektor</a:t>
+              </a:r>
+              <a:endParaRPr lang="de-DE" b="1" dirty="0">
+                <a:solidFill>
+                  <a:schemeClr val="tx1"/>
+                </a:solidFill>
+              </a:endParaRPr>
+            </a:p>
+          </p:txBody>
+        </p:sp>
+      </p:grpSp>
+      <p:grpSp>
+        <p:nvGrpSpPr>
+          <p:cNvPr id="32" name="Gruppieren 31"/>
+          <p:cNvGrpSpPr/>
+          <p:nvPr/>
+        </p:nvGrpSpPr>
+        <p:grpSpPr>
+          <a:xfrm>
+            <a:off x="1772363" y="4282907"/>
+            <a:ext cx="3730752" cy="1229417"/>
+            <a:chOff x="1780032" y="1330903"/>
+            <a:chExt cx="3730752" cy="1229417"/>
+          </a:xfrm>
+        </p:grpSpPr>
+        <p:sp>
+          <p:nvSpPr>
+            <p:cNvPr id="33" name="Rechteck 32"/>
+            <p:cNvSpPr/>
+            <p:nvPr/>
+          </p:nvSpPr>
+          <p:spPr>
+            <a:xfrm>
+              <a:off x="1780032" y="1499917"/>
+              <a:ext cx="3730752" cy="1060403"/>
+            </a:xfrm>
+            <a:prstGeom prst="rect">
+              <a:avLst/>
+            </a:prstGeom>
+            <a:solidFill>
+              <a:schemeClr val="bg1"/>
+            </a:solidFill>
+          </p:spPr>
+          <p:style>
+            <a:lnRef idx="2">
+              <a:schemeClr val="accent1">
+                <a:shade val="50000"/>
+              </a:schemeClr>
+            </a:lnRef>
+            <a:fillRef idx="1">
+              <a:schemeClr val="accent1"/>
+            </a:fillRef>
+            <a:effectRef idx="0">
+              <a:schemeClr val="accent1"/>
+            </a:effectRef>
+            <a:fontRef idx="minor">
+              <a:schemeClr val="lt1"/>
+            </a:fontRef>
+          </p:style>
+          <p:txBody>
+            <a:bodyPr tIns="180000" rtlCol="0" anchor="t"/>
+            <a:lstStyle/>
+            <a:p>
+              <a:pPr marL="285750" indent="-285750">
+                <a:buFont typeface="Arial" panose="020B0604020202020204" pitchFamily="34" charset="0"/>
+                <a:buChar char="•"/>
+              </a:pPr>
+              <a:r>
+                <a:rPr lang="de-DE" dirty="0" smtClean="0">
+                  <a:solidFill>
+                    <a:schemeClr val="tx1"/>
+                  </a:solidFill>
+                </a:rPr>
+                <a:t>Stationär</a:t>
+              </a:r>
+            </a:p>
+            <a:p>
+              <a:pPr marL="285750" indent="-285750">
+                <a:buFont typeface="Arial" panose="020B0604020202020204" pitchFamily="34" charset="0"/>
+                <a:buChar char="•"/>
+              </a:pPr>
+              <a:r>
+                <a:rPr lang="de-DE" dirty="0" smtClean="0">
+                  <a:solidFill>
+                    <a:schemeClr val="tx1"/>
+                  </a:solidFill>
+                </a:rPr>
+                <a:t>Großes Display</a:t>
+              </a:r>
+              <a:endParaRPr lang="de-DE" dirty="0">
+                <a:solidFill>
+                  <a:schemeClr val="tx1"/>
+                </a:solidFill>
+              </a:endParaRPr>
+            </a:p>
+          </p:txBody>
+        </p:sp>
+        <p:sp>
+          <p:nvSpPr>
+            <p:cNvPr id="34" name="Rechteck 33"/>
+            <p:cNvSpPr/>
+            <p:nvPr/>
+          </p:nvSpPr>
+          <p:spPr>
+            <a:xfrm>
+              <a:off x="1977040" y="1330903"/>
+              <a:ext cx="2053989" cy="338027"/>
+            </a:xfrm>
+            <a:prstGeom prst="rect">
+              <a:avLst/>
+            </a:prstGeom>
+            <a:solidFill>
+              <a:schemeClr val="bg1"/>
+            </a:solidFill>
+            <a:ln>
+              <a:noFill/>
+            </a:ln>
+          </p:spPr>
+          <p:style>
+            <a:lnRef idx="2">
+              <a:schemeClr val="accent1">
+                <a:shade val="50000"/>
+              </a:schemeClr>
+            </a:lnRef>
+            <a:fillRef idx="1">
+              <a:schemeClr val="accent1"/>
+            </a:fillRef>
+            <a:effectRef idx="0">
+              <a:schemeClr val="accent1"/>
+            </a:effectRef>
+            <a:fontRef idx="minor">
+              <a:schemeClr val="lt1"/>
+            </a:fontRef>
+          </p:style>
+          <p:txBody>
+            <a:bodyPr rtlCol="0" anchor="ctr"/>
+            <a:lstStyle/>
+            <a:p>
+              <a:r>
+                <a:rPr lang="de-DE" b="1" dirty="0" smtClean="0">
+                  <a:solidFill>
+                    <a:schemeClr val="tx1"/>
+                  </a:solidFill>
+                </a:rPr>
+                <a:t>Desktopcomputer</a:t>
+              </a:r>
+              <a:endParaRPr lang="de-DE" b="1" dirty="0">
+                <a:solidFill>
+                  <a:schemeClr val="tx1"/>
+                </a:solidFill>
+              </a:endParaRPr>
+            </a:p>
+          </p:txBody>
+        </p:sp>
+      </p:grpSp>
     </p:spTree>
     <p:extLst>
       <p:ext uri="{BB962C8B-B14F-4D97-AF65-F5344CB8AC3E}">

</xml_diff>

<commit_message>
Tabellen zum Thema Assistenz hinzugefügt (Latex)
</commit_message>
<xml_diff>
--- a/Dokumente/Präsentationen/2019-01-07_DA_Feldkemper_Aufgabenvorstellung.pptx
+++ b/Dokumente/Präsentationen/2019-01-07_DA_Feldkemper_Aufgabenvorstellung.pptx
@@ -25,14 +25,14 @@
   <p:notesSz cx="6858000" cy="9144000"/>
   <p:embeddedFontLst>
     <p:embeddedFont>
-      <p:font typeface="Open Sans" panose="020B0604020202020204" charset="0"/>
+      <p:font typeface="Calibri" panose="020F0502020204030204" pitchFamily="34" charset="0"/>
       <p:regular r:id="rId13"/>
       <p:bold r:id="rId14"/>
       <p:italic r:id="rId15"/>
       <p:boldItalic r:id="rId16"/>
     </p:embeddedFont>
     <p:embeddedFont>
-      <p:font typeface="Calibri" panose="020F0502020204030204" pitchFamily="34" charset="0"/>
+      <p:font typeface="Open Sans" panose="020B0606030504020204" pitchFamily="34" charset="0"/>
       <p:regular r:id="rId17"/>
       <p:bold r:id="rId18"/>
       <p:italic r:id="rId19"/>
@@ -253,7 +253,7 @@
           <a:p>
             <a:fld id="{C6AC6211-610F-44E5-BF19-D3CDF6EDD281}" type="datetimeFigureOut">
               <a:rPr lang="de-DE" smtClean="0"/>
-              <a:t>12.12.2018</a:t>
+              <a:t>12.12.18</a:t>
             </a:fld>
             <a:endParaRPr lang="de-DE"/>
           </a:p>
@@ -419,7 +419,7 @@
           <a:p>
             <a:fld id="{347435D3-23A6-45D3-8DFA-7317DC1E7A64}" type="datetimeFigureOut">
               <a:rPr lang="de-DE" smtClean="0"/>
-              <a:t>12.12.2018</a:t>
+              <a:t>12.12.18</a:t>
             </a:fld>
             <a:endParaRPr lang="de-DE"/>
           </a:p>
@@ -1045,7 +1045,7 @@
           <p:cNvPr id="15" name="Rechteck 14">
             <a:extLst>
               <a:ext uri="{FF2B5EF4-FFF2-40B4-BE49-F238E27FC236}">
-                <a16:creationId xmlns:a16="http://schemas.microsoft.com/office/drawing/2014/main" xmlns="" id="{F770C3AA-244C-A141-BC22-D074823F4293}"/>
+                <a16:creationId xmlns:a16="http://schemas.microsoft.com/office/drawing/2014/main" id="{F770C3AA-244C-A141-BC22-D074823F4293}"/>
               </a:ext>
             </a:extLst>
           </p:cNvPr>
@@ -1285,7 +1285,7 @@
           <p:cNvPr id="5" name="Grafik 4">
             <a:extLst>
               <a:ext uri="{FF2B5EF4-FFF2-40B4-BE49-F238E27FC236}">
-                <a16:creationId xmlns:a16="http://schemas.microsoft.com/office/drawing/2014/main" xmlns="" id="{C0F785FA-BB6E-6347-A8C6-9846216D4CBB}"/>
+                <a16:creationId xmlns:a16="http://schemas.microsoft.com/office/drawing/2014/main" id="{C0F785FA-BB6E-6347-A8C6-9846216D4CBB}"/>
               </a:ext>
             </a:extLst>
           </p:cNvPr>
@@ -1474,7 +1474,7 @@
           <p:cNvPr id="12" name="Grafik 11" hidden="1">
             <a:extLst>
               <a:ext uri="{FF2B5EF4-FFF2-40B4-BE49-F238E27FC236}">
-                <a16:creationId xmlns:a16="http://schemas.microsoft.com/office/drawing/2014/main" xmlns="" id="{CFC0D4A5-64CF-6D49-98B1-9FF6119E60EC}"/>
+                <a16:creationId xmlns:a16="http://schemas.microsoft.com/office/drawing/2014/main" id="{CFC0D4A5-64CF-6D49-98B1-9FF6119E60EC}"/>
               </a:ext>
             </a:extLst>
           </p:cNvPr>
@@ -1504,7 +1504,7 @@
           <p:cNvPr id="17" name="Grafik 16">
             <a:extLst>
               <a:ext uri="{FF2B5EF4-FFF2-40B4-BE49-F238E27FC236}">
-                <a16:creationId xmlns:a16="http://schemas.microsoft.com/office/drawing/2014/main" xmlns="" id="{22ECE872-F4EF-2A49-BA96-6065BC99D769}"/>
+                <a16:creationId xmlns:a16="http://schemas.microsoft.com/office/drawing/2014/main" id="{22ECE872-F4EF-2A49-BA96-6065BC99D769}"/>
               </a:ext>
             </a:extLst>
           </p:cNvPr>
@@ -1774,7 +1774,7 @@
           <p:cNvPr id="24" name="Bildplatzhalter 23">
             <a:extLst>
               <a:ext uri="{FF2B5EF4-FFF2-40B4-BE49-F238E27FC236}">
-                <a16:creationId xmlns:a16="http://schemas.microsoft.com/office/drawing/2014/main" xmlns="" id="{24A56C48-CA8D-D349-89CC-35C3A65DC4D5}"/>
+                <a16:creationId xmlns:a16="http://schemas.microsoft.com/office/drawing/2014/main" id="{24A56C48-CA8D-D349-89CC-35C3A65DC4D5}"/>
               </a:ext>
             </a:extLst>
           </p:cNvPr>
@@ -2088,7 +2088,7 @@
           <p:cNvPr id="6" name="Textplatzhalter 5">
             <a:extLst>
               <a:ext uri="{FF2B5EF4-FFF2-40B4-BE49-F238E27FC236}">
-                <a16:creationId xmlns:a16="http://schemas.microsoft.com/office/drawing/2014/main" xmlns="" id="{2E77FCEF-52F5-324B-A583-005ABCE0E622}"/>
+                <a16:creationId xmlns:a16="http://schemas.microsoft.com/office/drawing/2014/main" id="{2E77FCEF-52F5-324B-A583-005ABCE0E622}"/>
               </a:ext>
             </a:extLst>
           </p:cNvPr>
@@ -2126,7 +2126,7 @@
           <p:cNvPr id="13" name="Grafik 12">
             <a:extLst>
               <a:ext uri="{FF2B5EF4-FFF2-40B4-BE49-F238E27FC236}">
-                <a16:creationId xmlns:a16="http://schemas.microsoft.com/office/drawing/2014/main" xmlns="" id="{F84F96E3-FAED-E24A-9E01-BBA4824F0E34}"/>
+                <a16:creationId xmlns:a16="http://schemas.microsoft.com/office/drawing/2014/main" id="{F84F96E3-FAED-E24A-9E01-BBA4824F0E34}"/>
               </a:ext>
             </a:extLst>
           </p:cNvPr>
@@ -2297,7 +2297,7 @@
           <p:cNvPr id="6" name="Rechteck 5">
             <a:extLst>
               <a:ext uri="{FF2B5EF4-FFF2-40B4-BE49-F238E27FC236}">
-                <a16:creationId xmlns:a16="http://schemas.microsoft.com/office/drawing/2014/main" xmlns="" id="{2447D286-D9F9-E84F-9173-2C8D2D2068E1}"/>
+                <a16:creationId xmlns:a16="http://schemas.microsoft.com/office/drawing/2014/main" id="{2447D286-D9F9-E84F-9173-2C8D2D2068E1}"/>
               </a:ext>
             </a:extLst>
           </p:cNvPr>
@@ -2364,7 +2364,7 @@
           <p:cNvPr id="10" name="Grafik 9">
             <a:extLst>
               <a:ext uri="{FF2B5EF4-FFF2-40B4-BE49-F238E27FC236}">
-                <a16:creationId xmlns:a16="http://schemas.microsoft.com/office/drawing/2014/main" xmlns="" id="{E4DBCC79-CA26-C240-B119-9127A62CDBA8}"/>
+                <a16:creationId xmlns:a16="http://schemas.microsoft.com/office/drawing/2014/main" id="{E4DBCC79-CA26-C240-B119-9127A62CDBA8}"/>
               </a:ext>
             </a:extLst>
           </p:cNvPr>
@@ -2466,7 +2466,7 @@
           <p:cNvPr id="5" name="Rechteck 4">
             <a:extLst>
               <a:ext uri="{FF2B5EF4-FFF2-40B4-BE49-F238E27FC236}">
-                <a16:creationId xmlns:a16="http://schemas.microsoft.com/office/drawing/2014/main" xmlns="" id="{FD770378-5F2D-DE46-8D66-09007E946AD3}"/>
+                <a16:creationId xmlns:a16="http://schemas.microsoft.com/office/drawing/2014/main" id="{FD770378-5F2D-DE46-8D66-09007E946AD3}"/>
               </a:ext>
             </a:extLst>
           </p:cNvPr>
@@ -2530,7 +2530,7 @@
           <p:cNvPr id="4" name="Grafik 3">
             <a:extLst>
               <a:ext uri="{FF2B5EF4-FFF2-40B4-BE49-F238E27FC236}">
-                <a16:creationId xmlns:a16="http://schemas.microsoft.com/office/drawing/2014/main" xmlns="" id="{4FE30B28-5777-FC40-9C3F-81738D289A6A}"/>
+                <a16:creationId xmlns:a16="http://schemas.microsoft.com/office/drawing/2014/main" id="{4FE30B28-5777-FC40-9C3F-81738D289A6A}"/>
               </a:ext>
             </a:extLst>
           </p:cNvPr>
@@ -3340,7 +3340,7 @@
               <a:defRPr/>
             </a:pPr>
             <a:r>
-              <a:rPr lang="de-DE" sz="800" dirty="0" err="1" smtClean="0">
+              <a:rPr lang="de-DE" sz="800" dirty="0" err="1">
                 <a:solidFill>
                   <a:schemeClr val="bg2"/>
                 </a:solidFill>
@@ -3348,18 +3348,13 @@
               <a:t>Kollaborative</a:t>
             </a:r>
             <a:r>
-              <a:rPr lang="de-DE" sz="800" dirty="0" smtClean="0">
+              <a:rPr lang="de-DE" sz="800" dirty="0">
                 <a:solidFill>
                   <a:schemeClr val="bg2"/>
                 </a:solidFill>
               </a:rPr>
               <a:t> Problemlösung in modularen Anlagen mittels persönlicher digitaler Assistenz</a:t>
             </a:r>
-            <a:endParaRPr lang="de-DE" sz="800" dirty="0">
-              <a:solidFill>
-                <a:schemeClr val="bg2"/>
-              </a:solidFill>
-            </a:endParaRPr>
           </a:p>
           <a:p>
             <a:pPr algn="l"/>
@@ -3387,7 +3382,7 @@
           <a:p>
             <a:pPr algn="l"/>
             <a:r>
-              <a:rPr lang="de-DE" sz="800" baseline="0" dirty="0" err="1" smtClean="0">
+              <a:rPr lang="de-DE" sz="800" baseline="0" dirty="0" err="1">
                 <a:solidFill>
                   <a:schemeClr val="bg2"/>
                 </a:solidFill>
@@ -3398,7 +3393,7 @@
               <a:t>Aufgabenvorstelllung</a:t>
             </a:r>
             <a:r>
-              <a:rPr lang="de-DE" sz="800" baseline="0" dirty="0" smtClean="0">
+              <a:rPr lang="de-DE" sz="800" baseline="0" dirty="0">
                 <a:solidFill>
                   <a:schemeClr val="bg2"/>
                 </a:solidFill>
@@ -3409,7 +3404,7 @@
               <a:t> // </a:t>
             </a:r>
             <a:r>
-              <a:rPr lang="de-DE" sz="800" baseline="0" dirty="0" err="1" smtClean="0">
+              <a:rPr lang="de-DE" sz="800" baseline="0" dirty="0" err="1">
                 <a:solidFill>
                   <a:schemeClr val="bg2"/>
                 </a:solidFill>
@@ -3506,17 +3501,6 @@
               <a:tabLst/>
               <a:defRPr/>
             </a:pPr>
-            <a:r>
-              <a:rPr lang="de-DE" sz="800" dirty="0">
-                <a:solidFill>
-                  <a:schemeClr val="bg2"/>
-                </a:solidFill>
-                <a:latin typeface="Open Sans" panose="020B0606030504020204" pitchFamily="34" charset="0"/>
-                <a:ea typeface="Open Sans" panose="020B0606030504020204" pitchFamily="34" charset="0"/>
-                <a:cs typeface="Open Sans" panose="020B0606030504020204" pitchFamily="34" charset="0"/>
-              </a:rPr>
-              <a:t/>
-            </a:r>
             <a:br>
               <a:rPr lang="de-DE" sz="800" dirty="0">
                 <a:solidFill>
@@ -3680,7 +3664,7 @@
           <p:cNvPr id="13" name="Grafik 12">
             <a:extLst>
               <a:ext uri="{FF2B5EF4-FFF2-40B4-BE49-F238E27FC236}">
-                <a16:creationId xmlns:a16="http://schemas.microsoft.com/office/drawing/2014/main" xmlns="" id="{2DC3CACD-C7C8-274E-BCD4-043370996A48}"/>
+                <a16:creationId xmlns:a16="http://schemas.microsoft.com/office/drawing/2014/main" id="{2DC3CACD-C7C8-274E-BCD4-043370996A48}"/>
               </a:ext>
             </a:extLst>
           </p:cNvPr>
@@ -4208,26 +4192,25 @@
           <a:bodyPr/>
           <a:lstStyle/>
           <a:p>
-            <a:endParaRPr lang="de-DE" dirty="0" smtClean="0"/>
+            <a:endParaRPr lang="de-DE" dirty="0"/>
           </a:p>
           <a:p>
             <a:r>
-              <a:rPr lang="de-DE" dirty="0" smtClean="0"/>
+              <a:rPr lang="de-DE" dirty="0"/>
               <a:t>Bearbeiter:	Meret Feldkemper</a:t>
             </a:r>
           </a:p>
           <a:p>
             <a:r>
-              <a:rPr lang="de-DE" dirty="0" smtClean="0"/>
+              <a:rPr lang="de-DE" dirty="0"/>
               <a:t>Betreuer: 	Sebastian Heinze</a:t>
             </a:r>
           </a:p>
           <a:p>
             <a:r>
-              <a:rPr lang="de-DE" dirty="0" smtClean="0"/>
+              <a:rPr lang="de-DE" dirty="0"/>
               <a:t>Abgabe:		02.05.2019</a:t>
             </a:r>
-            <a:endParaRPr lang="de-DE" dirty="0"/>
           </a:p>
         </p:txBody>
       </p:sp>
@@ -4247,10 +4230,9 @@
           <a:lstStyle/>
           <a:p>
             <a:r>
-              <a:rPr lang="de-DE" dirty="0" smtClean="0"/>
+              <a:rPr lang="de-DE" dirty="0"/>
               <a:t>Aufgabenvorstellung Diplomarbeit</a:t>
             </a:r>
-            <a:endParaRPr lang="de-DE" dirty="0"/>
           </a:p>
         </p:txBody>
       </p:sp>
@@ -4270,14 +4252,13 @@
           <a:lstStyle/>
           <a:p>
             <a:r>
-              <a:rPr lang="de-DE" dirty="0" err="1" smtClean="0"/>
+              <a:rPr lang="de-DE" dirty="0" err="1"/>
               <a:t>Kollaborative</a:t>
             </a:r>
             <a:r>
-              <a:rPr lang="de-DE" dirty="0" smtClean="0"/>
+              <a:rPr lang="de-DE" dirty="0"/>
               <a:t> Problemlösung in modularen Anlagen mittels persönlicher digitaler Assistenz</a:t>
             </a:r>
-            <a:endParaRPr lang="de-DE" dirty="0"/>
           </a:p>
         </p:txBody>
       </p:sp>
@@ -4291,13 +4272,6 @@
   <p:clrMapOvr>
     <a:masterClrMapping/>
   </p:clrMapOvr>
-  <p:timing>
-    <p:tnLst>
-      <p:par>
-        <p:cTn id="1" dur="indefinite" restart="never" nodeType="tmRoot"/>
-      </p:par>
-    </p:tnLst>
-  </p:timing>
 </p:sld>
 </file>
 
@@ -4357,22 +4331,21 @@
           <a:p>
             <a:pPr lvl="1"/>
             <a:r>
-              <a:rPr lang="de-DE" dirty="0" err="1" smtClean="0"/>
+              <a:rPr lang="de-DE" dirty="0" err="1"/>
               <a:t>Ironies</a:t>
             </a:r>
             <a:r>
-              <a:rPr lang="de-DE" dirty="0" smtClean="0"/>
+              <a:rPr lang="de-DE" dirty="0"/>
               <a:t> </a:t>
             </a:r>
             <a:r>
-              <a:rPr lang="de-DE" dirty="0" err="1" smtClean="0"/>
+              <a:rPr lang="de-DE" dirty="0" err="1"/>
               <a:t>of</a:t>
             </a:r>
             <a:r>
-              <a:rPr lang="de-DE" dirty="0" smtClean="0"/>
+              <a:rPr lang="de-DE" dirty="0"/>
               <a:t> Automation</a:t>
             </a:r>
-            <a:endParaRPr lang="de-DE" dirty="0"/>
           </a:p>
         </p:txBody>
       </p:sp>
@@ -4422,10 +4395,9 @@
           <a:lstStyle/>
           <a:p>
             <a:r>
-              <a:rPr lang="de-DE" dirty="0" smtClean="0"/>
+              <a:rPr lang="de-DE" dirty="0"/>
               <a:t>Aufgabenstellung</a:t>
             </a:r>
-            <a:endParaRPr lang="de-DE" dirty="0"/>
           </a:p>
         </p:txBody>
       </p:sp>
@@ -4946,18 +4918,13 @@
           <a:p>
             <a:pPr algn="ctr"/>
             <a:r>
-              <a:rPr lang="de-DE" dirty="0" smtClean="0">
+              <a:rPr lang="de-DE" dirty="0">
                 <a:solidFill>
                   <a:schemeClr val="tx1"/>
                 </a:solidFill>
               </a:rPr>
               <a:t>Mensch</a:t>
             </a:r>
-            <a:endParaRPr lang="de-DE" dirty="0">
-              <a:solidFill>
-                <a:schemeClr val="tx1"/>
-              </a:solidFill>
-            </a:endParaRPr>
           </a:p>
         </p:txBody>
       </p:sp>
@@ -5001,18 +4968,13 @@
           <a:p>
             <a:pPr algn="ctr"/>
             <a:r>
-              <a:rPr lang="de-DE" dirty="0" smtClean="0">
+              <a:rPr lang="de-DE" dirty="0">
                 <a:solidFill>
                   <a:schemeClr val="tx1"/>
                 </a:solidFill>
               </a:rPr>
               <a:t>Interaktionsmechanik</a:t>
             </a:r>
-            <a:endParaRPr lang="de-DE" dirty="0">
-              <a:solidFill>
-                <a:schemeClr val="tx1"/>
-              </a:solidFill>
-            </a:endParaRPr>
           </a:p>
         </p:txBody>
       </p:sp>
@@ -5056,18 +5018,13 @@
           <a:p>
             <a:pPr algn="ctr"/>
             <a:r>
-              <a:rPr lang="de-DE" dirty="0" smtClean="0">
+              <a:rPr lang="de-DE" dirty="0">
                 <a:solidFill>
                   <a:schemeClr val="tx1"/>
                 </a:solidFill>
               </a:rPr>
               <a:t>Modulare Anlage</a:t>
             </a:r>
-            <a:endParaRPr lang="de-DE" dirty="0">
-              <a:solidFill>
-                <a:schemeClr val="tx1"/>
-              </a:solidFill>
-            </a:endParaRPr>
           </a:p>
         </p:txBody>
       </p:sp>
@@ -5111,18 +5068,13 @@
           <a:p>
             <a:pPr algn="ctr"/>
             <a:r>
-              <a:rPr lang="de-DE" dirty="0" smtClean="0">
+              <a:rPr lang="de-DE" dirty="0">
                 <a:solidFill>
                   <a:schemeClr val="tx1"/>
                 </a:solidFill>
               </a:rPr>
               <a:t>Digitaler Assistent</a:t>
             </a:r>
-            <a:endParaRPr lang="de-DE" dirty="0">
-              <a:solidFill>
-                <a:schemeClr val="tx1"/>
-              </a:solidFill>
-            </a:endParaRPr>
           </a:p>
         </p:txBody>
       </p:sp>
@@ -5166,18 +5118,13 @@
           <a:p>
             <a:pPr algn="ctr"/>
             <a:r>
-              <a:rPr lang="de-DE" dirty="0" smtClean="0">
+              <a:rPr lang="de-DE" dirty="0">
                 <a:solidFill>
                   <a:schemeClr val="tx1"/>
                 </a:solidFill>
               </a:rPr>
-              <a:t>HMI</a:t>
+              <a:t>Gerät</a:t>
             </a:r>
-            <a:endParaRPr lang="de-DE" dirty="0">
-              <a:solidFill>
-                <a:schemeClr val="tx1"/>
-              </a:solidFill>
-            </a:endParaRPr>
           </a:p>
         </p:txBody>
       </p:sp>
@@ -5549,18 +5496,13 @@
           <a:p>
             <a:pPr algn="ctr"/>
             <a:r>
-              <a:rPr lang="de-DE" sz="2000" b="1" dirty="0" smtClean="0">
+              <a:rPr lang="de-DE" sz="2000" b="1" dirty="0">
                 <a:solidFill>
                   <a:schemeClr val="accent6"/>
                 </a:solidFill>
               </a:rPr>
               <a:t>Assistenzsystem</a:t>
             </a:r>
-            <a:endParaRPr lang="de-DE" sz="2000" b="1" dirty="0">
-              <a:solidFill>
-                <a:schemeClr val="accent6"/>
-              </a:solidFill>
-            </a:endParaRPr>
           </a:p>
         </p:txBody>
       </p:sp>
@@ -5607,13 +5549,6 @@
   <p:clrMapOvr>
     <a:masterClrMapping/>
   </p:clrMapOvr>
-  <p:timing>
-    <p:tnLst>
-      <p:par>
-        <p:cTn id="1" dur="indefinite" restart="never" nodeType="tmRoot"/>
-      </p:par>
-    </p:tnLst>
-  </p:timing>
 </p:sld>
 </file>
 
@@ -5650,10 +5585,9 @@
           <a:lstStyle/>
           <a:p>
             <a:r>
-              <a:rPr lang="de-DE" dirty="0" smtClean="0"/>
+              <a:rPr lang="de-DE" dirty="0"/>
               <a:t>Modulare Anlagen</a:t>
             </a:r>
-            <a:endParaRPr lang="de-DE" dirty="0"/>
           </a:p>
         </p:txBody>
       </p:sp>
@@ -5674,28 +5608,28 @@
           <a:p>
             <a:pPr lvl="1"/>
             <a:r>
-              <a:rPr lang="de-DE" dirty="0" smtClean="0"/>
+              <a:rPr lang="de-DE" dirty="0"/>
               <a:t>Flexibel</a:t>
             </a:r>
           </a:p>
           <a:p>
             <a:pPr lvl="1"/>
             <a:r>
-              <a:rPr lang="de-DE" dirty="0" smtClean="0"/>
+              <a:rPr lang="de-DE" dirty="0"/>
               <a:t>Anlage verändert sich schneller</a:t>
             </a:r>
           </a:p>
           <a:p>
             <a:pPr lvl="1"/>
             <a:r>
-              <a:rPr lang="de-DE" dirty="0" smtClean="0"/>
+              <a:rPr lang="de-DE" dirty="0"/>
               <a:t>Anlage wird anders betrieben, als herkömmliche Anlagen</a:t>
             </a:r>
           </a:p>
           <a:p>
             <a:pPr lvl="1"/>
             <a:r>
-              <a:rPr lang="de-DE" dirty="0" smtClean="0"/>
+              <a:rPr lang="de-DE" dirty="0"/>
               <a:t>Serviceorientierte Steuerung</a:t>
             </a:r>
           </a:p>
@@ -5948,13 +5882,6 @@
   <p:clrMapOvr>
     <a:masterClrMapping/>
   </p:clrMapOvr>
-  <p:timing>
-    <p:tnLst>
-      <p:par>
-        <p:cTn id="1" dur="indefinite" restart="never" nodeType="tmRoot"/>
-      </p:par>
-    </p:tnLst>
-  </p:timing>
 </p:sld>
 </file>
 
@@ -5991,10 +5918,9 @@
           <a:lstStyle/>
           <a:p>
             <a:r>
-              <a:rPr lang="de-DE" dirty="0" smtClean="0"/>
+              <a:rPr lang="de-DE" dirty="0"/>
               <a:t>Menschen lösen Probleme unterschiedlich</a:t>
             </a:r>
-            <a:endParaRPr lang="de-DE" dirty="0"/>
           </a:p>
         </p:txBody>
       </p:sp>
@@ -6041,18 +5967,13 @@
           <a:p>
             <a:pPr algn="ctr"/>
             <a:r>
-              <a:rPr lang="de-DE" b="1" dirty="0" smtClean="0">
+              <a:rPr lang="de-DE" b="1" dirty="0">
                 <a:solidFill>
                   <a:schemeClr val="accent4"/>
                 </a:solidFill>
               </a:rPr>
               <a:t>Veränderungsorientierung</a:t>
             </a:r>
-            <a:endParaRPr lang="de-DE" b="1" dirty="0">
-              <a:solidFill>
-                <a:schemeClr val="accent4"/>
-              </a:solidFill>
-            </a:endParaRPr>
           </a:p>
         </p:txBody>
       </p:sp>
@@ -6099,18 +6020,13 @@
           <a:p>
             <a:pPr algn="ctr"/>
             <a:r>
-              <a:rPr lang="de-DE" b="1" dirty="0" smtClean="0">
+              <a:rPr lang="de-DE" b="1" dirty="0">
                 <a:solidFill>
                   <a:schemeClr val="accent4"/>
                 </a:solidFill>
               </a:rPr>
               <a:t>Verarbeitungsstil</a:t>
             </a:r>
-            <a:endParaRPr lang="de-DE" b="1" dirty="0">
-              <a:solidFill>
-                <a:schemeClr val="accent4"/>
-              </a:solidFill>
-            </a:endParaRPr>
           </a:p>
         </p:txBody>
       </p:sp>
@@ -6157,18 +6073,13 @@
           <a:p>
             <a:pPr algn="ctr"/>
             <a:r>
-              <a:rPr lang="de-DE" b="1" dirty="0" smtClean="0">
+              <a:rPr lang="de-DE" b="1" dirty="0">
                 <a:solidFill>
                   <a:schemeClr val="accent4"/>
                 </a:solidFill>
               </a:rPr>
               <a:t>Entscheidungsfokus</a:t>
             </a:r>
-            <a:endParaRPr lang="de-DE" b="1" dirty="0">
-              <a:solidFill>
-                <a:schemeClr val="accent4"/>
-              </a:solidFill>
-            </a:endParaRPr>
           </a:p>
         </p:txBody>
       </p:sp>
@@ -6229,7 +6140,7 @@
                 <a:buChar char="•"/>
               </a:pPr>
               <a:r>
-                <a:rPr lang="de-DE" sz="1600" dirty="0" smtClean="0">
+                <a:rPr lang="de-DE" sz="1600" dirty="0">
                   <a:solidFill>
                     <a:schemeClr val="tx1"/>
                   </a:solidFill>
@@ -6243,7 +6154,7 @@
                 <a:buChar char="•"/>
               </a:pPr>
               <a:r>
-                <a:rPr lang="de-DE" sz="1600" dirty="0" smtClean="0">
+                <a:rPr lang="de-DE" sz="1600" dirty="0">
                   <a:solidFill>
                     <a:schemeClr val="tx1"/>
                   </a:solidFill>
@@ -6256,7 +6167,7 @@
                 <a:buFont typeface="Arial" panose="020B0604020202020204" pitchFamily="34" charset="0"/>
                 <a:buChar char="•"/>
               </a:pPr>
-              <a:endParaRPr lang="de-DE" sz="1600" dirty="0" smtClean="0">
+              <a:endParaRPr lang="de-DE" sz="1600" dirty="0">
                 <a:solidFill>
                   <a:schemeClr val="tx1"/>
                 </a:solidFill>
@@ -6306,18 +6217,13 @@
             <a:lstStyle/>
             <a:p>
               <a:r>
-                <a:rPr lang="de-DE" b="1" dirty="0" smtClean="0">
+                <a:rPr lang="de-DE" b="1" dirty="0">
                   <a:solidFill>
                     <a:schemeClr val="tx1"/>
                   </a:solidFill>
                 </a:rPr>
                 <a:t>Explorer</a:t>
               </a:r>
-              <a:endParaRPr lang="de-DE" b="1" dirty="0">
-                <a:solidFill>
-                  <a:schemeClr val="tx1"/>
-                </a:solidFill>
-              </a:endParaRPr>
             </a:p>
           </p:txBody>
         </p:sp>
@@ -6379,7 +6285,7 @@
                 <a:buChar char="•"/>
               </a:pPr>
               <a:r>
-                <a:rPr lang="de-DE" sz="1600" dirty="0" smtClean="0">
+                <a:rPr lang="de-DE" sz="1600" dirty="0">
                   <a:solidFill>
                     <a:schemeClr val="tx1"/>
                   </a:solidFill>
@@ -6393,7 +6299,7 @@
                 <a:buChar char="•"/>
               </a:pPr>
               <a:r>
-                <a:rPr lang="de-DE" sz="1600" dirty="0" smtClean="0">
+                <a:rPr lang="de-DE" sz="1600" dirty="0">
                   <a:solidFill>
                     <a:schemeClr val="tx1"/>
                   </a:solidFill>
@@ -6407,7 +6313,7 @@
                 <a:buChar char="•"/>
               </a:pPr>
               <a:r>
-                <a:rPr lang="de-DE" sz="1600" dirty="0" smtClean="0">
+                <a:rPr lang="de-DE" sz="1600" dirty="0">
                   <a:solidFill>
                     <a:schemeClr val="tx1"/>
                   </a:solidFill>
@@ -6420,7 +6326,7 @@
                 <a:buFont typeface="Arial" panose="020B0604020202020204" pitchFamily="34" charset="0"/>
                 <a:buChar char="•"/>
               </a:pPr>
-              <a:endParaRPr lang="de-DE" sz="1600" dirty="0" smtClean="0">
+              <a:endParaRPr lang="de-DE" sz="1600" dirty="0">
                 <a:solidFill>
                   <a:schemeClr val="tx1"/>
                 </a:solidFill>
@@ -6470,18 +6376,13 @@
             <a:lstStyle/>
             <a:p>
               <a:r>
-                <a:rPr lang="de-DE" b="1" dirty="0" smtClean="0">
+                <a:rPr lang="de-DE" b="1" dirty="0">
                   <a:solidFill>
                     <a:schemeClr val="tx1"/>
                   </a:solidFill>
                 </a:rPr>
                 <a:t>Developer</a:t>
               </a:r>
-              <a:endParaRPr lang="de-DE" b="1" dirty="0">
-                <a:solidFill>
-                  <a:schemeClr val="tx1"/>
-                </a:solidFill>
-              </a:endParaRPr>
             </a:p>
           </p:txBody>
         </p:sp>
@@ -6543,7 +6444,7 @@
                 <a:buChar char="•"/>
               </a:pPr>
               <a:r>
-                <a:rPr lang="de-DE" sz="1600" dirty="0" smtClean="0">
+                <a:rPr lang="de-DE" sz="1600" dirty="0">
                   <a:solidFill>
                     <a:schemeClr val="tx1"/>
                   </a:solidFill>
@@ -6557,7 +6458,7 @@
                 <a:buChar char="•"/>
               </a:pPr>
               <a:r>
-                <a:rPr lang="de-DE" sz="1600" dirty="0" smtClean="0">
+                <a:rPr lang="de-DE" sz="1600" dirty="0">
                   <a:solidFill>
                     <a:schemeClr val="tx1"/>
                   </a:solidFill>
@@ -6609,7 +6510,7 @@
             <a:lstStyle/>
             <a:p>
               <a:r>
-                <a:rPr lang="de-DE" b="1" dirty="0" err="1" smtClean="0">
+                <a:rPr lang="de-DE" b="1" dirty="0" err="1">
                   <a:solidFill>
                     <a:schemeClr val="tx1"/>
                   </a:solidFill>
@@ -6682,7 +6583,7 @@
                 <a:buChar char="•"/>
               </a:pPr>
               <a:r>
-                <a:rPr lang="de-DE" sz="1600" dirty="0" smtClean="0">
+                <a:rPr lang="de-DE" sz="1600" dirty="0">
                   <a:solidFill>
                     <a:schemeClr val="tx1"/>
                   </a:solidFill>
@@ -6696,7 +6597,7 @@
                 <a:buChar char="•"/>
               </a:pPr>
               <a:r>
-                <a:rPr lang="de-DE" sz="1600" dirty="0" smtClean="0">
+                <a:rPr lang="de-DE" sz="1600" dirty="0">
                   <a:solidFill>
                     <a:schemeClr val="tx1"/>
                   </a:solidFill>
@@ -6710,7 +6611,7 @@
                 <a:buChar char="•"/>
               </a:pPr>
               <a:r>
-                <a:rPr lang="de-DE" sz="1600" dirty="0" smtClean="0">
+                <a:rPr lang="de-DE" sz="1600" dirty="0">
                   <a:solidFill>
                     <a:schemeClr val="tx1"/>
                   </a:solidFill>
@@ -6762,18 +6663,13 @@
             <a:lstStyle/>
             <a:p>
               <a:r>
-                <a:rPr lang="de-DE" b="1" dirty="0" smtClean="0">
+                <a:rPr lang="de-DE" b="1" dirty="0">
                   <a:solidFill>
                     <a:schemeClr val="tx1"/>
                   </a:solidFill>
                 </a:rPr>
                 <a:t>Internal</a:t>
               </a:r>
-              <a:endParaRPr lang="de-DE" b="1" dirty="0">
-                <a:solidFill>
-                  <a:schemeClr val="tx1"/>
-                </a:solidFill>
-              </a:endParaRPr>
             </a:p>
           </p:txBody>
         </p:sp>
@@ -6835,7 +6731,7 @@
                 <a:buChar char="•"/>
               </a:pPr>
               <a:r>
-                <a:rPr lang="de-DE" sz="1600" dirty="0" smtClean="0">
+                <a:rPr lang="de-DE" sz="1600" dirty="0">
                   <a:solidFill>
                     <a:schemeClr val="tx1"/>
                   </a:solidFill>
@@ -6849,7 +6745,7 @@
                 <a:buChar char="•"/>
               </a:pPr>
               <a:r>
-                <a:rPr lang="de-DE" sz="1600" dirty="0" smtClean="0">
+                <a:rPr lang="de-DE" sz="1600" dirty="0">
                   <a:solidFill>
                     <a:schemeClr val="tx1"/>
                   </a:solidFill>
@@ -6862,7 +6758,7 @@
                 <a:buFont typeface="Arial" panose="020B0604020202020204" pitchFamily="34" charset="0"/>
                 <a:buChar char="•"/>
               </a:pPr>
-              <a:endParaRPr lang="de-DE" sz="1600" dirty="0" smtClean="0">
+              <a:endParaRPr lang="de-DE" sz="1600" dirty="0">
                 <a:solidFill>
                   <a:schemeClr val="tx1"/>
                 </a:solidFill>
@@ -6912,18 +6808,13 @@
             <a:lstStyle/>
             <a:p>
               <a:r>
-                <a:rPr lang="de-DE" b="1" dirty="0" smtClean="0">
+                <a:rPr lang="de-DE" b="1" dirty="0">
                   <a:solidFill>
                     <a:schemeClr val="tx1"/>
                   </a:solidFill>
                 </a:rPr>
                 <a:t>People</a:t>
               </a:r>
-              <a:endParaRPr lang="de-DE" b="1" dirty="0">
-                <a:solidFill>
-                  <a:schemeClr val="tx1"/>
-                </a:solidFill>
-              </a:endParaRPr>
             </a:p>
           </p:txBody>
         </p:sp>
@@ -6985,7 +6876,7 @@
                 <a:buChar char="•"/>
               </a:pPr>
               <a:r>
-                <a:rPr lang="de-DE" sz="1600" dirty="0" smtClean="0">
+                <a:rPr lang="de-DE" sz="1600" dirty="0">
                   <a:solidFill>
                     <a:schemeClr val="tx1"/>
                   </a:solidFill>
@@ -6999,7 +6890,7 @@
                 <a:buChar char="•"/>
               </a:pPr>
               <a:r>
-                <a:rPr lang="de-DE" sz="1600" dirty="0" smtClean="0">
+                <a:rPr lang="de-DE" sz="1600" dirty="0">
                   <a:solidFill>
                     <a:schemeClr val="tx1"/>
                   </a:solidFill>
@@ -7051,18 +6942,13 @@
             <a:lstStyle/>
             <a:p>
               <a:r>
-                <a:rPr lang="de-DE" b="1" dirty="0" smtClean="0">
+                <a:rPr lang="de-DE" b="1" dirty="0">
                   <a:solidFill>
                     <a:schemeClr val="tx1"/>
                   </a:solidFill>
                 </a:rPr>
                 <a:t>Task</a:t>
               </a:r>
-              <a:endParaRPr lang="de-DE" b="1" dirty="0">
-                <a:solidFill>
-                  <a:schemeClr val="tx1"/>
-                </a:solidFill>
-              </a:endParaRPr>
             </a:p>
           </p:txBody>
         </p:sp>
@@ -7106,13 +6992,6 @@
   <p:clrMapOvr>
     <a:masterClrMapping/>
   </p:clrMapOvr>
-  <p:timing>
-    <p:tnLst>
-      <p:par>
-        <p:cTn id="1" dur="indefinite" restart="never" nodeType="tmRoot"/>
-      </p:par>
-    </p:tnLst>
-  </p:timing>
 </p:sld>
 </file>
 
@@ -7149,10 +7028,9 @@
           <a:lstStyle/>
           <a:p>
             <a:r>
-              <a:rPr lang="de-DE" dirty="0" smtClean="0"/>
+              <a:rPr lang="de-DE" dirty="0"/>
               <a:t>Interaktionsmechaniken</a:t>
             </a:r>
-            <a:endParaRPr lang="de-DE" dirty="0"/>
           </a:p>
         </p:txBody>
       </p:sp>
@@ -7225,7 +7103,7 @@
           <a:lstStyle/>
           <a:p>
             <a:r>
-              <a:rPr lang="de-DE" b="1" dirty="0" smtClean="0">
+              <a:rPr lang="de-DE" b="1" dirty="0">
                 <a:solidFill>
                   <a:schemeClr val="tx1"/>
                 </a:solidFill>
@@ -7246,7 +7124,7 @@
               <a:buChar char="•"/>
             </a:pPr>
             <a:r>
-              <a:rPr lang="de-DE" dirty="0" smtClean="0">
+              <a:rPr lang="de-DE" dirty="0">
                 <a:solidFill>
                   <a:schemeClr val="tx1"/>
                 </a:solidFill>
@@ -7260,7 +7138,7 @@
               <a:buChar char="•"/>
             </a:pPr>
             <a:r>
-              <a:rPr lang="de-DE" dirty="0" smtClean="0">
+              <a:rPr lang="de-DE" dirty="0">
                 <a:solidFill>
                   <a:schemeClr val="tx1"/>
                 </a:solidFill>
@@ -7274,18 +7152,13 @@
               <a:buChar char="•"/>
             </a:pPr>
             <a:r>
-              <a:rPr lang="de-DE" dirty="0" smtClean="0">
+              <a:rPr lang="de-DE" dirty="0">
                 <a:solidFill>
                   <a:schemeClr val="tx1"/>
                 </a:solidFill>
               </a:rPr>
               <a:t>Joystick</a:t>
             </a:r>
-            <a:endParaRPr lang="de-DE" dirty="0">
-              <a:solidFill>
-                <a:schemeClr val="tx1"/>
-              </a:solidFill>
-            </a:endParaRPr>
           </a:p>
         </p:txBody>
       </p:sp>
@@ -7328,7 +7201,7 @@
           <a:lstStyle/>
           <a:p>
             <a:r>
-              <a:rPr lang="de-DE" b="1" dirty="0" smtClean="0">
+              <a:rPr lang="de-DE" b="1" dirty="0">
                 <a:solidFill>
                   <a:schemeClr val="tx1"/>
                 </a:solidFill>
@@ -7349,18 +7222,13 @@
               <a:buChar char="•"/>
             </a:pPr>
             <a:r>
-              <a:rPr lang="de-DE" dirty="0" smtClean="0">
+              <a:rPr lang="de-DE" dirty="0">
                 <a:solidFill>
                   <a:schemeClr val="tx1"/>
                 </a:solidFill>
               </a:rPr>
               <a:t>Berühren des Bildschirms</a:t>
             </a:r>
-            <a:endParaRPr lang="de-DE" dirty="0">
-              <a:solidFill>
-                <a:schemeClr val="tx1"/>
-              </a:solidFill>
-            </a:endParaRPr>
           </a:p>
         </p:txBody>
       </p:sp>
@@ -7403,7 +7271,7 @@
           <a:lstStyle/>
           <a:p>
             <a:r>
-              <a:rPr lang="de-DE" b="1" dirty="0" smtClean="0">
+              <a:rPr lang="de-DE" b="1" dirty="0">
                 <a:solidFill>
                   <a:schemeClr val="tx1"/>
                 </a:solidFill>
@@ -7424,7 +7292,7 @@
               <a:buChar char="•"/>
             </a:pPr>
             <a:r>
-              <a:rPr lang="de-DE" dirty="0" smtClean="0">
+              <a:rPr lang="de-DE" dirty="0">
                 <a:solidFill>
                   <a:schemeClr val="tx1"/>
                 </a:solidFill>
@@ -7438,18 +7306,13 @@
               <a:buChar char="•"/>
             </a:pPr>
             <a:r>
-              <a:rPr lang="de-DE" dirty="0" smtClean="0">
+              <a:rPr lang="de-DE" dirty="0">
                 <a:solidFill>
                   <a:schemeClr val="tx1"/>
                 </a:solidFill>
               </a:rPr>
               <a:t>Fließtext</a:t>
             </a:r>
-            <a:endParaRPr lang="de-DE" dirty="0">
-              <a:solidFill>
-                <a:schemeClr val="tx1"/>
-              </a:solidFill>
-            </a:endParaRPr>
           </a:p>
         </p:txBody>
       </p:sp>
@@ -7492,18 +7355,13 @@
           <a:lstStyle/>
           <a:p>
             <a:r>
-              <a:rPr lang="de-DE" b="1" dirty="0" smtClean="0">
+              <a:rPr lang="de-DE" b="1" dirty="0">
                 <a:solidFill>
                   <a:schemeClr val="tx1"/>
                 </a:solidFill>
               </a:rPr>
               <a:t>Sprache</a:t>
             </a:r>
-            <a:endParaRPr lang="de-DE" b="1" dirty="0">
-              <a:solidFill>
-                <a:schemeClr val="tx1"/>
-              </a:solidFill>
-            </a:endParaRPr>
           </a:p>
         </p:txBody>
       </p:sp>
@@ -7546,18 +7404,13 @@
           <a:lstStyle/>
           <a:p>
             <a:r>
-              <a:rPr lang="de-DE" b="1" dirty="0" smtClean="0">
+              <a:rPr lang="de-DE" b="1" dirty="0">
                 <a:solidFill>
                   <a:schemeClr val="tx1"/>
                 </a:solidFill>
               </a:rPr>
               <a:t>Gestik</a:t>
             </a:r>
-            <a:endParaRPr lang="de-DE" b="1" dirty="0">
-              <a:solidFill>
-                <a:schemeClr val="tx1"/>
-              </a:solidFill>
-            </a:endParaRPr>
           </a:p>
         </p:txBody>
       </p:sp>
@@ -7735,13 +7588,6 @@
   <p:clrMapOvr>
     <a:masterClrMapping/>
   </p:clrMapOvr>
-  <p:timing>
-    <p:tnLst>
-      <p:par>
-        <p:cTn id="1" dur="indefinite" restart="never" nodeType="tmRoot"/>
-      </p:par>
-    </p:tnLst>
-  </p:timing>
 </p:sld>
 </file>
 
@@ -7778,10 +7624,9 @@
           <a:lstStyle/>
           <a:p>
             <a:r>
-              <a:rPr lang="de-DE" dirty="0" smtClean="0"/>
-              <a:t>Informationen können dem Nutzer auf unterschiedliche Art bereitgestellt werden</a:t>
+              <a:rPr lang="de-DE" dirty="0"/>
+              <a:t>Informationen können dem Nutzer durch unterschiedliche Geräte zur Verfügung gestellt werden</a:t>
             </a:r>
-            <a:endParaRPr lang="de-DE" dirty="0"/>
           </a:p>
         </p:txBody>
       </p:sp>
@@ -7837,7 +7682,7 @@
         </p:blipFill>
         <p:spPr>
           <a:xfrm>
-            <a:off x="874712" y="1499917"/>
+            <a:off x="874712" y="1682785"/>
             <a:ext cx="810070" cy="810070"/>
           </a:xfrm>
           <a:prstGeom prst="rect">
@@ -7867,7 +7712,7 @@
         </p:blipFill>
         <p:spPr>
           <a:xfrm>
-            <a:off x="874712" y="3023965"/>
+            <a:off x="871314" y="3149131"/>
             <a:ext cx="810070" cy="810070"/>
           </a:xfrm>
           <a:prstGeom prst="rect">
@@ -7897,7 +7742,7 @@
         </p:blipFill>
         <p:spPr>
           <a:xfrm>
-            <a:off x="6410292" y="1499917"/>
+            <a:off x="6410291" y="1726632"/>
             <a:ext cx="810070" cy="810070"/>
           </a:xfrm>
           <a:prstGeom prst="rect">
@@ -7927,7 +7772,7 @@
         </p:blipFill>
         <p:spPr>
           <a:xfrm>
-            <a:off x="6410292" y="2976340"/>
+            <a:off x="6410291" y="3149131"/>
             <a:ext cx="810070" cy="810070"/>
           </a:xfrm>
           <a:prstGeom prst="rect">
@@ -7957,7 +7802,7 @@
         </p:blipFill>
         <p:spPr>
           <a:xfrm>
-            <a:off x="6410291" y="4451920"/>
+            <a:off x="6410291" y="4577086"/>
             <a:ext cx="810071" cy="810071"/>
           </a:xfrm>
           <a:prstGeom prst="rect">
@@ -7987,7 +7832,7 @@
         </p:blipFill>
         <p:spPr>
           <a:xfrm>
-            <a:off x="874712" y="4451921"/>
+            <a:off x="874712" y="4577087"/>
             <a:ext cx="810070" cy="810070"/>
           </a:xfrm>
           <a:prstGeom prst="rect">
@@ -8055,7 +7900,7 @@
                 <a:buChar char="•"/>
               </a:pPr>
               <a:r>
-                <a:rPr lang="de-DE" dirty="0" smtClean="0">
+                <a:rPr lang="de-DE" dirty="0">
                   <a:solidFill>
                     <a:schemeClr val="tx1"/>
                   </a:solidFill>
@@ -8069,14 +7914,14 @@
                 <a:buChar char="•"/>
               </a:pPr>
               <a:r>
-                <a:rPr lang="de-DE" dirty="0" err="1" smtClean="0">
+                <a:rPr lang="de-DE" dirty="0" err="1">
                   <a:solidFill>
                     <a:schemeClr val="tx1"/>
                   </a:solidFill>
                 </a:rPr>
                 <a:t>Handsfree</a:t>
               </a:r>
-              <a:endParaRPr lang="de-DE" dirty="0" smtClean="0">
+              <a:endParaRPr lang="de-DE" dirty="0">
                 <a:solidFill>
                   <a:schemeClr val="tx1"/>
                 </a:solidFill>
@@ -8088,18 +7933,13 @@
                 <a:buChar char="•"/>
               </a:pPr>
               <a:r>
-                <a:rPr lang="de-DE" dirty="0" smtClean="0">
+                <a:rPr lang="de-DE" dirty="0">
                   <a:solidFill>
                     <a:schemeClr val="tx1"/>
                   </a:solidFill>
                 </a:rPr>
                 <a:t>Informationen über Nutzer</a:t>
               </a:r>
-              <a:endParaRPr lang="de-DE" dirty="0">
-                <a:solidFill>
-                  <a:schemeClr val="tx1"/>
-                </a:solidFill>
-              </a:endParaRPr>
             </a:p>
           </p:txBody>
         </p:sp>
@@ -8145,7 +7985,7 @@
             <a:lstStyle/>
             <a:p>
               <a:r>
-                <a:rPr lang="de-DE" b="1" dirty="0" err="1" smtClean="0">
+                <a:rPr lang="de-DE" b="1" dirty="0" err="1">
                   <a:solidFill>
                     <a:schemeClr val="tx1"/>
                   </a:solidFill>
@@ -8218,7 +8058,7 @@
                 <a:buChar char="•"/>
               </a:pPr>
               <a:r>
-                <a:rPr lang="de-DE" dirty="0" smtClean="0">
+                <a:rPr lang="de-DE" dirty="0">
                   <a:solidFill>
                     <a:schemeClr val="tx1"/>
                   </a:solidFill>
@@ -8232,18 +8072,13 @@
                 <a:buChar char="•"/>
               </a:pPr>
               <a:r>
-                <a:rPr lang="de-DE" dirty="0" smtClean="0">
+                <a:rPr lang="de-DE" dirty="0">
                   <a:solidFill>
                     <a:schemeClr val="tx1"/>
                   </a:solidFill>
                 </a:rPr>
                 <a:t>Nur eine Hand frei</a:t>
               </a:r>
-              <a:endParaRPr lang="de-DE" dirty="0">
-                <a:solidFill>
-                  <a:schemeClr val="tx1"/>
-                </a:solidFill>
-              </a:endParaRPr>
             </a:p>
           </p:txBody>
         </p:sp>
@@ -8289,18 +8124,13 @@
             <a:lstStyle/>
             <a:p>
               <a:r>
-                <a:rPr lang="de-DE" b="1" dirty="0" smtClean="0">
+                <a:rPr lang="de-DE" b="1" dirty="0">
                   <a:solidFill>
                     <a:schemeClr val="tx1"/>
                   </a:solidFill>
                 </a:rPr>
                 <a:t>Tablet</a:t>
               </a:r>
-              <a:endParaRPr lang="de-DE" b="1" dirty="0">
-                <a:solidFill>
-                  <a:schemeClr val="tx1"/>
-                </a:solidFill>
-              </a:endParaRPr>
             </a:p>
           </p:txBody>
         </p:sp>
@@ -8362,7 +8192,7 @@
                 <a:buChar char="•"/>
               </a:pPr>
               <a:r>
-                <a:rPr lang="de-DE" dirty="0" smtClean="0">
+                <a:rPr lang="de-DE" dirty="0">
                   <a:solidFill>
                     <a:schemeClr val="tx1"/>
                   </a:solidFill>
@@ -8376,7 +8206,7 @@
                 <a:buChar char="•"/>
               </a:pPr>
               <a:r>
-                <a:rPr lang="de-DE" dirty="0" err="1" smtClean="0">
+                <a:rPr lang="de-DE" dirty="0" err="1">
                   <a:solidFill>
                     <a:schemeClr val="tx1"/>
                   </a:solidFill>
@@ -8433,18 +8263,13 @@
             <a:lstStyle/>
             <a:p>
               <a:r>
-                <a:rPr lang="de-DE" b="1" dirty="0" smtClean="0">
+                <a:rPr lang="de-DE" b="1" dirty="0">
                   <a:solidFill>
                     <a:schemeClr val="tx1"/>
                   </a:solidFill>
                 </a:rPr>
                 <a:t>Headset</a:t>
               </a:r>
-              <a:endParaRPr lang="de-DE" b="1" dirty="0">
-                <a:solidFill>
-                  <a:schemeClr val="tx1"/>
-                </a:solidFill>
-              </a:endParaRPr>
             </a:p>
           </p:txBody>
         </p:sp>
@@ -8506,18 +8331,13 @@
                 <a:buChar char="•"/>
               </a:pPr>
               <a:r>
-                <a:rPr lang="de-DE" dirty="0" smtClean="0">
+                <a:rPr lang="de-DE" dirty="0">
                   <a:solidFill>
                     <a:schemeClr val="tx1"/>
                   </a:solidFill>
                 </a:rPr>
                 <a:t>Einblenden von Informationen in das Sichtfeld</a:t>
               </a:r>
-              <a:endParaRPr lang="de-DE" dirty="0">
-                <a:solidFill>
-                  <a:schemeClr val="tx1"/>
-                </a:solidFill>
-              </a:endParaRPr>
             </a:p>
           </p:txBody>
         </p:sp>
@@ -8563,18 +8383,13 @@
             <a:lstStyle/>
             <a:p>
               <a:r>
-                <a:rPr lang="de-DE" b="1" dirty="0" smtClean="0">
+                <a:rPr lang="de-DE" b="1" dirty="0">
                   <a:solidFill>
                     <a:schemeClr val="tx1"/>
                   </a:solidFill>
                 </a:rPr>
                 <a:t>AR-Brille</a:t>
               </a:r>
-              <a:endParaRPr lang="de-DE" b="1" dirty="0">
-                <a:solidFill>
-                  <a:schemeClr val="tx1"/>
-                </a:solidFill>
-              </a:endParaRPr>
             </a:p>
           </p:txBody>
         </p:sp>
@@ -8636,7 +8451,7 @@
                 <a:buChar char="•"/>
               </a:pPr>
               <a:r>
-                <a:rPr lang="de-DE" dirty="0" smtClean="0">
+                <a:rPr lang="de-DE" dirty="0">
                   <a:solidFill>
                     <a:schemeClr val="tx1"/>
                   </a:solidFill>
@@ -8650,18 +8465,13 @@
                 <a:buChar char="•"/>
               </a:pPr>
               <a:r>
-                <a:rPr lang="de-DE" dirty="0" smtClean="0">
+                <a:rPr lang="de-DE" dirty="0">
                   <a:solidFill>
                     <a:schemeClr val="tx1"/>
                   </a:solidFill>
                 </a:rPr>
                 <a:t>Fest verbaut</a:t>
               </a:r>
-              <a:endParaRPr lang="de-DE" dirty="0">
-                <a:solidFill>
-                  <a:schemeClr val="tx1"/>
-                </a:solidFill>
-              </a:endParaRPr>
             </a:p>
           </p:txBody>
         </p:sp>
@@ -8707,18 +8517,13 @@
             <a:lstStyle/>
             <a:p>
               <a:r>
-                <a:rPr lang="de-DE" b="1" dirty="0" smtClean="0">
+                <a:rPr lang="de-DE" b="1" dirty="0">
                   <a:solidFill>
                     <a:schemeClr val="tx1"/>
                   </a:solidFill>
                 </a:rPr>
                 <a:t>Projektor</a:t>
               </a:r>
-              <a:endParaRPr lang="de-DE" b="1" dirty="0">
-                <a:solidFill>
-                  <a:schemeClr val="tx1"/>
-                </a:solidFill>
-              </a:endParaRPr>
             </a:p>
           </p:txBody>
         </p:sp>
@@ -8780,7 +8585,7 @@
                 <a:buChar char="•"/>
               </a:pPr>
               <a:r>
-                <a:rPr lang="de-DE" dirty="0" smtClean="0">
+                <a:rPr lang="de-DE" dirty="0">
                   <a:solidFill>
                     <a:schemeClr val="tx1"/>
                   </a:solidFill>
@@ -8794,18 +8599,13 @@
                 <a:buChar char="•"/>
               </a:pPr>
               <a:r>
-                <a:rPr lang="de-DE" dirty="0" smtClean="0">
+                <a:rPr lang="de-DE" dirty="0">
                   <a:solidFill>
                     <a:schemeClr val="tx1"/>
                   </a:solidFill>
                 </a:rPr>
                 <a:t>Großes Display</a:t>
               </a:r>
-              <a:endParaRPr lang="de-DE" dirty="0">
-                <a:solidFill>
-                  <a:schemeClr val="tx1"/>
-                </a:solidFill>
-              </a:endParaRPr>
             </a:p>
           </p:txBody>
         </p:sp>
@@ -8851,18 +8651,13 @@
             <a:lstStyle/>
             <a:p>
               <a:r>
-                <a:rPr lang="de-DE" b="1" dirty="0" smtClean="0">
+                <a:rPr lang="de-DE" b="1" dirty="0">
                   <a:solidFill>
                     <a:schemeClr val="tx1"/>
                   </a:solidFill>
                 </a:rPr>
                 <a:t>Desktopcomputer</a:t>
               </a:r>
-              <a:endParaRPr lang="de-DE" b="1" dirty="0">
-                <a:solidFill>
-                  <a:schemeClr val="tx1"/>
-                </a:solidFill>
-              </a:endParaRPr>
             </a:p>
           </p:txBody>
         </p:sp>
@@ -8877,13 +8672,6 @@
   <p:clrMapOvr>
     <a:masterClrMapping/>
   </p:clrMapOvr>
-  <p:timing>
-    <p:tnLst>
-      <p:par>
-        <p:cTn id="1" dur="indefinite" restart="never" nodeType="tmRoot"/>
-      </p:par>
-    </p:tnLst>
-  </p:timing>
 </p:sld>
 </file>
 
@@ -8920,10 +8708,9 @@
           <a:lstStyle/>
           <a:p>
             <a:r>
-              <a:rPr lang="de-DE" dirty="0" smtClean="0"/>
-              <a:t>Digitale Assistent</a:t>
+              <a:rPr lang="de-DE" dirty="0"/>
+              <a:t>Digitaler Assistent</a:t>
             </a:r>
-            <a:endParaRPr lang="de-DE" dirty="0"/>
           </a:p>
         </p:txBody>
       </p:sp>
@@ -9004,13 +8791,6 @@
   <p:clrMapOvr>
     <a:masterClrMapping/>
   </p:clrMapOvr>
-  <p:timing>
-    <p:tnLst>
-      <p:par>
-        <p:cTn id="1" dur="indefinite" restart="never" nodeType="tmRoot"/>
-      </p:par>
-    </p:tnLst>
-  </p:timing>
 </p:sld>
 </file>
 
@@ -9047,18 +8827,17 @@
           <a:lstStyle/>
           <a:p>
             <a:r>
-              <a:rPr lang="de-DE" dirty="0" smtClean="0"/>
+              <a:rPr lang="de-DE" dirty="0"/>
               <a:t>M. Feldkemper: DA – </a:t>
             </a:r>
             <a:r>
-              <a:rPr lang="de-DE" dirty="0" err="1" smtClean="0"/>
+              <a:rPr lang="de-DE" dirty="0" err="1"/>
               <a:t>Kollaborative</a:t>
             </a:r>
             <a:r>
-              <a:rPr lang="de-DE" dirty="0" smtClean="0"/>
+              <a:rPr lang="de-DE" dirty="0"/>
               <a:t> Problemlösung in modularen Anlagen mittels persönlicher digitaler Assistenz</a:t>
             </a:r>
-            <a:endParaRPr lang="de-DE" dirty="0"/>
           </a:p>
         </p:txBody>
       </p:sp>
@@ -9088,10 +8867,34 @@
                 <a:tableStyleId>{21E4AEA4-8DFA-4A89-87EB-49C32662AFE0}</a:tableStyleId>
               </a:tblPr>
               <a:tblGrid>
-                <a:gridCol w="4026471"/>
-                <a:gridCol w="1231392"/>
-                <a:gridCol w="1121664"/>
-                <a:gridCol w="1121664"/>
+                <a:gridCol w="4026471">
+                  <a:extLst>
+                    <a:ext uri="{9D8B030D-6E8A-4147-A177-3AD203B41FA5}">
+                      <a16:colId xmlns:a16="http://schemas.microsoft.com/office/drawing/2014/main" val="20000"/>
+                    </a:ext>
+                  </a:extLst>
+                </a:gridCol>
+                <a:gridCol w="1231392">
+                  <a:extLst>
+                    <a:ext uri="{9D8B030D-6E8A-4147-A177-3AD203B41FA5}">
+                      <a16:colId xmlns:a16="http://schemas.microsoft.com/office/drawing/2014/main" val="20001"/>
+                    </a:ext>
+                  </a:extLst>
+                </a:gridCol>
+                <a:gridCol w="1121664">
+                  <a:extLst>
+                    <a:ext uri="{9D8B030D-6E8A-4147-A177-3AD203B41FA5}">
+                      <a16:colId xmlns:a16="http://schemas.microsoft.com/office/drawing/2014/main" val="20002"/>
+                    </a:ext>
+                  </a:extLst>
+                </a:gridCol>
+                <a:gridCol w="1121664">
+                  <a:extLst>
+                    <a:ext uri="{9D8B030D-6E8A-4147-A177-3AD203B41FA5}">
+                      <a16:colId xmlns:a16="http://schemas.microsoft.com/office/drawing/2014/main" val="20003"/>
+                    </a:ext>
+                  </a:extLst>
+                </a:gridCol>
               </a:tblGrid>
               <a:tr h="449362">
                 <a:tc>
@@ -9100,18 +8903,17 @@
                     <a:lstStyle/>
                     <a:p>
                       <a:r>
-                        <a:rPr lang="de-DE" dirty="0" smtClean="0"/>
+                        <a:rPr lang="de-DE" dirty="0"/>
                         <a:t>Most </a:t>
                       </a:r>
                       <a:r>
-                        <a:rPr lang="de-DE" dirty="0" err="1" smtClean="0"/>
+                        <a:rPr lang="de-DE" dirty="0" err="1"/>
                         <a:t>Important</a:t>
                       </a:r>
                       <a:r>
-                        <a:rPr lang="de-DE" dirty="0" smtClean="0"/>
+                        <a:rPr lang="de-DE" dirty="0"/>
                         <a:t> Work Item</a:t>
                       </a:r>
-                      <a:endParaRPr lang="de-DE" dirty="0"/>
                     </a:p>
                   </a:txBody>
                   <a:tcPr anchor="ctr">
@@ -9143,10 +8945,9 @@
                     <a:p>
                       <a:pPr algn="r"/>
                       <a:r>
-                        <a:rPr lang="de-DE" dirty="0" smtClean="0"/>
+                        <a:rPr lang="de-DE" dirty="0"/>
                         <a:t>Deadline</a:t>
                       </a:r>
-                      <a:endParaRPr lang="de-DE" dirty="0"/>
                     </a:p>
                   </a:txBody>
                   <a:tcPr anchor="ctr">
@@ -9169,10 +8970,9 @@
                     <a:p>
                       <a:pPr algn="r"/>
                       <a:r>
-                        <a:rPr lang="de-DE" dirty="0" smtClean="0"/>
+                        <a:rPr lang="de-DE" dirty="0"/>
                         <a:t>22.11.18</a:t>
                       </a:r>
-                      <a:endParaRPr lang="de-DE" dirty="0"/>
                     </a:p>
                   </a:txBody>
                   <a:tcPr anchor="ctr">
@@ -9195,10 +8995,9 @@
                     <a:p>
                       <a:pPr algn="r"/>
                       <a:r>
-                        <a:rPr lang="de-DE" dirty="0" smtClean="0"/>
+                        <a:rPr lang="de-DE" dirty="0"/>
                         <a:t>26.11.18</a:t>
                       </a:r>
-                      <a:endParaRPr lang="de-DE" dirty="0"/>
                     </a:p>
                   </a:txBody>
                   <a:tcPr anchor="ctr">
@@ -9223,6 +9022,11 @@
                     </a:solidFill>
                   </a:tcPr>
                 </a:tc>
+                <a:extLst>
+                  <a:ext uri="{0D108BD9-81ED-4DB2-BD59-A6C34878D82A}">
+                    <a16:rowId xmlns:a16="http://schemas.microsoft.com/office/drawing/2014/main" val="10000"/>
+                  </a:ext>
+                </a:extLst>
               </a:tr>
               <a:tr h="449362">
                 <a:tc>
@@ -9231,18 +9035,17 @@
                     <a:lstStyle/>
                     <a:p>
                       <a:r>
-                        <a:rPr lang="de-DE" dirty="0" smtClean="0"/>
+                        <a:rPr lang="de-DE" dirty="0"/>
                         <a:t>AP 1:</a:t>
                       </a:r>
                       <a:r>
-                        <a:rPr lang="de-DE" baseline="0" dirty="0" smtClean="0"/>
+                        <a:rPr lang="de-DE" baseline="0" dirty="0"/>
                         <a:t> </a:t>
                       </a:r>
                       <a:r>
-                        <a:rPr lang="de-DE" dirty="0" smtClean="0"/>
+                        <a:rPr lang="de-DE" dirty="0"/>
                         <a:t>Literaturrecherche</a:t>
                       </a:r>
-                      <a:endParaRPr lang="de-DE" dirty="0"/>
                     </a:p>
                   </a:txBody>
                   <a:tcPr anchor="ctr">
@@ -9292,10 +9095,9 @@
                     <a:p>
                       <a:pPr algn="r"/>
                       <a:r>
-                        <a:rPr lang="de-DE" dirty="0" smtClean="0"/>
+                        <a:rPr lang="de-DE" dirty="0"/>
                         <a:t>03.01.19</a:t>
                       </a:r>
-                      <a:endParaRPr lang="de-DE" dirty="0"/>
                     </a:p>
                   </a:txBody>
                   <a:tcPr anchor="ctr">
@@ -9345,10 +9147,9 @@
                     <a:p>
                       <a:pPr algn="r"/>
                       <a:r>
-                        <a:rPr lang="de-DE" dirty="0" smtClean="0"/>
+                        <a:rPr lang="de-DE" dirty="0"/>
                         <a:t>0%</a:t>
                       </a:r>
-                      <a:endParaRPr lang="de-DE" dirty="0"/>
                     </a:p>
                   </a:txBody>
                   <a:tcPr anchor="ctr">
@@ -9398,10 +9199,9 @@
                     <a:p>
                       <a:pPr algn="r"/>
                       <a:r>
-                        <a:rPr lang="de-DE" dirty="0" smtClean="0"/>
+                        <a:rPr lang="de-DE" dirty="0"/>
                         <a:t>10%</a:t>
                       </a:r>
-                      <a:endParaRPr lang="de-DE" dirty="0"/>
                     </a:p>
                   </a:txBody>
                   <a:tcPr anchor="ctr">
@@ -9444,6 +9244,11 @@
                     </a:solidFill>
                   </a:tcPr>
                 </a:tc>
+                <a:extLst>
+                  <a:ext uri="{0D108BD9-81ED-4DB2-BD59-A6C34878D82A}">
+                    <a16:rowId xmlns:a16="http://schemas.microsoft.com/office/drawing/2014/main" val="10001"/>
+                  </a:ext>
+                </a:extLst>
               </a:tr>
               <a:tr h="449362">
                 <a:tc>
@@ -9452,10 +9257,9 @@
                     <a:lstStyle/>
                     <a:p>
                       <a:r>
-                        <a:rPr lang="de-DE" dirty="0" smtClean="0"/>
+                        <a:rPr lang="de-DE" dirty="0"/>
                         <a:t>AP 2: Anforderungsanalyse</a:t>
                       </a:r>
-                      <a:endParaRPr lang="de-DE" dirty="0"/>
                     </a:p>
                   </a:txBody>
                   <a:tcPr anchor="ctr">
@@ -9507,10 +9311,9 @@
                     <a:p>
                       <a:pPr algn="r"/>
                       <a:r>
-                        <a:rPr lang="de-DE" dirty="0" smtClean="0"/>
+                        <a:rPr lang="de-DE" dirty="0"/>
                         <a:t>23.01.19</a:t>
                       </a:r>
-                      <a:endParaRPr lang="de-DE" dirty="0"/>
                     </a:p>
                   </a:txBody>
                   <a:tcPr anchor="ctr">
@@ -9562,10 +9365,9 @@
                     <a:p>
                       <a:pPr algn="r"/>
                       <a:r>
-                        <a:rPr lang="de-DE" dirty="0" smtClean="0"/>
+                        <a:rPr lang="de-DE" dirty="0"/>
                         <a:t>0%</a:t>
                       </a:r>
-                      <a:endParaRPr lang="de-DE" dirty="0"/>
                     </a:p>
                   </a:txBody>
                   <a:tcPr anchor="ctr">
@@ -9617,10 +9419,9 @@
                     <a:p>
                       <a:pPr algn="r"/>
                       <a:r>
-                        <a:rPr lang="de-DE" dirty="0" smtClean="0"/>
+                        <a:rPr lang="de-DE" dirty="0"/>
                         <a:t>0%</a:t>
                       </a:r>
-                      <a:endParaRPr lang="de-DE" dirty="0"/>
                     </a:p>
                   </a:txBody>
                   <a:tcPr anchor="ctr">
@@ -9665,6 +9466,11 @@
                     </a:solidFill>
                   </a:tcPr>
                 </a:tc>
+                <a:extLst>
+                  <a:ext uri="{0D108BD9-81ED-4DB2-BD59-A6C34878D82A}">
+                    <a16:rowId xmlns:a16="http://schemas.microsoft.com/office/drawing/2014/main" val="10002"/>
+                  </a:ext>
+                </a:extLst>
               </a:tr>
               <a:tr h="449362">
                 <a:tc>
@@ -9673,10 +9479,9 @@
                     <a:lstStyle/>
                     <a:p>
                       <a:r>
-                        <a:rPr lang="de-DE" dirty="0" smtClean="0"/>
+                        <a:rPr lang="de-DE" dirty="0"/>
                         <a:t>AP 3: Konzept</a:t>
                       </a:r>
-                      <a:endParaRPr lang="de-DE" dirty="0"/>
                     </a:p>
                   </a:txBody>
                   <a:tcPr anchor="ctr">
@@ -9728,10 +9533,9 @@
                     <a:p>
                       <a:pPr algn="r"/>
                       <a:r>
-                        <a:rPr lang="de-DE" dirty="0" smtClean="0"/>
+                        <a:rPr lang="de-DE" dirty="0"/>
                         <a:t>05.02.19</a:t>
                       </a:r>
-                      <a:endParaRPr lang="de-DE" dirty="0"/>
                     </a:p>
                   </a:txBody>
                   <a:tcPr anchor="ctr">
@@ -9783,10 +9587,9 @@
                     <a:p>
                       <a:pPr algn="r"/>
                       <a:r>
-                        <a:rPr lang="de-DE" dirty="0" smtClean="0"/>
+                        <a:rPr lang="de-DE" dirty="0"/>
                         <a:t>0%</a:t>
                       </a:r>
-                      <a:endParaRPr lang="de-DE" dirty="0"/>
                     </a:p>
                   </a:txBody>
                   <a:tcPr anchor="ctr">
@@ -9838,10 +9641,9 @@
                     <a:p>
                       <a:pPr algn="r"/>
                       <a:r>
-                        <a:rPr lang="de-DE" dirty="0" smtClean="0"/>
+                        <a:rPr lang="de-DE" dirty="0"/>
                         <a:t>0%</a:t>
                       </a:r>
-                      <a:endParaRPr lang="de-DE" dirty="0"/>
                     </a:p>
                   </a:txBody>
                   <a:tcPr anchor="ctr">
@@ -9886,6 +9688,11 @@
                     </a:solidFill>
                   </a:tcPr>
                 </a:tc>
+                <a:extLst>
+                  <a:ext uri="{0D108BD9-81ED-4DB2-BD59-A6C34878D82A}">
+                    <a16:rowId xmlns:a16="http://schemas.microsoft.com/office/drawing/2014/main" val="10003"/>
+                  </a:ext>
+                </a:extLst>
               </a:tr>
               <a:tr h="449362">
                 <a:tc>
@@ -9894,18 +9701,17 @@
                     <a:lstStyle/>
                     <a:p>
                       <a:r>
-                        <a:rPr lang="de-DE" dirty="0" smtClean="0"/>
+                        <a:rPr lang="de-DE" dirty="0"/>
                         <a:t>AP 4:</a:t>
                       </a:r>
                       <a:r>
-                        <a:rPr lang="de-DE" baseline="0" dirty="0" smtClean="0"/>
+                        <a:rPr lang="de-DE" baseline="0" dirty="0"/>
                         <a:t> </a:t>
                       </a:r>
                       <a:r>
-                        <a:rPr lang="de-DE" dirty="0" smtClean="0"/>
+                        <a:rPr lang="de-DE" dirty="0"/>
                         <a:t>Implementierung</a:t>
                       </a:r>
-                      <a:endParaRPr lang="de-DE" dirty="0"/>
                     </a:p>
                   </a:txBody>
                   <a:tcPr anchor="ctr">
@@ -9957,10 +9763,9 @@
                     <a:p>
                       <a:pPr algn="r"/>
                       <a:r>
-                        <a:rPr lang="de-DE" dirty="0" smtClean="0"/>
+                        <a:rPr lang="de-DE" dirty="0"/>
                         <a:t>20.03.19</a:t>
                       </a:r>
-                      <a:endParaRPr lang="de-DE" dirty="0"/>
                     </a:p>
                   </a:txBody>
                   <a:tcPr anchor="ctr">
@@ -10012,10 +9817,9 @@
                     <a:p>
                       <a:pPr algn="r"/>
                       <a:r>
-                        <a:rPr lang="de-DE" dirty="0" smtClean="0"/>
+                        <a:rPr lang="de-DE" dirty="0"/>
                         <a:t>0%</a:t>
                       </a:r>
-                      <a:endParaRPr lang="de-DE" dirty="0"/>
                     </a:p>
                   </a:txBody>
                   <a:tcPr anchor="ctr">
@@ -10067,10 +9871,9 @@
                     <a:p>
                       <a:pPr algn="r"/>
                       <a:r>
-                        <a:rPr lang="de-DE" dirty="0" smtClean="0"/>
+                        <a:rPr lang="de-DE" dirty="0"/>
                         <a:t>0%</a:t>
                       </a:r>
-                      <a:endParaRPr lang="de-DE" dirty="0"/>
                     </a:p>
                   </a:txBody>
                   <a:tcPr anchor="ctr">
@@ -10115,6 +9918,11 @@
                     </a:solidFill>
                   </a:tcPr>
                 </a:tc>
+                <a:extLst>
+                  <a:ext uri="{0D108BD9-81ED-4DB2-BD59-A6C34878D82A}">
+                    <a16:rowId xmlns:a16="http://schemas.microsoft.com/office/drawing/2014/main" val="10004"/>
+                  </a:ext>
+                </a:extLst>
               </a:tr>
               <a:tr h="449362">
                 <a:tc>
@@ -10123,10 +9931,9 @@
                     <a:lstStyle/>
                     <a:p>
                       <a:r>
-                        <a:rPr lang="de-DE" dirty="0" smtClean="0"/>
+                        <a:rPr lang="de-DE" dirty="0"/>
                         <a:t>AP 5: Verifikation</a:t>
                       </a:r>
-                      <a:endParaRPr lang="de-DE" dirty="0"/>
                     </a:p>
                   </a:txBody>
                   <a:tcPr anchor="ctr">
@@ -10178,10 +9985,9 @@
                     <a:p>
                       <a:pPr algn="r"/>
                       <a:r>
-                        <a:rPr lang="de-DE" dirty="0" smtClean="0"/>
+                        <a:rPr lang="de-DE" dirty="0"/>
                         <a:t>17.04.19</a:t>
                       </a:r>
-                      <a:endParaRPr lang="de-DE" dirty="0"/>
                     </a:p>
                   </a:txBody>
                   <a:tcPr anchor="ctr">
@@ -10233,10 +10039,9 @@
                     <a:p>
                       <a:pPr algn="r"/>
                       <a:r>
-                        <a:rPr lang="de-DE" dirty="0" smtClean="0"/>
+                        <a:rPr lang="de-DE" dirty="0"/>
                         <a:t>0%</a:t>
                       </a:r>
-                      <a:endParaRPr lang="de-DE" dirty="0"/>
                     </a:p>
                   </a:txBody>
                   <a:tcPr anchor="ctr">
@@ -10288,10 +10093,9 @@
                     <a:p>
                       <a:pPr algn="r"/>
                       <a:r>
-                        <a:rPr lang="de-DE" dirty="0" smtClean="0"/>
+                        <a:rPr lang="de-DE" dirty="0"/>
                         <a:t>0%</a:t>
                       </a:r>
-                      <a:endParaRPr lang="de-DE" dirty="0"/>
                     </a:p>
                   </a:txBody>
                   <a:tcPr anchor="ctr">
@@ -10336,6 +10140,11 @@
                     </a:solidFill>
                   </a:tcPr>
                 </a:tc>
+                <a:extLst>
+                  <a:ext uri="{0D108BD9-81ED-4DB2-BD59-A6C34878D82A}">
+                    <a16:rowId xmlns:a16="http://schemas.microsoft.com/office/drawing/2014/main" val="10005"/>
+                  </a:ext>
+                </a:extLst>
               </a:tr>
               <a:tr h="449362">
                 <a:tc>
@@ -10344,10 +10153,9 @@
                     <a:lstStyle/>
                     <a:p>
                       <a:r>
-                        <a:rPr lang="de-DE" dirty="0" smtClean="0"/>
+                        <a:rPr lang="de-DE" dirty="0"/>
                         <a:t>AP 6: Abgabe</a:t>
                       </a:r>
-                      <a:endParaRPr lang="de-DE" dirty="0"/>
                     </a:p>
                   </a:txBody>
                   <a:tcPr anchor="ctr">
@@ -10399,10 +10207,9 @@
                     <a:p>
                       <a:pPr algn="r"/>
                       <a:r>
-                        <a:rPr lang="de-DE" dirty="0" smtClean="0"/>
+                        <a:rPr lang="de-DE" dirty="0"/>
                         <a:t>02.05.19</a:t>
                       </a:r>
-                      <a:endParaRPr lang="de-DE" dirty="0"/>
                     </a:p>
                   </a:txBody>
                   <a:tcPr anchor="ctr">
@@ -10454,10 +10261,9 @@
                     <a:p>
                       <a:pPr algn="r"/>
                       <a:r>
-                        <a:rPr lang="de-DE" dirty="0" smtClean="0"/>
+                        <a:rPr lang="de-DE" dirty="0"/>
                         <a:t>0%</a:t>
                       </a:r>
-                      <a:endParaRPr lang="de-DE" dirty="0"/>
                     </a:p>
                   </a:txBody>
                   <a:tcPr anchor="ctr">
@@ -10509,10 +10315,9 @@
                     <a:p>
                       <a:pPr algn="r"/>
                       <a:r>
-                        <a:rPr lang="de-DE" dirty="0" smtClean="0"/>
+                        <a:rPr lang="de-DE" dirty="0"/>
                         <a:t>0%</a:t>
                       </a:r>
-                      <a:endParaRPr lang="de-DE" dirty="0"/>
                     </a:p>
                   </a:txBody>
                   <a:tcPr anchor="ctr">
@@ -10557,6 +10362,11 @@
                     </a:solidFill>
                   </a:tcPr>
                 </a:tc>
+                <a:extLst>
+                  <a:ext uri="{0D108BD9-81ED-4DB2-BD59-A6C34878D82A}">
+                    <a16:rowId xmlns:a16="http://schemas.microsoft.com/office/drawing/2014/main" val="10006"/>
+                  </a:ext>
+                </a:extLst>
               </a:tr>
             </a:tbl>
           </a:graphicData>
@@ -10585,10 +10395,9 @@
           <a:lstStyle/>
           <a:p>
             <a:r>
-              <a:rPr lang="de-DE" sz="1800" dirty="0" smtClean="0"/>
+              <a:rPr lang="de-DE" sz="1800" dirty="0"/>
               <a:t>Betreuer: Sebastian Heinze</a:t>
             </a:r>
-            <a:endParaRPr lang="de-DE" sz="1800" dirty="0"/>
           </a:p>
         </p:txBody>
       </p:sp>
@@ -10616,10 +10425,9 @@
           <a:p>
             <a:pPr algn="r"/>
             <a:r>
-              <a:rPr lang="de-DE" sz="1800" dirty="0" smtClean="0"/>
+              <a:rPr lang="de-DE" sz="1800" dirty="0"/>
               <a:t>Abgabetermin: 02.05.2019</a:t>
             </a:r>
-            <a:endParaRPr lang="de-DE" sz="1800" dirty="0"/>
           </a:p>
         </p:txBody>
       </p:sp>
@@ -10646,7 +10454,7 @@
           <a:lstStyle/>
           <a:p>
             <a:r>
-              <a:rPr lang="de-DE" sz="1600" b="1" dirty="0" smtClean="0"/>
+              <a:rPr lang="de-DE" sz="1600" b="1" dirty="0"/>
               <a:t>Aktuelle Stand:</a:t>
             </a:r>
           </a:p>
@@ -10656,10 +10464,9 @@
               <a:buChar char="•"/>
             </a:pPr>
             <a:r>
-              <a:rPr lang="de-DE" sz="1600" dirty="0" smtClean="0"/>
+              <a:rPr lang="de-DE" sz="1600" dirty="0"/>
               <a:t>Einarbeitung ins Thema</a:t>
             </a:r>
-            <a:endParaRPr lang="de-DE" sz="1600" dirty="0"/>
           </a:p>
         </p:txBody>
       </p:sp>
@@ -10673,13 +10480,6 @@
   <p:clrMapOvr>
     <a:masterClrMapping/>
   </p:clrMapOvr>
-  <p:timing>
-    <p:tnLst>
-      <p:par>
-        <p:cTn id="1" dur="indefinite" restart="never" nodeType="tmRoot"/>
-      </p:par>
-    </p:tnLst>
-  </p:timing>
 </p:sld>
 </file>
 

</xml_diff>

<commit_message>
add Literatur für modulare Anlagen
</commit_message>
<xml_diff>
--- a/Dokumente/Präsentationen/2019-01-07_DA_Feldkemper_Aufgabenvorstellung.pptx
+++ b/Dokumente/Präsentationen/2019-01-07_DA_Feldkemper_Aufgabenvorstellung.pptx
@@ -18,8 +18,8 @@
     <p:sldId id="322" r:id="rId6"/>
     <p:sldId id="329" r:id="rId7"/>
     <p:sldId id="324" r:id="rId8"/>
-    <p:sldId id="325" r:id="rId9"/>
-    <p:sldId id="330" r:id="rId10"/>
+    <p:sldId id="330" r:id="rId9"/>
+    <p:sldId id="325" r:id="rId10"/>
     <p:sldId id="318" r:id="rId11"/>
   </p:sldIdLst>
   <p:sldSz cx="12192000" cy="6858000"/>
@@ -147,8 +147,8 @@
             <p14:sldId id="322"/>
             <p14:sldId id="329"/>
             <p14:sldId id="324"/>
+            <p14:sldId id="330"/>
             <p14:sldId id="325"/>
-            <p14:sldId id="330"/>
             <p14:sldId id="318"/>
           </p14:sldIdLst>
         </p14:section>
@@ -255,7 +255,7 @@
           <a:p>
             <a:fld id="{C6AC6211-610F-44E5-BF19-D3CDF6EDD281}" type="datetimeFigureOut">
               <a:rPr lang="de-DE" smtClean="0"/>
-              <a:t>14.12.2018</a:t>
+              <a:t>19.12.2018</a:t>
             </a:fld>
             <a:endParaRPr lang="de-DE"/>
           </a:p>
@@ -421,7 +421,7 @@
           <a:p>
             <a:fld id="{347435D3-23A6-45D3-8DFA-7317DC1E7A64}" type="datetimeFigureOut">
               <a:rPr lang="de-DE" smtClean="0"/>
-              <a:t>14.12.2018</a:t>
+              <a:t>19.12.2018</a:t>
             </a:fld>
             <a:endParaRPr lang="de-DE"/>
           </a:p>
@@ -1025,6 +1025,114 @@
 </p:notes>
 </file>
 
+<file path=ppt/notesSlides/notesSlide5.xml><?xml version="1.0" encoding="utf-8"?>
+<p:notes xmlns:a="http://schemas.openxmlformats.org/drawingml/2006/main" xmlns:r="http://schemas.openxmlformats.org/officeDocument/2006/relationships" xmlns:p="http://schemas.openxmlformats.org/presentationml/2006/main">
+  <p:cSld>
+    <p:spTree>
+      <p:nvGrpSpPr>
+        <p:cNvPr id="1" name=""/>
+        <p:cNvGrpSpPr/>
+        <p:nvPr/>
+      </p:nvGrpSpPr>
+      <p:grpSpPr>
+        <a:xfrm>
+          <a:off x="0" y="0"/>
+          <a:ext cx="0" cy="0"/>
+          <a:chOff x="0" y="0"/>
+          <a:chExt cx="0" cy="0"/>
+        </a:xfrm>
+      </p:grpSpPr>
+      <p:sp>
+        <p:nvSpPr>
+          <p:cNvPr id="2" name="Folienbildplatzhalter 1"/>
+          <p:cNvSpPr>
+            <a:spLocks noGrp="1" noRot="1" noChangeAspect="1"/>
+          </p:cNvSpPr>
+          <p:nvPr>
+            <p:ph type="sldImg"/>
+          </p:nvPr>
+        </p:nvSpPr>
+        <p:spPr/>
+      </p:sp>
+      <p:sp>
+        <p:nvSpPr>
+          <p:cNvPr id="3" name="Notizenplatzhalter 2"/>
+          <p:cNvSpPr>
+            <a:spLocks noGrp="1"/>
+          </p:cNvSpPr>
+          <p:nvPr>
+            <p:ph type="body" idx="1"/>
+          </p:nvPr>
+        </p:nvSpPr>
+        <p:spPr/>
+        <p:txBody>
+          <a:bodyPr/>
+          <a:lstStyle/>
+          <a:p>
+            <a:r>
+              <a:rPr lang="de-DE" dirty="0" smtClean="0"/>
+              <a:t>Wir wissen jetzt mit WAS Mensch und Maschine</a:t>
+            </a:r>
+            <a:r>
+              <a:rPr lang="de-DE" baseline="0" dirty="0" smtClean="0"/>
+              <a:t> interagieren können, aber sie reden nach wie vor nicht miteinander.</a:t>
+            </a:r>
+          </a:p>
+          <a:p>
+            <a:r>
+              <a:rPr lang="de-DE" baseline="0" dirty="0" smtClean="0"/>
+              <a:t>Um Informationen austauschen zu können müssen entsprechende Möglichkeiten vorhanden sein.</a:t>
+            </a:r>
+          </a:p>
+          <a:p>
+            <a:r>
+              <a:rPr lang="de-DE" baseline="0" dirty="0" smtClean="0"/>
+              <a:t>Das System stellt dem Mensch entsprechende Optionen </a:t>
+            </a:r>
+            <a:r>
+              <a:rPr lang="de-DE" baseline="0" smtClean="0"/>
+              <a:t>zur Verfügung.</a:t>
+            </a:r>
+            <a:endParaRPr lang="de-DE" dirty="0"/>
+          </a:p>
+        </p:txBody>
+      </p:sp>
+      <p:sp>
+        <p:nvSpPr>
+          <p:cNvPr id="4" name="Foliennummernplatzhalter 3"/>
+          <p:cNvSpPr>
+            <a:spLocks noGrp="1"/>
+          </p:cNvSpPr>
+          <p:nvPr>
+            <p:ph type="sldNum" sz="quarter" idx="10"/>
+          </p:nvPr>
+        </p:nvSpPr>
+        <p:spPr/>
+        <p:txBody>
+          <a:bodyPr/>
+          <a:lstStyle/>
+          <a:p>
+            <a:fld id="{2969AC09-DF60-43F4-96BF-67D4D9A74094}" type="slidenum">
+              <a:rPr lang="de-DE" smtClean="0"/>
+              <a:t>8</a:t>
+            </a:fld>
+            <a:endParaRPr lang="de-DE"/>
+          </a:p>
+        </p:txBody>
+      </p:sp>
+    </p:spTree>
+    <p:extLst>
+      <p:ext uri="{BB962C8B-B14F-4D97-AF65-F5344CB8AC3E}">
+        <p14:creationId xmlns:p14="http://schemas.microsoft.com/office/powerpoint/2010/main" val="2790543334"/>
+      </p:ext>
+    </p:extLst>
+  </p:cSld>
+  <p:clrMapOvr>
+    <a:masterClrMapping/>
+  </p:clrMapOvr>
+</p:notes>
+</file>
+
 <file path=ppt/slideLayouts/slideLayout1.xml><?xml version="1.0" encoding="utf-8"?>
 <p:sldLayout xmlns:a="http://schemas.openxmlformats.org/drawingml/2006/main" xmlns:r="http://schemas.openxmlformats.org/officeDocument/2006/relationships" xmlns:p="http://schemas.openxmlformats.org/presentationml/2006/main" showMasterSp="0" preserve="1">
   <p:cSld name="Titelfolie">
@@ -1047,7 +1155,7 @@
           <p:cNvPr id="15" name="Rechteck 14">
             <a:extLst>
               <a:ext uri="{FF2B5EF4-FFF2-40B4-BE49-F238E27FC236}">
-                <a16:creationId xmlns="" xmlns:a16="http://schemas.microsoft.com/office/drawing/2014/main" id="{F770C3AA-244C-A141-BC22-D074823F4293}"/>
+                <a16:creationId xmlns:a16="http://schemas.microsoft.com/office/drawing/2014/main" xmlns="" id="{F770C3AA-244C-A141-BC22-D074823F4293}"/>
               </a:ext>
             </a:extLst>
           </p:cNvPr>
@@ -1287,7 +1395,7 @@
           <p:cNvPr id="5" name="Grafik 4">
             <a:extLst>
               <a:ext uri="{FF2B5EF4-FFF2-40B4-BE49-F238E27FC236}">
-                <a16:creationId xmlns="" xmlns:a16="http://schemas.microsoft.com/office/drawing/2014/main" id="{C0F785FA-BB6E-6347-A8C6-9846216D4CBB}"/>
+                <a16:creationId xmlns:a16="http://schemas.microsoft.com/office/drawing/2014/main" xmlns="" id="{C0F785FA-BB6E-6347-A8C6-9846216D4CBB}"/>
               </a:ext>
             </a:extLst>
           </p:cNvPr>
@@ -1476,7 +1584,7 @@
           <p:cNvPr id="12" name="Grafik 11" hidden="1">
             <a:extLst>
               <a:ext uri="{FF2B5EF4-FFF2-40B4-BE49-F238E27FC236}">
-                <a16:creationId xmlns="" xmlns:a16="http://schemas.microsoft.com/office/drawing/2014/main" id="{CFC0D4A5-64CF-6D49-98B1-9FF6119E60EC}"/>
+                <a16:creationId xmlns:a16="http://schemas.microsoft.com/office/drawing/2014/main" xmlns="" id="{CFC0D4A5-64CF-6D49-98B1-9FF6119E60EC}"/>
               </a:ext>
             </a:extLst>
           </p:cNvPr>
@@ -1506,7 +1614,7 @@
           <p:cNvPr id="17" name="Grafik 16">
             <a:extLst>
               <a:ext uri="{FF2B5EF4-FFF2-40B4-BE49-F238E27FC236}">
-                <a16:creationId xmlns="" xmlns:a16="http://schemas.microsoft.com/office/drawing/2014/main" id="{22ECE872-F4EF-2A49-BA96-6065BC99D769}"/>
+                <a16:creationId xmlns:a16="http://schemas.microsoft.com/office/drawing/2014/main" xmlns="" id="{22ECE872-F4EF-2A49-BA96-6065BC99D769}"/>
               </a:ext>
             </a:extLst>
           </p:cNvPr>
@@ -1776,7 +1884,7 @@
           <p:cNvPr id="24" name="Bildplatzhalter 23">
             <a:extLst>
               <a:ext uri="{FF2B5EF4-FFF2-40B4-BE49-F238E27FC236}">
-                <a16:creationId xmlns="" xmlns:a16="http://schemas.microsoft.com/office/drawing/2014/main" id="{24A56C48-CA8D-D349-89CC-35C3A65DC4D5}"/>
+                <a16:creationId xmlns:a16="http://schemas.microsoft.com/office/drawing/2014/main" xmlns="" id="{24A56C48-CA8D-D349-89CC-35C3A65DC4D5}"/>
               </a:ext>
             </a:extLst>
           </p:cNvPr>
@@ -2090,7 +2198,7 @@
           <p:cNvPr id="6" name="Textplatzhalter 5">
             <a:extLst>
               <a:ext uri="{FF2B5EF4-FFF2-40B4-BE49-F238E27FC236}">
-                <a16:creationId xmlns="" xmlns:a16="http://schemas.microsoft.com/office/drawing/2014/main" id="{2E77FCEF-52F5-324B-A583-005ABCE0E622}"/>
+                <a16:creationId xmlns:a16="http://schemas.microsoft.com/office/drawing/2014/main" xmlns="" id="{2E77FCEF-52F5-324B-A583-005ABCE0E622}"/>
               </a:ext>
             </a:extLst>
           </p:cNvPr>
@@ -2128,7 +2236,7 @@
           <p:cNvPr id="13" name="Grafik 12">
             <a:extLst>
               <a:ext uri="{FF2B5EF4-FFF2-40B4-BE49-F238E27FC236}">
-                <a16:creationId xmlns="" xmlns:a16="http://schemas.microsoft.com/office/drawing/2014/main" id="{F84F96E3-FAED-E24A-9E01-BBA4824F0E34}"/>
+                <a16:creationId xmlns:a16="http://schemas.microsoft.com/office/drawing/2014/main" xmlns="" id="{F84F96E3-FAED-E24A-9E01-BBA4824F0E34}"/>
               </a:ext>
             </a:extLst>
           </p:cNvPr>
@@ -2299,7 +2407,7 @@
           <p:cNvPr id="6" name="Rechteck 5">
             <a:extLst>
               <a:ext uri="{FF2B5EF4-FFF2-40B4-BE49-F238E27FC236}">
-                <a16:creationId xmlns="" xmlns:a16="http://schemas.microsoft.com/office/drawing/2014/main" id="{2447D286-D9F9-E84F-9173-2C8D2D2068E1}"/>
+                <a16:creationId xmlns:a16="http://schemas.microsoft.com/office/drawing/2014/main" xmlns="" id="{2447D286-D9F9-E84F-9173-2C8D2D2068E1}"/>
               </a:ext>
             </a:extLst>
           </p:cNvPr>
@@ -2366,7 +2474,7 @@
           <p:cNvPr id="10" name="Grafik 9">
             <a:extLst>
               <a:ext uri="{FF2B5EF4-FFF2-40B4-BE49-F238E27FC236}">
-                <a16:creationId xmlns="" xmlns:a16="http://schemas.microsoft.com/office/drawing/2014/main" id="{E4DBCC79-CA26-C240-B119-9127A62CDBA8}"/>
+                <a16:creationId xmlns:a16="http://schemas.microsoft.com/office/drawing/2014/main" xmlns="" id="{E4DBCC79-CA26-C240-B119-9127A62CDBA8}"/>
               </a:ext>
             </a:extLst>
           </p:cNvPr>
@@ -2468,7 +2576,7 @@
           <p:cNvPr id="5" name="Rechteck 4">
             <a:extLst>
               <a:ext uri="{FF2B5EF4-FFF2-40B4-BE49-F238E27FC236}">
-                <a16:creationId xmlns="" xmlns:a16="http://schemas.microsoft.com/office/drawing/2014/main" id="{FD770378-5F2D-DE46-8D66-09007E946AD3}"/>
+                <a16:creationId xmlns:a16="http://schemas.microsoft.com/office/drawing/2014/main" xmlns="" id="{FD770378-5F2D-DE46-8D66-09007E946AD3}"/>
               </a:ext>
             </a:extLst>
           </p:cNvPr>
@@ -2532,7 +2640,7 @@
           <p:cNvPr id="4" name="Grafik 3">
             <a:extLst>
               <a:ext uri="{FF2B5EF4-FFF2-40B4-BE49-F238E27FC236}">
-                <a16:creationId xmlns="" xmlns:a16="http://schemas.microsoft.com/office/drawing/2014/main" id="{4FE30B28-5777-FC40-9C3F-81738D289A6A}"/>
+                <a16:creationId xmlns:a16="http://schemas.microsoft.com/office/drawing/2014/main" xmlns="" id="{4FE30B28-5777-FC40-9C3F-81738D289A6A}"/>
               </a:ext>
             </a:extLst>
           </p:cNvPr>
@@ -3677,7 +3785,7 @@
           <p:cNvPr id="13" name="Grafik 12">
             <a:extLst>
               <a:ext uri="{FF2B5EF4-FFF2-40B4-BE49-F238E27FC236}">
-                <a16:creationId xmlns="" xmlns:a16="http://schemas.microsoft.com/office/drawing/2014/main" id="{2DC3CACD-C7C8-274E-BCD4-043370996A48}"/>
+                <a16:creationId xmlns:a16="http://schemas.microsoft.com/office/drawing/2014/main" xmlns="" id="{2DC3CACD-C7C8-274E-BCD4-043370996A48}"/>
               </a:ext>
             </a:extLst>
           </p:cNvPr>
@@ -4285,6 +4393,13 @@
   <p:clrMapOvr>
     <a:masterClrMapping/>
   </p:clrMapOvr>
+  <p:timing>
+    <p:tnLst>
+      <p:par>
+        <p:cTn id="1" dur="indefinite" restart="never" nodeType="tmRoot"/>
+      </p:par>
+    </p:tnLst>
+  </p:timing>
 </p:sld>
 </file>
 
@@ -4364,28 +4479,28 @@
                 <a:gridCol w="4026471">
                   <a:extLst>
                     <a:ext uri="{9D8B030D-6E8A-4147-A177-3AD203B41FA5}">
-                      <a16:colId xmlns="" xmlns:a16="http://schemas.microsoft.com/office/drawing/2014/main" val="20000"/>
+                      <a16:colId xmlns:a16="http://schemas.microsoft.com/office/drawing/2014/main" xmlns="" val="20000"/>
                     </a:ext>
                   </a:extLst>
                 </a:gridCol>
                 <a:gridCol w="1231392">
                   <a:extLst>
                     <a:ext uri="{9D8B030D-6E8A-4147-A177-3AD203B41FA5}">
-                      <a16:colId xmlns="" xmlns:a16="http://schemas.microsoft.com/office/drawing/2014/main" val="20001"/>
+                      <a16:colId xmlns:a16="http://schemas.microsoft.com/office/drawing/2014/main" xmlns="" val="20001"/>
                     </a:ext>
                   </a:extLst>
                 </a:gridCol>
                 <a:gridCol w="1121664">
                   <a:extLst>
                     <a:ext uri="{9D8B030D-6E8A-4147-A177-3AD203B41FA5}">
-                      <a16:colId xmlns="" xmlns:a16="http://schemas.microsoft.com/office/drawing/2014/main" val="20002"/>
+                      <a16:colId xmlns:a16="http://schemas.microsoft.com/office/drawing/2014/main" xmlns="" val="20002"/>
                     </a:ext>
                   </a:extLst>
                 </a:gridCol>
                 <a:gridCol w="1121664">
                   <a:extLst>
                     <a:ext uri="{9D8B030D-6E8A-4147-A177-3AD203B41FA5}">
-                      <a16:colId xmlns="" xmlns:a16="http://schemas.microsoft.com/office/drawing/2014/main" val="20003"/>
+                      <a16:colId xmlns:a16="http://schemas.microsoft.com/office/drawing/2014/main" xmlns="" val="20003"/>
                     </a:ext>
                   </a:extLst>
                 </a:gridCol>
@@ -4518,7 +4633,7 @@
                 </a:tc>
                 <a:extLst>
                   <a:ext uri="{0D108BD9-81ED-4DB2-BD59-A6C34878D82A}">
-                    <a16:rowId xmlns="" xmlns:a16="http://schemas.microsoft.com/office/drawing/2014/main" val="10000"/>
+                    <a16:rowId xmlns:a16="http://schemas.microsoft.com/office/drawing/2014/main" xmlns="" val="10000"/>
                   </a:ext>
                 </a:extLst>
               </a:tr>
@@ -4740,7 +4855,7 @@
                 </a:tc>
                 <a:extLst>
                   <a:ext uri="{0D108BD9-81ED-4DB2-BD59-A6C34878D82A}">
-                    <a16:rowId xmlns="" xmlns:a16="http://schemas.microsoft.com/office/drawing/2014/main" val="10001"/>
+                    <a16:rowId xmlns:a16="http://schemas.microsoft.com/office/drawing/2014/main" xmlns="" val="10001"/>
                   </a:ext>
                 </a:extLst>
               </a:tr>
@@ -4962,7 +5077,7 @@
                 </a:tc>
                 <a:extLst>
                   <a:ext uri="{0D108BD9-81ED-4DB2-BD59-A6C34878D82A}">
-                    <a16:rowId xmlns="" xmlns:a16="http://schemas.microsoft.com/office/drawing/2014/main" val="10002"/>
+                    <a16:rowId xmlns:a16="http://schemas.microsoft.com/office/drawing/2014/main" xmlns="" val="10002"/>
                   </a:ext>
                 </a:extLst>
               </a:tr>
@@ -5184,7 +5299,7 @@
                 </a:tc>
                 <a:extLst>
                   <a:ext uri="{0D108BD9-81ED-4DB2-BD59-A6C34878D82A}">
-                    <a16:rowId xmlns="" xmlns:a16="http://schemas.microsoft.com/office/drawing/2014/main" val="10003"/>
+                    <a16:rowId xmlns:a16="http://schemas.microsoft.com/office/drawing/2014/main" xmlns="" val="10003"/>
                   </a:ext>
                 </a:extLst>
               </a:tr>
@@ -5414,7 +5529,7 @@
                 </a:tc>
                 <a:extLst>
                   <a:ext uri="{0D108BD9-81ED-4DB2-BD59-A6C34878D82A}">
-                    <a16:rowId xmlns="" xmlns:a16="http://schemas.microsoft.com/office/drawing/2014/main" val="10004"/>
+                    <a16:rowId xmlns:a16="http://schemas.microsoft.com/office/drawing/2014/main" xmlns="" val="10004"/>
                   </a:ext>
                 </a:extLst>
               </a:tr>
@@ -5636,7 +5751,7 @@
                 </a:tc>
                 <a:extLst>
                   <a:ext uri="{0D108BD9-81ED-4DB2-BD59-A6C34878D82A}">
-                    <a16:rowId xmlns="" xmlns:a16="http://schemas.microsoft.com/office/drawing/2014/main" val="10005"/>
+                    <a16:rowId xmlns:a16="http://schemas.microsoft.com/office/drawing/2014/main" xmlns="" val="10005"/>
                   </a:ext>
                 </a:extLst>
               </a:tr>
@@ -5858,7 +5973,7 @@
                 </a:tc>
                 <a:extLst>
                   <a:ext uri="{0D108BD9-81ED-4DB2-BD59-A6C34878D82A}">
-                    <a16:rowId xmlns="" xmlns:a16="http://schemas.microsoft.com/office/drawing/2014/main" val="10006"/>
+                    <a16:rowId xmlns:a16="http://schemas.microsoft.com/office/drawing/2014/main" xmlns="" val="10006"/>
                   </a:ext>
                 </a:extLst>
               </a:tr>
@@ -6073,6 +6188,13 @@
   <p:clrMapOvr>
     <a:masterClrMapping/>
   </p:clrMapOvr>
+  <p:timing>
+    <p:tnLst>
+      <p:par>
+        <p:cTn id="1" dur="indefinite" restart="never" nodeType="tmRoot"/>
+      </p:par>
+    </p:tnLst>
+  </p:timing>
 </p:sld>
 </file>
 
@@ -7274,6 +7396,13 @@
   <p:clrMapOvr>
     <a:masterClrMapping/>
   </p:clrMapOvr>
+  <p:timing>
+    <p:tnLst>
+      <p:par>
+        <p:cTn id="1" dur="indefinite" restart="never" nodeType="tmRoot"/>
+      </p:par>
+    </p:tnLst>
+  </p:timing>
 </p:sld>
 </file>
 
@@ -7616,6 +7745,13 @@
   <p:clrMapOvr>
     <a:masterClrMapping/>
   </p:clrMapOvr>
+  <p:timing>
+    <p:tnLst>
+      <p:par>
+        <p:cTn id="1" dur="indefinite" restart="never" nodeType="tmRoot"/>
+      </p:par>
+    </p:tnLst>
+  </p:timing>
 </p:sld>
 </file>
 
@@ -8726,6 +8862,13 @@
   <p:clrMapOvr>
     <a:masterClrMapping/>
   </p:clrMapOvr>
+  <p:timing>
+    <p:tnLst>
+      <p:par>
+        <p:cTn id="1" dur="indefinite" restart="never" nodeType="tmRoot"/>
+      </p:par>
+    </p:tnLst>
+  </p:timing>
 </p:sld>
 </file>
 
@@ -9826,6 +9969,13 @@
   <p:clrMapOvr>
     <a:masterClrMapping/>
   </p:clrMapOvr>
+  <p:timing>
+    <p:tnLst>
+      <p:par>
+        <p:cTn id="1" dur="indefinite" restart="never" nodeType="tmRoot"/>
+      </p:par>
+    </p:tnLst>
+  </p:timing>
 </p:sld>
 </file>
 
@@ -10910,10 +11060,1143 @@
   <p:clrMapOvr>
     <a:masterClrMapping/>
   </p:clrMapOvr>
+  <p:timing>
+    <p:tnLst>
+      <p:par>
+        <p:cTn id="1" dur="indefinite" restart="never" nodeType="tmRoot"/>
+      </p:par>
+    </p:tnLst>
+  </p:timing>
 </p:sld>
 </file>
 
 <file path=ppt/slides/slide8.xml><?xml version="1.0" encoding="utf-8"?>
+<p:sld xmlns:a="http://schemas.openxmlformats.org/drawingml/2006/main" xmlns:r="http://schemas.openxmlformats.org/officeDocument/2006/relationships" xmlns:p="http://schemas.openxmlformats.org/presentationml/2006/main">
+  <p:cSld>
+    <p:spTree>
+      <p:nvGrpSpPr>
+        <p:cNvPr id="1" name=""/>
+        <p:cNvGrpSpPr/>
+        <p:nvPr/>
+      </p:nvGrpSpPr>
+      <p:grpSpPr>
+        <a:xfrm>
+          <a:off x="0" y="0"/>
+          <a:ext cx="0" cy="0"/>
+          <a:chOff x="0" y="0"/>
+          <a:chExt cx="0" cy="0"/>
+        </a:xfrm>
+      </p:grpSpPr>
+      <p:sp>
+        <p:nvSpPr>
+          <p:cNvPr id="2" name="Titel 1"/>
+          <p:cNvSpPr>
+            <a:spLocks noGrp="1"/>
+          </p:cNvSpPr>
+          <p:nvPr>
+            <p:ph type="title"/>
+          </p:nvPr>
+        </p:nvSpPr>
+        <p:spPr/>
+        <p:txBody>
+          <a:bodyPr/>
+          <a:lstStyle/>
+          <a:p>
+            <a:r>
+              <a:rPr lang="de-DE" dirty="0" smtClean="0"/>
+              <a:t>Kommunikation</a:t>
+            </a:r>
+            <a:endParaRPr lang="de-DE" dirty="0"/>
+          </a:p>
+        </p:txBody>
+      </p:sp>
+      <p:pic>
+        <p:nvPicPr>
+          <p:cNvPr id="4" name="Inhaltsplatzhalter 3"/>
+          <p:cNvPicPr>
+            <a:picLocks noChangeAspect="1"/>
+          </p:cNvPicPr>
+          <p:nvPr/>
+        </p:nvPicPr>
+        <p:blipFill>
+          <a:blip r:embed="rId3">
+            <a:extLst>
+              <a:ext uri="{28A0092B-C50C-407E-A947-70E740481C1C}">
+                <a14:useLocalDpi xmlns:a14="http://schemas.microsoft.com/office/drawing/2010/main" val="0"/>
+              </a:ext>
+            </a:extLst>
+          </a:blip>
+          <a:stretch>
+            <a:fillRect/>
+          </a:stretch>
+        </p:blipFill>
+        <p:spPr>
+          <a:xfrm>
+            <a:off x="11455398" y="0"/>
+            <a:ext cx="736601" cy="736601"/>
+          </a:xfrm>
+          <a:prstGeom prst="rect">
+            <a:avLst/>
+          </a:prstGeom>
+          <a:ln>
+            <a:noFill/>
+          </a:ln>
+        </p:spPr>
+      </p:pic>
+      <p:grpSp>
+        <p:nvGrpSpPr>
+          <p:cNvPr id="5" name="Gruppieren 4"/>
+          <p:cNvGrpSpPr/>
+          <p:nvPr/>
+        </p:nvGrpSpPr>
+        <p:grpSpPr>
+          <a:xfrm>
+            <a:off x="7724648" y="1204913"/>
+            <a:ext cx="3730752" cy="1229417"/>
+            <a:chOff x="1780032" y="1330903"/>
+            <a:chExt cx="3730752" cy="1229417"/>
+          </a:xfrm>
+        </p:grpSpPr>
+        <p:sp>
+          <p:nvSpPr>
+            <p:cNvPr id="6" name="Rechteck 5"/>
+            <p:cNvSpPr/>
+            <p:nvPr/>
+          </p:nvSpPr>
+          <p:spPr>
+            <a:xfrm>
+              <a:off x="1780032" y="1499917"/>
+              <a:ext cx="3730752" cy="1060403"/>
+            </a:xfrm>
+            <a:prstGeom prst="rect">
+              <a:avLst/>
+            </a:prstGeom>
+            <a:solidFill>
+              <a:schemeClr val="bg1"/>
+            </a:solidFill>
+          </p:spPr>
+          <p:style>
+            <a:lnRef idx="2">
+              <a:schemeClr val="accent1">
+                <a:shade val="50000"/>
+              </a:schemeClr>
+            </a:lnRef>
+            <a:fillRef idx="1">
+              <a:schemeClr val="accent1"/>
+            </a:fillRef>
+            <a:effectRef idx="0">
+              <a:schemeClr val="accent1"/>
+            </a:effectRef>
+            <a:fontRef idx="minor">
+              <a:schemeClr val="lt1"/>
+            </a:fontRef>
+          </p:style>
+          <p:txBody>
+            <a:bodyPr tIns="180000" rtlCol="0" anchor="t"/>
+            <a:lstStyle/>
+            <a:p>
+              <a:pPr marL="285750" indent="-285750">
+                <a:buFont typeface="Arial" panose="020B0604020202020204" pitchFamily="34" charset="0"/>
+                <a:buChar char="•"/>
+              </a:pPr>
+              <a:r>
+                <a:rPr lang="de-DE" dirty="0" smtClean="0">
+                  <a:solidFill>
+                    <a:schemeClr val="tx1"/>
+                  </a:solidFill>
+                </a:rPr>
+                <a:t>Gruppiert Interaktionselemente</a:t>
+              </a:r>
+            </a:p>
+            <a:p>
+              <a:pPr marL="285750" indent="-285750">
+                <a:buFont typeface="Arial" panose="020B0604020202020204" pitchFamily="34" charset="0"/>
+                <a:buChar char="•"/>
+              </a:pPr>
+              <a:r>
+                <a:rPr lang="de-DE" dirty="0" smtClean="0">
+                  <a:solidFill>
+                    <a:schemeClr val="tx1"/>
+                  </a:solidFill>
+                </a:rPr>
+                <a:t>Vielfältige Verwendung</a:t>
+              </a:r>
+              <a:endParaRPr lang="de-DE" dirty="0">
+                <a:solidFill>
+                  <a:schemeClr val="tx1"/>
+                </a:solidFill>
+              </a:endParaRPr>
+            </a:p>
+          </p:txBody>
+        </p:sp>
+        <p:sp>
+          <p:nvSpPr>
+            <p:cNvPr id="7" name="Rechteck 6"/>
+            <p:cNvSpPr/>
+            <p:nvPr/>
+          </p:nvSpPr>
+          <p:spPr>
+            <a:xfrm>
+              <a:off x="1977040" y="1330903"/>
+              <a:ext cx="2148776" cy="338027"/>
+            </a:xfrm>
+            <a:prstGeom prst="rect">
+              <a:avLst/>
+            </a:prstGeom>
+            <a:solidFill>
+              <a:schemeClr val="bg1"/>
+            </a:solidFill>
+            <a:ln>
+              <a:noFill/>
+            </a:ln>
+          </p:spPr>
+          <p:style>
+            <a:lnRef idx="2">
+              <a:schemeClr val="accent1">
+                <a:shade val="50000"/>
+              </a:schemeClr>
+            </a:lnRef>
+            <a:fillRef idx="1">
+              <a:schemeClr val="accent1"/>
+            </a:fillRef>
+            <a:effectRef idx="0">
+              <a:schemeClr val="accent1"/>
+            </a:effectRef>
+            <a:fontRef idx="minor">
+              <a:schemeClr val="lt1"/>
+            </a:fontRef>
+          </p:style>
+          <p:txBody>
+            <a:bodyPr rtlCol="0" anchor="ctr"/>
+            <a:lstStyle/>
+            <a:p>
+              <a:r>
+                <a:rPr lang="de-DE" b="1" dirty="0" smtClean="0">
+                  <a:solidFill>
+                    <a:schemeClr val="tx1"/>
+                  </a:solidFill>
+                </a:rPr>
+                <a:t>Formulare/Masken</a:t>
+              </a:r>
+              <a:endParaRPr lang="de-DE" b="1" dirty="0">
+                <a:solidFill>
+                  <a:schemeClr val="tx1"/>
+                </a:solidFill>
+              </a:endParaRPr>
+            </a:p>
+          </p:txBody>
+        </p:sp>
+      </p:grpSp>
+      <p:grpSp>
+        <p:nvGrpSpPr>
+          <p:cNvPr id="8" name="Gruppieren 7"/>
+          <p:cNvGrpSpPr/>
+          <p:nvPr/>
+        </p:nvGrpSpPr>
+        <p:grpSpPr>
+          <a:xfrm>
+            <a:off x="7723643" y="2993255"/>
+            <a:ext cx="3730752" cy="1229417"/>
+            <a:chOff x="1780032" y="1330903"/>
+            <a:chExt cx="3730752" cy="1229417"/>
+          </a:xfrm>
+        </p:grpSpPr>
+        <p:sp>
+          <p:nvSpPr>
+            <p:cNvPr id="9" name="Rechteck 8"/>
+            <p:cNvSpPr/>
+            <p:nvPr/>
+          </p:nvSpPr>
+          <p:spPr>
+            <a:xfrm>
+              <a:off x="1780032" y="1499917"/>
+              <a:ext cx="3730752" cy="1060403"/>
+            </a:xfrm>
+            <a:prstGeom prst="rect">
+              <a:avLst/>
+            </a:prstGeom>
+            <a:solidFill>
+              <a:schemeClr val="bg1"/>
+            </a:solidFill>
+          </p:spPr>
+          <p:style>
+            <a:lnRef idx="2">
+              <a:schemeClr val="accent1">
+                <a:shade val="50000"/>
+              </a:schemeClr>
+            </a:lnRef>
+            <a:fillRef idx="1">
+              <a:schemeClr val="accent1"/>
+            </a:fillRef>
+            <a:effectRef idx="0">
+              <a:schemeClr val="accent1"/>
+            </a:effectRef>
+            <a:fontRef idx="minor">
+              <a:schemeClr val="lt1"/>
+            </a:fontRef>
+          </p:style>
+          <p:txBody>
+            <a:bodyPr tIns="180000" rtlCol="0" anchor="t"/>
+            <a:lstStyle/>
+            <a:p>
+              <a:pPr marL="285750" indent="-285750">
+                <a:buFont typeface="Arial" panose="020B0604020202020204" pitchFamily="34" charset="0"/>
+                <a:buChar char="•"/>
+              </a:pPr>
+              <a:r>
+                <a:rPr lang="de-DE" dirty="0" smtClean="0">
+                  <a:solidFill>
+                    <a:schemeClr val="tx1"/>
+                  </a:solidFill>
+                </a:rPr>
+                <a:t>Abgegrenzter steuerbarer Bereich</a:t>
+              </a:r>
+              <a:endParaRPr lang="de-DE" dirty="0">
+                <a:solidFill>
+                  <a:schemeClr val="tx1"/>
+                </a:solidFill>
+              </a:endParaRPr>
+            </a:p>
+          </p:txBody>
+        </p:sp>
+        <p:sp>
+          <p:nvSpPr>
+            <p:cNvPr id="10" name="Rechteck 9"/>
+            <p:cNvSpPr/>
+            <p:nvPr/>
+          </p:nvSpPr>
+          <p:spPr>
+            <a:xfrm>
+              <a:off x="1977040" y="1330903"/>
+              <a:ext cx="982717" cy="338027"/>
+            </a:xfrm>
+            <a:prstGeom prst="rect">
+              <a:avLst/>
+            </a:prstGeom>
+            <a:solidFill>
+              <a:schemeClr val="bg1"/>
+            </a:solidFill>
+            <a:ln>
+              <a:noFill/>
+            </a:ln>
+          </p:spPr>
+          <p:style>
+            <a:lnRef idx="2">
+              <a:schemeClr val="accent1">
+                <a:shade val="50000"/>
+              </a:schemeClr>
+            </a:lnRef>
+            <a:fillRef idx="1">
+              <a:schemeClr val="accent1"/>
+            </a:fillRef>
+            <a:effectRef idx="0">
+              <a:schemeClr val="accent1"/>
+            </a:effectRef>
+            <a:fontRef idx="minor">
+              <a:schemeClr val="lt1"/>
+            </a:fontRef>
+          </p:style>
+          <p:txBody>
+            <a:bodyPr rtlCol="0" anchor="ctr"/>
+            <a:lstStyle/>
+            <a:p>
+              <a:r>
+                <a:rPr lang="de-DE" b="1" dirty="0" smtClean="0">
+                  <a:solidFill>
+                    <a:schemeClr val="tx1"/>
+                  </a:solidFill>
+                </a:rPr>
+                <a:t>Fenster</a:t>
+              </a:r>
+              <a:endParaRPr lang="de-DE" b="1" dirty="0">
+                <a:solidFill>
+                  <a:schemeClr val="tx1"/>
+                </a:solidFill>
+              </a:endParaRPr>
+            </a:p>
+          </p:txBody>
+        </p:sp>
+      </p:grpSp>
+      <p:grpSp>
+        <p:nvGrpSpPr>
+          <p:cNvPr id="11" name="Gruppieren 10"/>
+          <p:cNvGrpSpPr/>
+          <p:nvPr/>
+        </p:nvGrpSpPr>
+        <p:grpSpPr>
+          <a:xfrm>
+            <a:off x="7724647" y="4612583"/>
+            <a:ext cx="3730752" cy="1229417"/>
+            <a:chOff x="1780032" y="1330903"/>
+            <a:chExt cx="3730752" cy="1229417"/>
+          </a:xfrm>
+        </p:grpSpPr>
+        <p:sp>
+          <p:nvSpPr>
+            <p:cNvPr id="12" name="Rechteck 11"/>
+            <p:cNvSpPr/>
+            <p:nvPr/>
+          </p:nvSpPr>
+          <p:spPr>
+            <a:xfrm>
+              <a:off x="1780032" y="1499917"/>
+              <a:ext cx="3730752" cy="1060403"/>
+            </a:xfrm>
+            <a:prstGeom prst="rect">
+              <a:avLst/>
+            </a:prstGeom>
+            <a:solidFill>
+              <a:schemeClr val="bg1"/>
+            </a:solidFill>
+          </p:spPr>
+          <p:style>
+            <a:lnRef idx="2">
+              <a:schemeClr val="accent1">
+                <a:shade val="50000"/>
+              </a:schemeClr>
+            </a:lnRef>
+            <a:fillRef idx="1">
+              <a:schemeClr val="accent1"/>
+            </a:fillRef>
+            <a:effectRef idx="0">
+              <a:schemeClr val="accent1"/>
+            </a:effectRef>
+            <a:fontRef idx="minor">
+              <a:schemeClr val="lt1"/>
+            </a:fontRef>
+          </p:style>
+          <p:txBody>
+            <a:bodyPr tIns="180000" rtlCol="0" anchor="t"/>
+            <a:lstStyle/>
+            <a:p>
+              <a:pPr marL="285750" indent="-285750">
+                <a:buFont typeface="Arial" panose="020B0604020202020204" pitchFamily="34" charset="0"/>
+                <a:buChar char="•"/>
+              </a:pPr>
+              <a:r>
+                <a:rPr lang="de-DE" dirty="0" smtClean="0">
+                  <a:solidFill>
+                    <a:schemeClr val="tx1"/>
+                  </a:solidFill>
+                </a:rPr>
+                <a:t>Direkte Bearbeitung der Objekte</a:t>
+              </a:r>
+            </a:p>
+            <a:p>
+              <a:pPr marL="285750" indent="-285750">
+                <a:buFont typeface="Arial" panose="020B0604020202020204" pitchFamily="34" charset="0"/>
+                <a:buChar char="•"/>
+              </a:pPr>
+              <a:r>
+                <a:rPr lang="de-DE" dirty="0" smtClean="0">
+                  <a:solidFill>
+                    <a:schemeClr val="tx1"/>
+                  </a:solidFill>
+                </a:rPr>
+                <a:t>Größe, Position verändern</a:t>
+              </a:r>
+              <a:endParaRPr lang="de-DE" dirty="0">
+                <a:solidFill>
+                  <a:schemeClr val="tx1"/>
+                </a:solidFill>
+              </a:endParaRPr>
+            </a:p>
+          </p:txBody>
+        </p:sp>
+        <p:sp>
+          <p:nvSpPr>
+            <p:cNvPr id="13" name="Rechteck 12"/>
+            <p:cNvSpPr/>
+            <p:nvPr/>
+          </p:nvSpPr>
+          <p:spPr>
+            <a:xfrm>
+              <a:off x="1977040" y="1330903"/>
+              <a:ext cx="2401440" cy="338027"/>
+            </a:xfrm>
+            <a:prstGeom prst="rect">
+              <a:avLst/>
+            </a:prstGeom>
+            <a:solidFill>
+              <a:schemeClr val="bg1"/>
+            </a:solidFill>
+            <a:ln>
+              <a:noFill/>
+            </a:ln>
+          </p:spPr>
+          <p:style>
+            <a:lnRef idx="2">
+              <a:schemeClr val="accent1">
+                <a:shade val="50000"/>
+              </a:schemeClr>
+            </a:lnRef>
+            <a:fillRef idx="1">
+              <a:schemeClr val="accent1"/>
+            </a:fillRef>
+            <a:effectRef idx="0">
+              <a:schemeClr val="accent1"/>
+            </a:effectRef>
+            <a:fontRef idx="minor">
+              <a:schemeClr val="lt1"/>
+            </a:fontRef>
+          </p:style>
+          <p:txBody>
+            <a:bodyPr rtlCol="0" anchor="ctr"/>
+            <a:lstStyle/>
+            <a:p>
+              <a:r>
+                <a:rPr lang="de-DE" b="1" dirty="0" smtClean="0">
+                  <a:solidFill>
+                    <a:schemeClr val="tx1"/>
+                  </a:solidFill>
+                </a:rPr>
+                <a:t>Direkte Manipulation</a:t>
+              </a:r>
+              <a:endParaRPr lang="de-DE" b="1" dirty="0">
+                <a:solidFill>
+                  <a:schemeClr val="tx1"/>
+                </a:solidFill>
+              </a:endParaRPr>
+            </a:p>
+          </p:txBody>
+        </p:sp>
+      </p:grpSp>
+      <p:grpSp>
+        <p:nvGrpSpPr>
+          <p:cNvPr id="14" name="Gruppieren 13"/>
+          <p:cNvGrpSpPr/>
+          <p:nvPr/>
+        </p:nvGrpSpPr>
+        <p:grpSpPr>
+          <a:xfrm>
+            <a:off x="874713" y="1204913"/>
+            <a:ext cx="4934768" cy="1229417"/>
+            <a:chOff x="1780032" y="1330903"/>
+            <a:chExt cx="4934768" cy="1229417"/>
+          </a:xfrm>
+        </p:grpSpPr>
+        <p:sp>
+          <p:nvSpPr>
+            <p:cNvPr id="15" name="Rechteck 14"/>
+            <p:cNvSpPr/>
+            <p:nvPr/>
+          </p:nvSpPr>
+          <p:spPr>
+            <a:xfrm>
+              <a:off x="1780032" y="1499917"/>
+              <a:ext cx="4934768" cy="1060403"/>
+            </a:xfrm>
+            <a:prstGeom prst="rect">
+              <a:avLst/>
+            </a:prstGeom>
+            <a:solidFill>
+              <a:schemeClr val="bg1"/>
+            </a:solidFill>
+            <a:ln>
+              <a:solidFill>
+                <a:schemeClr val="accent4"/>
+              </a:solidFill>
+            </a:ln>
+          </p:spPr>
+          <p:style>
+            <a:lnRef idx="2">
+              <a:schemeClr val="accent1">
+                <a:shade val="50000"/>
+              </a:schemeClr>
+            </a:lnRef>
+            <a:fillRef idx="1">
+              <a:schemeClr val="accent1"/>
+            </a:fillRef>
+            <a:effectRef idx="0">
+              <a:schemeClr val="accent1"/>
+            </a:effectRef>
+            <a:fontRef idx="minor">
+              <a:schemeClr val="lt1"/>
+            </a:fontRef>
+          </p:style>
+          <p:txBody>
+            <a:bodyPr tIns="180000" rtlCol="0" anchor="t"/>
+            <a:lstStyle/>
+            <a:p>
+              <a:pPr marL="285750" indent="-285750">
+                <a:buFont typeface="Arial" panose="020B0604020202020204" pitchFamily="34" charset="0"/>
+                <a:buChar char="•"/>
+              </a:pPr>
+              <a:r>
+                <a:rPr lang="de-DE" dirty="0" smtClean="0">
+                  <a:solidFill>
+                    <a:schemeClr val="tx1"/>
+                  </a:solidFill>
+                </a:rPr>
+                <a:t>Entsteht beim Lösen einer Aufgabe in Kooperation</a:t>
+              </a:r>
+            </a:p>
+            <a:p>
+              <a:pPr marL="285750" indent="-285750">
+                <a:buFont typeface="Arial" panose="020B0604020202020204" pitchFamily="34" charset="0"/>
+                <a:buChar char="•"/>
+              </a:pPr>
+              <a:r>
+                <a:rPr lang="de-DE" dirty="0" smtClean="0">
+                  <a:solidFill>
+                    <a:schemeClr val="tx1"/>
+                  </a:solidFill>
+                </a:rPr>
+                <a:t>Es sind mehrere Schritte notwendig</a:t>
+              </a:r>
+              <a:endParaRPr lang="de-DE" dirty="0">
+                <a:solidFill>
+                  <a:schemeClr val="tx1"/>
+                </a:solidFill>
+              </a:endParaRPr>
+            </a:p>
+          </p:txBody>
+        </p:sp>
+        <p:sp>
+          <p:nvSpPr>
+            <p:cNvPr id="16" name="Rechteck 15"/>
+            <p:cNvSpPr/>
+            <p:nvPr/>
+          </p:nvSpPr>
+          <p:spPr>
+            <a:xfrm>
+              <a:off x="1977039" y="1330903"/>
+              <a:ext cx="4198166" cy="338027"/>
+            </a:xfrm>
+            <a:prstGeom prst="rect">
+              <a:avLst/>
+            </a:prstGeom>
+            <a:solidFill>
+              <a:schemeClr val="bg1"/>
+            </a:solidFill>
+            <a:ln>
+              <a:noFill/>
+            </a:ln>
+          </p:spPr>
+          <p:style>
+            <a:lnRef idx="2">
+              <a:schemeClr val="accent1">
+                <a:shade val="50000"/>
+              </a:schemeClr>
+            </a:lnRef>
+            <a:fillRef idx="1">
+              <a:schemeClr val="accent1"/>
+            </a:fillRef>
+            <a:effectRef idx="0">
+              <a:schemeClr val="accent1"/>
+            </a:effectRef>
+            <a:fontRef idx="minor">
+              <a:schemeClr val="lt1"/>
+            </a:fontRef>
+          </p:style>
+          <p:txBody>
+            <a:bodyPr rtlCol="0" anchor="ctr"/>
+            <a:lstStyle/>
+            <a:p>
+              <a:r>
+                <a:rPr lang="de-DE" b="1" dirty="0" smtClean="0">
+                  <a:solidFill>
+                    <a:schemeClr val="accent4"/>
+                  </a:solidFill>
+                </a:rPr>
+                <a:t>Dialog zwischen Mensch und Maschine</a:t>
+              </a:r>
+              <a:endParaRPr lang="de-DE" b="1" dirty="0">
+                <a:solidFill>
+                  <a:schemeClr val="accent4"/>
+                </a:solidFill>
+              </a:endParaRPr>
+            </a:p>
+          </p:txBody>
+        </p:sp>
+      </p:grpSp>
+      <p:grpSp>
+        <p:nvGrpSpPr>
+          <p:cNvPr id="17" name="Gruppieren 16"/>
+          <p:cNvGrpSpPr/>
+          <p:nvPr/>
+        </p:nvGrpSpPr>
+        <p:grpSpPr>
+          <a:xfrm>
+            <a:off x="2078728" y="2993255"/>
+            <a:ext cx="3730752" cy="1229417"/>
+            <a:chOff x="1780032" y="1330903"/>
+            <a:chExt cx="3730752" cy="1229417"/>
+          </a:xfrm>
+        </p:grpSpPr>
+        <p:sp>
+          <p:nvSpPr>
+            <p:cNvPr id="18" name="Rechteck 17"/>
+            <p:cNvSpPr/>
+            <p:nvPr/>
+          </p:nvSpPr>
+          <p:spPr>
+            <a:xfrm>
+              <a:off x="1780032" y="1499917"/>
+              <a:ext cx="3730752" cy="1060403"/>
+            </a:xfrm>
+            <a:prstGeom prst="rect">
+              <a:avLst/>
+            </a:prstGeom>
+            <a:solidFill>
+              <a:schemeClr val="bg1"/>
+            </a:solidFill>
+          </p:spPr>
+          <p:style>
+            <a:lnRef idx="2">
+              <a:schemeClr val="accent1">
+                <a:shade val="50000"/>
+              </a:schemeClr>
+            </a:lnRef>
+            <a:fillRef idx="1">
+              <a:schemeClr val="accent1"/>
+            </a:fillRef>
+            <a:effectRef idx="0">
+              <a:schemeClr val="accent1"/>
+            </a:effectRef>
+            <a:fontRef idx="minor">
+              <a:schemeClr val="lt1"/>
+            </a:fontRef>
+          </p:style>
+          <p:txBody>
+            <a:bodyPr tIns="180000" rtlCol="0" anchor="t"/>
+            <a:lstStyle/>
+            <a:p>
+              <a:pPr marL="285750" indent="-285750">
+                <a:buFont typeface="Arial" panose="020B0604020202020204" pitchFamily="34" charset="0"/>
+                <a:buChar char="•"/>
+              </a:pPr>
+              <a:r>
+                <a:rPr lang="de-DE" dirty="0" smtClean="0">
+                  <a:solidFill>
+                    <a:schemeClr val="tx1"/>
+                  </a:solidFill>
+                </a:rPr>
+                <a:t>Eingabe über Tastatur</a:t>
+              </a:r>
+            </a:p>
+            <a:p>
+              <a:pPr marL="285750" indent="-285750">
+                <a:buFont typeface="Arial" panose="020B0604020202020204" pitchFamily="34" charset="0"/>
+                <a:buChar char="•"/>
+              </a:pPr>
+              <a:r>
+                <a:rPr lang="de-DE" dirty="0" smtClean="0">
+                  <a:solidFill>
+                    <a:schemeClr val="tx1"/>
+                  </a:solidFill>
+                </a:rPr>
+                <a:t>Mensch muss sich erinnern</a:t>
+              </a:r>
+            </a:p>
+            <a:p>
+              <a:pPr marL="285750" indent="-285750">
+                <a:buFont typeface="Arial" panose="020B0604020202020204" pitchFamily="34" charset="0"/>
+                <a:buChar char="•"/>
+              </a:pPr>
+              <a:r>
+                <a:rPr lang="de-DE" dirty="0" smtClean="0">
+                  <a:solidFill>
+                    <a:schemeClr val="tx1"/>
+                  </a:solidFill>
+                </a:rPr>
+                <a:t>benutzerbestimmt</a:t>
+              </a:r>
+              <a:endParaRPr lang="de-DE" dirty="0">
+                <a:solidFill>
+                  <a:schemeClr val="tx1"/>
+                </a:solidFill>
+              </a:endParaRPr>
+            </a:p>
+          </p:txBody>
+        </p:sp>
+        <p:sp>
+          <p:nvSpPr>
+            <p:cNvPr id="19" name="Rechteck 18"/>
+            <p:cNvSpPr/>
+            <p:nvPr/>
+          </p:nvSpPr>
+          <p:spPr>
+            <a:xfrm>
+              <a:off x="1977040" y="1330903"/>
+              <a:ext cx="1393834" cy="338027"/>
+            </a:xfrm>
+            <a:prstGeom prst="rect">
+              <a:avLst/>
+            </a:prstGeom>
+            <a:solidFill>
+              <a:schemeClr val="bg1"/>
+            </a:solidFill>
+            <a:ln>
+              <a:noFill/>
+            </a:ln>
+          </p:spPr>
+          <p:style>
+            <a:lnRef idx="2">
+              <a:schemeClr val="accent1">
+                <a:shade val="50000"/>
+              </a:schemeClr>
+            </a:lnRef>
+            <a:fillRef idx="1">
+              <a:schemeClr val="accent1"/>
+            </a:fillRef>
+            <a:effectRef idx="0">
+              <a:schemeClr val="accent1"/>
+            </a:effectRef>
+            <a:fontRef idx="minor">
+              <a:schemeClr val="lt1"/>
+            </a:fontRef>
+          </p:style>
+          <p:txBody>
+            <a:bodyPr rtlCol="0" anchor="ctr"/>
+            <a:lstStyle/>
+            <a:p>
+              <a:r>
+                <a:rPr lang="de-DE" b="1" dirty="0" smtClean="0">
+                  <a:solidFill>
+                    <a:schemeClr val="tx1"/>
+                  </a:solidFill>
+                </a:rPr>
+                <a:t>Kommando</a:t>
+              </a:r>
+              <a:endParaRPr lang="de-DE" b="1" dirty="0">
+                <a:solidFill>
+                  <a:schemeClr val="tx1"/>
+                </a:solidFill>
+              </a:endParaRPr>
+            </a:p>
+          </p:txBody>
+        </p:sp>
+      </p:grpSp>
+      <p:grpSp>
+        <p:nvGrpSpPr>
+          <p:cNvPr id="20" name="Gruppieren 19"/>
+          <p:cNvGrpSpPr/>
+          <p:nvPr/>
+        </p:nvGrpSpPr>
+        <p:grpSpPr>
+          <a:xfrm>
+            <a:off x="2078728" y="4612583"/>
+            <a:ext cx="3730752" cy="1229417"/>
+            <a:chOff x="1780032" y="1330903"/>
+            <a:chExt cx="3730752" cy="1229417"/>
+          </a:xfrm>
+        </p:grpSpPr>
+        <p:sp>
+          <p:nvSpPr>
+            <p:cNvPr id="21" name="Rechteck 20"/>
+            <p:cNvSpPr/>
+            <p:nvPr/>
+          </p:nvSpPr>
+          <p:spPr>
+            <a:xfrm>
+              <a:off x="1780032" y="1499917"/>
+              <a:ext cx="3730752" cy="1060403"/>
+            </a:xfrm>
+            <a:prstGeom prst="rect">
+              <a:avLst/>
+            </a:prstGeom>
+            <a:solidFill>
+              <a:schemeClr val="bg1"/>
+            </a:solidFill>
+          </p:spPr>
+          <p:style>
+            <a:lnRef idx="2">
+              <a:schemeClr val="accent1">
+                <a:shade val="50000"/>
+              </a:schemeClr>
+            </a:lnRef>
+            <a:fillRef idx="1">
+              <a:schemeClr val="accent1"/>
+            </a:fillRef>
+            <a:effectRef idx="0">
+              <a:schemeClr val="accent1"/>
+            </a:effectRef>
+            <a:fontRef idx="minor">
+              <a:schemeClr val="lt1"/>
+            </a:fontRef>
+          </p:style>
+          <p:txBody>
+            <a:bodyPr tIns="180000" rtlCol="0" anchor="t"/>
+            <a:lstStyle/>
+            <a:p>
+              <a:pPr marL="285750" indent="-285750">
+                <a:buFont typeface="Arial" panose="020B0604020202020204" pitchFamily="34" charset="0"/>
+                <a:buChar char="•"/>
+              </a:pPr>
+              <a:r>
+                <a:rPr lang="de-DE" dirty="0" smtClean="0">
+                  <a:solidFill>
+                    <a:schemeClr val="tx1"/>
+                  </a:solidFill>
+                </a:rPr>
+                <a:t>Sortierte Kommandos in Liste</a:t>
+              </a:r>
+            </a:p>
+            <a:p>
+              <a:pPr marL="285750" indent="-285750">
+                <a:buFont typeface="Arial" panose="020B0604020202020204" pitchFamily="34" charset="0"/>
+                <a:buChar char="•"/>
+              </a:pPr>
+              <a:r>
+                <a:rPr lang="de-DE" dirty="0" smtClean="0">
+                  <a:solidFill>
+                    <a:schemeClr val="tx1"/>
+                  </a:solidFill>
+                </a:rPr>
+                <a:t>Auswahl durch Nutzer</a:t>
+              </a:r>
+            </a:p>
+            <a:p>
+              <a:pPr marL="285750" indent="-285750">
+                <a:buFont typeface="Arial" panose="020B0604020202020204" pitchFamily="34" charset="0"/>
+                <a:buChar char="•"/>
+              </a:pPr>
+              <a:r>
+                <a:rPr lang="de-DE" dirty="0" smtClean="0">
+                  <a:solidFill>
+                    <a:schemeClr val="tx1"/>
+                  </a:solidFill>
+                </a:rPr>
+                <a:t>Statische Menü: systembestimmt</a:t>
+              </a:r>
+              <a:endParaRPr lang="de-DE" dirty="0">
+                <a:solidFill>
+                  <a:schemeClr val="tx1"/>
+                </a:solidFill>
+              </a:endParaRPr>
+            </a:p>
+          </p:txBody>
+        </p:sp>
+        <p:sp>
+          <p:nvSpPr>
+            <p:cNvPr id="22" name="Rechteck 21"/>
+            <p:cNvSpPr/>
+            <p:nvPr/>
+          </p:nvSpPr>
+          <p:spPr>
+            <a:xfrm>
+              <a:off x="1977040" y="1330903"/>
+              <a:ext cx="804287" cy="338027"/>
+            </a:xfrm>
+            <a:prstGeom prst="rect">
+              <a:avLst/>
+            </a:prstGeom>
+            <a:solidFill>
+              <a:schemeClr val="bg1"/>
+            </a:solidFill>
+            <a:ln>
+              <a:noFill/>
+            </a:ln>
+          </p:spPr>
+          <p:style>
+            <a:lnRef idx="2">
+              <a:schemeClr val="accent1">
+                <a:shade val="50000"/>
+              </a:schemeClr>
+            </a:lnRef>
+            <a:fillRef idx="1">
+              <a:schemeClr val="accent1"/>
+            </a:fillRef>
+            <a:effectRef idx="0">
+              <a:schemeClr val="accent1"/>
+            </a:effectRef>
+            <a:fontRef idx="minor">
+              <a:schemeClr val="lt1"/>
+            </a:fontRef>
+          </p:style>
+          <p:txBody>
+            <a:bodyPr rtlCol="0" anchor="ctr"/>
+            <a:lstStyle/>
+            <a:p>
+              <a:r>
+                <a:rPr lang="de-DE" b="1" dirty="0" smtClean="0">
+                  <a:solidFill>
+                    <a:schemeClr val="tx1"/>
+                  </a:solidFill>
+                </a:rPr>
+                <a:t>Menü</a:t>
+              </a:r>
+              <a:endParaRPr lang="de-DE" b="1" dirty="0">
+                <a:solidFill>
+                  <a:schemeClr val="tx1"/>
+                </a:solidFill>
+              </a:endParaRPr>
+            </a:p>
+          </p:txBody>
+        </p:sp>
+      </p:grpSp>
+      <p:pic>
+        <p:nvPicPr>
+          <p:cNvPr id="23" name="Grafik 22"/>
+          <p:cNvPicPr>
+            <a:picLocks noChangeAspect="1"/>
+          </p:cNvPicPr>
+          <p:nvPr/>
+        </p:nvPicPr>
+        <p:blipFill>
+          <a:blip r:embed="rId4">
+            <a:extLst>
+              <a:ext uri="{28A0092B-C50C-407E-A947-70E740481C1C}">
+                <a14:useLocalDpi xmlns:a14="http://schemas.microsoft.com/office/drawing/2010/main" val="0"/>
+              </a:ext>
+            </a:extLst>
+          </a:blip>
+          <a:stretch>
+            <a:fillRect/>
+          </a:stretch>
+        </p:blipFill>
+        <p:spPr>
+          <a:xfrm>
+            <a:off x="1071720" y="4906798"/>
+            <a:ext cx="810000" cy="810000"/>
+          </a:xfrm>
+          <a:prstGeom prst="rect">
+            <a:avLst/>
+          </a:prstGeom>
+        </p:spPr>
+      </p:pic>
+      <p:pic>
+        <p:nvPicPr>
+          <p:cNvPr id="24" name="Grafik 23"/>
+          <p:cNvPicPr>
+            <a:picLocks noChangeAspect="1"/>
+          </p:cNvPicPr>
+          <p:nvPr/>
+        </p:nvPicPr>
+        <p:blipFill>
+          <a:blip r:embed="rId5">
+            <a:extLst>
+              <a:ext uri="{28A0092B-C50C-407E-A947-70E740481C1C}">
+                <a14:useLocalDpi xmlns:a14="http://schemas.microsoft.com/office/drawing/2010/main" val="0"/>
+              </a:ext>
+            </a:extLst>
+          </a:blip>
+          <a:stretch>
+            <a:fillRect/>
+          </a:stretch>
+        </p:blipFill>
+        <p:spPr>
+          <a:xfrm>
+            <a:off x="6720020" y="1497712"/>
+            <a:ext cx="810000" cy="810000"/>
+          </a:xfrm>
+          <a:prstGeom prst="rect">
+            <a:avLst/>
+          </a:prstGeom>
+        </p:spPr>
+      </p:pic>
+      <p:pic>
+        <p:nvPicPr>
+          <p:cNvPr id="27" name="Grafik 26"/>
+          <p:cNvPicPr>
+            <a:picLocks noChangeAspect="1"/>
+          </p:cNvPicPr>
+          <p:nvPr/>
+        </p:nvPicPr>
+        <p:blipFill>
+          <a:blip r:embed="rId6">
+            <a:extLst>
+              <a:ext uri="{28A0092B-C50C-407E-A947-70E740481C1C}">
+                <a14:useLocalDpi xmlns:a14="http://schemas.microsoft.com/office/drawing/2010/main" val="0"/>
+              </a:ext>
+            </a:extLst>
+          </a:blip>
+          <a:stretch>
+            <a:fillRect/>
+          </a:stretch>
+        </p:blipFill>
+        <p:spPr>
+          <a:xfrm>
+            <a:off x="6720020" y="3287470"/>
+            <a:ext cx="810000" cy="810000"/>
+          </a:xfrm>
+          <a:prstGeom prst="rect">
+            <a:avLst/>
+          </a:prstGeom>
+        </p:spPr>
+      </p:pic>
+      <p:pic>
+        <p:nvPicPr>
+          <p:cNvPr id="29" name="Grafik 28"/>
+          <p:cNvPicPr>
+            <a:picLocks noChangeAspect="1"/>
+          </p:cNvPicPr>
+          <p:nvPr/>
+        </p:nvPicPr>
+        <p:blipFill>
+          <a:blip r:embed="rId7">
+            <a:extLst>
+              <a:ext uri="{28A0092B-C50C-407E-A947-70E740481C1C}">
+                <a14:useLocalDpi xmlns:a14="http://schemas.microsoft.com/office/drawing/2010/main" val="0"/>
+              </a:ext>
+            </a:extLst>
+          </a:blip>
+          <a:stretch>
+            <a:fillRect/>
+          </a:stretch>
+        </p:blipFill>
+        <p:spPr>
+          <a:xfrm>
+            <a:off x="6720020" y="4906798"/>
+            <a:ext cx="810000" cy="810000"/>
+          </a:xfrm>
+          <a:prstGeom prst="rect">
+            <a:avLst/>
+          </a:prstGeom>
+        </p:spPr>
+      </p:pic>
+      <p:pic>
+        <p:nvPicPr>
+          <p:cNvPr id="30" name="Grafik 29"/>
+          <p:cNvPicPr>
+            <a:picLocks noChangeAspect="1"/>
+          </p:cNvPicPr>
+          <p:nvPr/>
+        </p:nvPicPr>
+        <p:blipFill>
+          <a:blip r:embed="rId8">
+            <a:extLst>
+              <a:ext uri="{28A0092B-C50C-407E-A947-70E740481C1C}">
+                <a14:useLocalDpi xmlns:a14="http://schemas.microsoft.com/office/drawing/2010/main" val="0"/>
+              </a:ext>
+            </a:extLst>
+          </a:blip>
+          <a:stretch>
+            <a:fillRect/>
+          </a:stretch>
+        </p:blipFill>
+        <p:spPr>
+          <a:xfrm>
+            <a:off x="1071720" y="3287470"/>
+            <a:ext cx="810000" cy="810000"/>
+          </a:xfrm>
+          <a:prstGeom prst="rect">
+            <a:avLst/>
+          </a:prstGeom>
+        </p:spPr>
+      </p:pic>
+    </p:spTree>
+    <p:extLst>
+      <p:ext uri="{BB962C8B-B14F-4D97-AF65-F5344CB8AC3E}">
+        <p14:creationId xmlns:p14="http://schemas.microsoft.com/office/powerpoint/2010/main" val="2184428850"/>
+      </p:ext>
+    </p:extLst>
+  </p:cSld>
+  <p:clrMapOvr>
+    <a:masterClrMapping/>
+  </p:clrMapOvr>
+  <p:timing>
+    <p:tnLst>
+      <p:par>
+        <p:cTn id="1" dur="indefinite" restart="never" nodeType="tmRoot"/>
+      </p:par>
+    </p:tnLst>
+  </p:timing>
+</p:sld>
+</file>
+
+<file path=ppt/slides/slide9.xml><?xml version="1.0" encoding="utf-8"?>
 <p:sld xmlns:a="http://schemas.openxmlformats.org/drawingml/2006/main" xmlns:r="http://schemas.openxmlformats.org/officeDocument/2006/relationships" xmlns:p="http://schemas.openxmlformats.org/presentationml/2006/main">
   <p:cSld>
     <p:spTree>
@@ -10974,56 +12257,10 @@
           <a:p>
             <a:pPr lvl="1"/>
             <a:r>
-              <a:rPr lang="de-DE" dirty="0" err="1" smtClean="0"/>
-              <a:t>Aberarbeitung</a:t>
+              <a:rPr lang="de-DE" dirty="0" smtClean="0"/>
+              <a:t>Verknüpft die Informationen</a:t>
             </a:r>
-            <a:r>
-              <a:rPr lang="de-DE" dirty="0" smtClean="0"/>
-              <a:t> von Listen</a:t>
-            </a:r>
-          </a:p>
-          <a:p>
-            <a:pPr lvl="1"/>
-            <a:r>
-              <a:rPr lang="de-DE" dirty="0" smtClean="0"/>
-              <a:t>Unterstützung bei der Kommissionierung</a:t>
-            </a:r>
-          </a:p>
-          <a:p>
-            <a:pPr lvl="1"/>
-            <a:r>
-              <a:rPr lang="de-DE" dirty="0" smtClean="0"/>
-              <a:t>Bereitstellung von Anleitungen</a:t>
-            </a:r>
-          </a:p>
-          <a:p>
-            <a:pPr lvl="1"/>
-            <a:r>
-              <a:rPr lang="de-DE" dirty="0" smtClean="0"/>
-              <a:t>Auf Befehl Informationen bereitstellen</a:t>
-            </a:r>
-          </a:p>
-          <a:p>
-            <a:pPr lvl="1"/>
-            <a:r>
-              <a:rPr lang="de-DE" dirty="0" smtClean="0"/>
-              <a:t>Siri, Alexa</a:t>
-            </a:r>
-          </a:p>
-          <a:p>
-            <a:pPr lvl="1"/>
-            <a:r>
-              <a:rPr lang="de-DE" dirty="0" smtClean="0"/>
-              <a:t>Durch Sammeln von Informationen </a:t>
-            </a:r>
-            <a:r>
-              <a:rPr lang="de-DE" dirty="0" err="1" smtClean="0"/>
-              <a:t>verschläge</a:t>
-            </a:r>
-            <a:r>
-              <a:rPr lang="de-DE" dirty="0" smtClean="0"/>
-              <a:t> machen (Amazon)</a:t>
-            </a:r>
+            <a:endParaRPr lang="de-DE" dirty="0" smtClean="0"/>
           </a:p>
           <a:p>
             <a:pPr lvl="1"/>
@@ -11089,126 +12326,13 @@
   <p:clrMapOvr>
     <a:masterClrMapping/>
   </p:clrMapOvr>
-</p:sld>
-</file>
-
-<file path=ppt/slides/slide9.xml><?xml version="1.0" encoding="utf-8"?>
-<p:sld xmlns:a="http://schemas.openxmlformats.org/drawingml/2006/main" xmlns:r="http://schemas.openxmlformats.org/officeDocument/2006/relationships" xmlns:p="http://schemas.openxmlformats.org/presentationml/2006/main">
-  <p:cSld>
-    <p:spTree>
-      <p:nvGrpSpPr>
-        <p:cNvPr id="1" name=""/>
-        <p:cNvGrpSpPr/>
-        <p:nvPr/>
-      </p:nvGrpSpPr>
-      <p:grpSpPr>
-        <a:xfrm>
-          <a:off x="0" y="0"/>
-          <a:ext cx="0" cy="0"/>
-          <a:chOff x="0" y="0"/>
-          <a:chExt cx="0" cy="0"/>
-        </a:xfrm>
-      </p:grpSpPr>
-      <p:sp>
-        <p:nvSpPr>
-          <p:cNvPr id="2" name="Titel 1"/>
-          <p:cNvSpPr>
-            <a:spLocks noGrp="1"/>
-          </p:cNvSpPr>
-          <p:nvPr>
-            <p:ph type="title"/>
-          </p:nvPr>
-        </p:nvSpPr>
-        <p:spPr/>
-        <p:txBody>
-          <a:bodyPr/>
-          <a:lstStyle/>
-          <a:p>
-            <a:r>
-              <a:rPr lang="de-DE" dirty="0" smtClean="0"/>
-              <a:t>Kommunikation</a:t>
-            </a:r>
-            <a:endParaRPr lang="de-DE" dirty="0"/>
-          </a:p>
-        </p:txBody>
-      </p:sp>
-      <p:sp>
-        <p:nvSpPr>
-          <p:cNvPr id="3" name="Inhaltsplatzhalter 2"/>
-          <p:cNvSpPr>
-            <a:spLocks noGrp="1"/>
-          </p:cNvSpPr>
-          <p:nvPr>
-            <p:ph sz="quarter" idx="10"/>
-          </p:nvPr>
-        </p:nvSpPr>
-        <p:spPr/>
-        <p:txBody>
-          <a:bodyPr/>
-          <a:lstStyle/>
-          <a:p>
-            <a:pPr lvl="1"/>
-            <a:r>
-              <a:rPr lang="de-DE" dirty="0" smtClean="0"/>
-              <a:t>Kommandos</a:t>
-            </a:r>
-          </a:p>
-          <a:p>
-            <a:pPr lvl="1"/>
-            <a:r>
-              <a:rPr lang="de-DE" dirty="0" smtClean="0"/>
-              <a:t>Dialoge</a:t>
-            </a:r>
-          </a:p>
-          <a:p>
-            <a:pPr lvl="1"/>
-            <a:endParaRPr lang="de-DE" dirty="0"/>
-          </a:p>
-        </p:txBody>
-      </p:sp>
-      <p:pic>
-        <p:nvPicPr>
-          <p:cNvPr id="4" name="Inhaltsplatzhalter 3"/>
-          <p:cNvPicPr>
-            <a:picLocks noChangeAspect="1"/>
-          </p:cNvPicPr>
-          <p:nvPr/>
-        </p:nvPicPr>
-        <p:blipFill>
-          <a:blip r:embed="rId2">
-            <a:extLst>
-              <a:ext uri="{28A0092B-C50C-407E-A947-70E740481C1C}">
-                <a14:useLocalDpi xmlns:a14="http://schemas.microsoft.com/office/drawing/2010/main" val="0"/>
-              </a:ext>
-            </a:extLst>
-          </a:blip>
-          <a:stretch>
-            <a:fillRect/>
-          </a:stretch>
-        </p:blipFill>
-        <p:spPr>
-          <a:xfrm>
-            <a:off x="11455398" y="0"/>
-            <a:ext cx="736601" cy="736601"/>
-          </a:xfrm>
-          <a:prstGeom prst="rect">
-            <a:avLst/>
-          </a:prstGeom>
-          <a:ln>
-            <a:noFill/>
-          </a:ln>
-        </p:spPr>
-      </p:pic>
-    </p:spTree>
-    <p:extLst>
-      <p:ext uri="{BB962C8B-B14F-4D97-AF65-F5344CB8AC3E}">
-        <p14:creationId xmlns:p14="http://schemas.microsoft.com/office/powerpoint/2010/main" val="2184428850"/>
-      </p:ext>
-    </p:extLst>
-  </p:cSld>
-  <p:clrMapOvr>
-    <a:masterClrMapping/>
-  </p:clrMapOvr>
+  <p:timing>
+    <p:tnLst>
+      <p:par>
+        <p:cTn id="1" dur="indefinite" restart="never" nodeType="tmRoot"/>
+      </p:par>
+    </p:tnLst>
+  </p:timing>
 </p:sld>
 </file>
 

</xml_diff>